<commit_message>
Made it draw rectangles from a PowerPoint
yes, really
</commit_message>
<xml_diff>
--- a/VerilogExample/PPVerilogEngine/main.pptx
+++ b/VerilogExample/PPVerilogEngine/main.pptx
@@ -4,6 +4,9 @@
   <p:sldMasterIdLst>
     <p:sldMasterId id="2147483648" r:id="rId1"/>
   </p:sldMasterIdLst>
+  <p:notesMasterIdLst>
+    <p:notesMasterId r:id="rId3"/>
+  </p:notesMasterIdLst>
   <p:sldIdLst>
     <p:sldId id="256" r:id="rId2"/>
   </p:sldIdLst>
@@ -104,7 +107,450 @@
       </a:defRPr>
     </a:lvl9pPr>
   </p:defaultTextStyle>
+  <p:extLst>
+    <p:ext uri="{EFAFB233-063F-42B5-8137-9DF3F51BA10A}">
+      <p15:sldGuideLst xmlns:p15="http://schemas.microsoft.com/office/powerpoint/2012/main"/>
+    </p:ext>
+  </p:extLst>
 </p:presentation>
+</file>
+
+<file path=ppt/notesMasters/notesMaster1.xml><?xml version="1.0" encoding="utf-8"?>
+<p:notesMaster xmlns:a="http://schemas.openxmlformats.org/drawingml/2006/main" xmlns:r="http://schemas.openxmlformats.org/officeDocument/2006/relationships" xmlns:p="http://schemas.openxmlformats.org/presentationml/2006/main">
+  <p:cSld>
+    <p:bg>
+      <p:bgRef idx="1001">
+        <a:schemeClr val="bg1"/>
+      </p:bgRef>
+    </p:bg>
+    <p:spTree>
+      <p:nvGrpSpPr>
+        <p:cNvPr id="1" name=""/>
+        <p:cNvGrpSpPr/>
+        <p:nvPr/>
+      </p:nvGrpSpPr>
+      <p:grpSpPr>
+        <a:xfrm>
+          <a:off x="0" y="0"/>
+          <a:ext cx="0" cy="0"/>
+          <a:chOff x="0" y="0"/>
+          <a:chExt cx="0" cy="0"/>
+        </a:xfrm>
+      </p:grpSpPr>
+      <p:sp>
+        <p:nvSpPr>
+          <p:cNvPr id="2" name="Header Placeholder 1"/>
+          <p:cNvSpPr>
+            <a:spLocks noGrp="1"/>
+          </p:cNvSpPr>
+          <p:nvPr>
+            <p:ph type="hdr" sz="quarter"/>
+          </p:nvPr>
+        </p:nvSpPr>
+        <p:spPr>
+          <a:xfrm>
+            <a:off x="0" y="0"/>
+            <a:ext cx="2971800" cy="458788"/>
+          </a:xfrm>
+          <a:prstGeom prst="rect">
+            <a:avLst/>
+          </a:prstGeom>
+        </p:spPr>
+        <p:txBody>
+          <a:bodyPr vert="horz" lIns="91440" tIns="45720" rIns="91440" bIns="45720" rtlCol="0"/>
+          <a:lstStyle>
+            <a:lvl1pPr algn="l">
+              <a:defRPr sz="1200"/>
+            </a:lvl1pPr>
+          </a:lstStyle>
+          <a:p>
+            <a:endParaRPr lang="en-US"/>
+          </a:p>
+        </p:txBody>
+      </p:sp>
+      <p:sp>
+        <p:nvSpPr>
+          <p:cNvPr id="3" name="Date Placeholder 2"/>
+          <p:cNvSpPr>
+            <a:spLocks noGrp="1"/>
+          </p:cNvSpPr>
+          <p:nvPr>
+            <p:ph type="dt" idx="1"/>
+          </p:nvPr>
+        </p:nvSpPr>
+        <p:spPr>
+          <a:xfrm>
+            <a:off x="3884613" y="0"/>
+            <a:ext cx="2971800" cy="458788"/>
+          </a:xfrm>
+          <a:prstGeom prst="rect">
+            <a:avLst/>
+          </a:prstGeom>
+        </p:spPr>
+        <p:txBody>
+          <a:bodyPr vert="horz" lIns="91440" tIns="45720" rIns="91440" bIns="45720" rtlCol="0"/>
+          <a:lstStyle>
+            <a:lvl1pPr algn="r">
+              <a:defRPr sz="1200"/>
+            </a:lvl1pPr>
+          </a:lstStyle>
+          <a:p>
+            <a:fld id="{01A1BE80-B383-48BF-8DCC-287BC5926A7A}" type="datetimeFigureOut">
+              <a:rPr lang="en-US" smtClean="0"/>
+              <a:t>10/10/2018</a:t>
+            </a:fld>
+            <a:endParaRPr lang="en-US"/>
+          </a:p>
+        </p:txBody>
+      </p:sp>
+      <p:sp>
+        <p:nvSpPr>
+          <p:cNvPr id="4" name="Slide Image Placeholder 3"/>
+          <p:cNvSpPr>
+            <a:spLocks noGrp="1" noRot="1" noChangeAspect="1"/>
+          </p:cNvSpPr>
+          <p:nvPr>
+            <p:ph type="sldImg" idx="2"/>
+          </p:nvPr>
+        </p:nvSpPr>
+        <p:spPr>
+          <a:xfrm>
+            <a:off x="685800" y="1143000"/>
+            <a:ext cx="5486400" cy="3086100"/>
+          </a:xfrm>
+          <a:prstGeom prst="rect">
+            <a:avLst/>
+          </a:prstGeom>
+          <a:noFill/>
+          <a:ln w="12700">
+            <a:solidFill>
+              <a:prstClr val="black"/>
+            </a:solidFill>
+          </a:ln>
+        </p:spPr>
+        <p:txBody>
+          <a:bodyPr vert="horz" lIns="91440" tIns="45720" rIns="91440" bIns="45720" rtlCol="0" anchor="ctr"/>
+          <a:lstStyle/>
+          <a:p>
+            <a:endParaRPr lang="en-US"/>
+          </a:p>
+        </p:txBody>
+      </p:sp>
+      <p:sp>
+        <p:nvSpPr>
+          <p:cNvPr id="5" name="Notes Placeholder 4"/>
+          <p:cNvSpPr>
+            <a:spLocks noGrp="1"/>
+          </p:cNvSpPr>
+          <p:nvPr>
+            <p:ph type="body" sz="quarter" idx="3"/>
+          </p:nvPr>
+        </p:nvSpPr>
+        <p:spPr>
+          <a:xfrm>
+            <a:off x="685800" y="4400550"/>
+            <a:ext cx="5486400" cy="3600450"/>
+          </a:xfrm>
+          <a:prstGeom prst="rect">
+            <a:avLst/>
+          </a:prstGeom>
+        </p:spPr>
+        <p:txBody>
+          <a:bodyPr vert="horz" lIns="91440" tIns="45720" rIns="91440" bIns="45720" rtlCol="0"/>
+          <a:lstStyle/>
+          <a:p>
+            <a:pPr lvl="0"/>
+            <a:r>
+              <a:rPr lang="en-US" smtClean="0"/>
+              <a:t>Edit Master text styles</a:t>
+            </a:r>
+          </a:p>
+          <a:p>
+            <a:pPr lvl="1"/>
+            <a:r>
+              <a:rPr lang="en-US" smtClean="0"/>
+              <a:t>Second level</a:t>
+            </a:r>
+          </a:p>
+          <a:p>
+            <a:pPr lvl="2"/>
+            <a:r>
+              <a:rPr lang="en-US" smtClean="0"/>
+              <a:t>Third level</a:t>
+            </a:r>
+          </a:p>
+          <a:p>
+            <a:pPr lvl="3"/>
+            <a:r>
+              <a:rPr lang="en-US" smtClean="0"/>
+              <a:t>Fourth level</a:t>
+            </a:r>
+          </a:p>
+          <a:p>
+            <a:pPr lvl="4"/>
+            <a:r>
+              <a:rPr lang="en-US" smtClean="0"/>
+              <a:t>Fifth level</a:t>
+            </a:r>
+            <a:endParaRPr lang="en-US"/>
+          </a:p>
+        </p:txBody>
+      </p:sp>
+      <p:sp>
+        <p:nvSpPr>
+          <p:cNvPr id="6" name="Footer Placeholder 5"/>
+          <p:cNvSpPr>
+            <a:spLocks noGrp="1"/>
+          </p:cNvSpPr>
+          <p:nvPr>
+            <p:ph type="ftr" sz="quarter" idx="4"/>
+          </p:nvPr>
+        </p:nvSpPr>
+        <p:spPr>
+          <a:xfrm>
+            <a:off x="0" y="8685213"/>
+            <a:ext cx="2971800" cy="458787"/>
+          </a:xfrm>
+          <a:prstGeom prst="rect">
+            <a:avLst/>
+          </a:prstGeom>
+        </p:spPr>
+        <p:txBody>
+          <a:bodyPr vert="horz" lIns="91440" tIns="45720" rIns="91440" bIns="45720" rtlCol="0" anchor="b"/>
+          <a:lstStyle>
+            <a:lvl1pPr algn="l">
+              <a:defRPr sz="1200"/>
+            </a:lvl1pPr>
+          </a:lstStyle>
+          <a:p>
+            <a:endParaRPr lang="en-US"/>
+          </a:p>
+        </p:txBody>
+      </p:sp>
+      <p:sp>
+        <p:nvSpPr>
+          <p:cNvPr id="7" name="Slide Number Placeholder 6"/>
+          <p:cNvSpPr>
+            <a:spLocks noGrp="1"/>
+          </p:cNvSpPr>
+          <p:nvPr>
+            <p:ph type="sldNum" sz="quarter" idx="5"/>
+          </p:nvPr>
+        </p:nvSpPr>
+        <p:spPr>
+          <a:xfrm>
+            <a:off x="3884613" y="8685213"/>
+            <a:ext cx="2971800" cy="458787"/>
+          </a:xfrm>
+          <a:prstGeom prst="rect">
+            <a:avLst/>
+          </a:prstGeom>
+        </p:spPr>
+        <p:txBody>
+          <a:bodyPr vert="horz" lIns="91440" tIns="45720" rIns="91440" bIns="45720" rtlCol="0" anchor="b"/>
+          <a:lstStyle>
+            <a:lvl1pPr algn="r">
+              <a:defRPr sz="1200"/>
+            </a:lvl1pPr>
+          </a:lstStyle>
+          <a:p>
+            <a:fld id="{FD4630FF-7EAB-466A-9F54-35D39D4AE102}" type="slidenum">
+              <a:rPr lang="en-US" smtClean="0"/>
+              <a:t>‹#›</a:t>
+            </a:fld>
+            <a:endParaRPr lang="en-US"/>
+          </a:p>
+        </p:txBody>
+      </p:sp>
+    </p:spTree>
+    <p:extLst>
+      <p:ext uri="{BB962C8B-B14F-4D97-AF65-F5344CB8AC3E}">
+        <p14:creationId xmlns:p14="http://schemas.microsoft.com/office/powerpoint/2010/main" val="1129309042"/>
+      </p:ext>
+    </p:extLst>
+  </p:cSld>
+  <p:clrMap bg1="lt1" tx1="dk1" bg2="lt2" tx2="dk2" accent1="accent1" accent2="accent2" accent3="accent3" accent4="accent4" accent5="accent5" accent6="accent6" hlink="hlink" folHlink="folHlink"/>
+  <p:notesStyle>
+    <a:lvl1pPr marL="0" algn="l" defTabSz="914400" rtl="0" eaLnBrk="1" latinLnBrk="0" hangingPunct="1">
+      <a:defRPr sz="1200" kern="1200">
+        <a:solidFill>
+          <a:schemeClr val="tx1"/>
+        </a:solidFill>
+        <a:latin typeface="+mn-lt"/>
+        <a:ea typeface="+mn-ea"/>
+        <a:cs typeface="+mn-cs"/>
+      </a:defRPr>
+    </a:lvl1pPr>
+    <a:lvl2pPr marL="457200" algn="l" defTabSz="914400" rtl="0" eaLnBrk="1" latinLnBrk="0" hangingPunct="1">
+      <a:defRPr sz="1200" kern="1200">
+        <a:solidFill>
+          <a:schemeClr val="tx1"/>
+        </a:solidFill>
+        <a:latin typeface="+mn-lt"/>
+        <a:ea typeface="+mn-ea"/>
+        <a:cs typeface="+mn-cs"/>
+      </a:defRPr>
+    </a:lvl2pPr>
+    <a:lvl3pPr marL="914400" algn="l" defTabSz="914400" rtl="0" eaLnBrk="1" latinLnBrk="0" hangingPunct="1">
+      <a:defRPr sz="1200" kern="1200">
+        <a:solidFill>
+          <a:schemeClr val="tx1"/>
+        </a:solidFill>
+        <a:latin typeface="+mn-lt"/>
+        <a:ea typeface="+mn-ea"/>
+        <a:cs typeface="+mn-cs"/>
+      </a:defRPr>
+    </a:lvl3pPr>
+    <a:lvl4pPr marL="1371600" algn="l" defTabSz="914400" rtl="0" eaLnBrk="1" latinLnBrk="0" hangingPunct="1">
+      <a:defRPr sz="1200" kern="1200">
+        <a:solidFill>
+          <a:schemeClr val="tx1"/>
+        </a:solidFill>
+        <a:latin typeface="+mn-lt"/>
+        <a:ea typeface="+mn-ea"/>
+        <a:cs typeface="+mn-cs"/>
+      </a:defRPr>
+    </a:lvl4pPr>
+    <a:lvl5pPr marL="1828800" algn="l" defTabSz="914400" rtl="0" eaLnBrk="1" latinLnBrk="0" hangingPunct="1">
+      <a:defRPr sz="1200" kern="1200">
+        <a:solidFill>
+          <a:schemeClr val="tx1"/>
+        </a:solidFill>
+        <a:latin typeface="+mn-lt"/>
+        <a:ea typeface="+mn-ea"/>
+        <a:cs typeface="+mn-cs"/>
+      </a:defRPr>
+    </a:lvl5pPr>
+    <a:lvl6pPr marL="2286000" algn="l" defTabSz="914400" rtl="0" eaLnBrk="1" latinLnBrk="0" hangingPunct="1">
+      <a:defRPr sz="1200" kern="1200">
+        <a:solidFill>
+          <a:schemeClr val="tx1"/>
+        </a:solidFill>
+        <a:latin typeface="+mn-lt"/>
+        <a:ea typeface="+mn-ea"/>
+        <a:cs typeface="+mn-cs"/>
+      </a:defRPr>
+    </a:lvl6pPr>
+    <a:lvl7pPr marL="2743200" algn="l" defTabSz="914400" rtl="0" eaLnBrk="1" latinLnBrk="0" hangingPunct="1">
+      <a:defRPr sz="1200" kern="1200">
+        <a:solidFill>
+          <a:schemeClr val="tx1"/>
+        </a:solidFill>
+        <a:latin typeface="+mn-lt"/>
+        <a:ea typeface="+mn-ea"/>
+        <a:cs typeface="+mn-cs"/>
+      </a:defRPr>
+    </a:lvl7pPr>
+    <a:lvl8pPr marL="3200400" algn="l" defTabSz="914400" rtl="0" eaLnBrk="1" latinLnBrk="0" hangingPunct="1">
+      <a:defRPr sz="1200" kern="1200">
+        <a:solidFill>
+          <a:schemeClr val="tx1"/>
+        </a:solidFill>
+        <a:latin typeface="+mn-lt"/>
+        <a:ea typeface="+mn-ea"/>
+        <a:cs typeface="+mn-cs"/>
+      </a:defRPr>
+    </a:lvl8pPr>
+    <a:lvl9pPr marL="3657600" algn="l" defTabSz="914400" rtl="0" eaLnBrk="1" latinLnBrk="0" hangingPunct="1">
+      <a:defRPr sz="1200" kern="1200">
+        <a:solidFill>
+          <a:schemeClr val="tx1"/>
+        </a:solidFill>
+        <a:latin typeface="+mn-lt"/>
+        <a:ea typeface="+mn-ea"/>
+        <a:cs typeface="+mn-cs"/>
+      </a:defRPr>
+    </a:lvl9pPr>
+  </p:notesStyle>
+</p:notesMaster>
+</file>
+
+<file path=ppt/notesSlides/notesSlide1.xml><?xml version="1.0" encoding="utf-8"?>
+<p:notes xmlns:a="http://schemas.openxmlformats.org/drawingml/2006/main" xmlns:r="http://schemas.openxmlformats.org/officeDocument/2006/relationships" xmlns:p="http://schemas.openxmlformats.org/presentationml/2006/main">
+  <p:cSld>
+    <p:spTree>
+      <p:nvGrpSpPr>
+        <p:cNvPr id="1" name=""/>
+        <p:cNvGrpSpPr/>
+        <p:nvPr/>
+      </p:nvGrpSpPr>
+      <p:grpSpPr>
+        <a:xfrm>
+          <a:off x="0" y="0"/>
+          <a:ext cx="0" cy="0"/>
+          <a:chOff x="0" y="0"/>
+          <a:chExt cx="0" cy="0"/>
+        </a:xfrm>
+      </p:grpSpPr>
+      <p:sp>
+        <p:nvSpPr>
+          <p:cNvPr id="2" name="Slide Image Placeholder 1"/>
+          <p:cNvSpPr>
+            <a:spLocks noGrp="1" noRot="1" noChangeAspect="1"/>
+          </p:cNvSpPr>
+          <p:nvPr>
+            <p:ph type="sldImg"/>
+          </p:nvPr>
+        </p:nvSpPr>
+        <p:spPr/>
+      </p:sp>
+      <p:sp>
+        <p:nvSpPr>
+          <p:cNvPr id="3" name="Notes Placeholder 2"/>
+          <p:cNvSpPr>
+            <a:spLocks noGrp="1"/>
+          </p:cNvSpPr>
+          <p:nvPr>
+            <p:ph type="body" idx="1"/>
+          </p:nvPr>
+        </p:nvSpPr>
+        <p:spPr/>
+        <p:txBody>
+          <a:bodyPr/>
+          <a:lstStyle/>
+          <a:p>
+            <a:r>
+              <a:rPr lang="en-US" dirty="0" smtClean="0"/>
+              <a:t>[BACKCOLOR=#FFFFFF]</a:t>
+            </a:r>
+            <a:endParaRPr lang="en-US" dirty="0"/>
+          </a:p>
+        </p:txBody>
+      </p:sp>
+      <p:sp>
+        <p:nvSpPr>
+          <p:cNvPr id="4" name="Slide Number Placeholder 3"/>
+          <p:cNvSpPr>
+            <a:spLocks noGrp="1"/>
+          </p:cNvSpPr>
+          <p:nvPr>
+            <p:ph type="sldNum" sz="quarter" idx="10"/>
+          </p:nvPr>
+        </p:nvSpPr>
+        <p:spPr/>
+        <p:txBody>
+          <a:bodyPr/>
+          <a:lstStyle/>
+          <a:p>
+            <a:fld id="{FD4630FF-7EAB-466A-9F54-35D39D4AE102}" type="slidenum">
+              <a:rPr lang="en-US" smtClean="0"/>
+              <a:t>1</a:t>
+            </a:fld>
+            <a:endParaRPr lang="en-US"/>
+          </a:p>
+        </p:txBody>
+      </p:sp>
+    </p:spTree>
+    <p:extLst>
+      <p:ext uri="{BB962C8B-B14F-4D97-AF65-F5344CB8AC3E}">
+        <p14:creationId xmlns:p14="http://schemas.microsoft.com/office/powerpoint/2010/main" val="118701953"/>
+      </p:ext>
+    </p:extLst>
+  </p:cSld>
+  <p:clrMapOvr>
+    <a:masterClrMapping/>
+  </p:clrMapOvr>
+</p:notes>
 </file>
 
 <file path=ppt/slideLayouts/slideLayout1.xml><?xml version="1.0" encoding="utf-8"?>
@@ -308,7 +754,7 @@
           <a:p>
             <a:fld id="{400E5944-F18F-4AFE-ADBC-74FE20CD496B}" type="slidenum">
               <a:rPr lang="es-ES" smtClean="0"/>
-              <a:t>‹Nº›</a:t>
+              <a:t>‹#›</a:t>
             </a:fld>
             <a:endParaRPr lang="es-ES"/>
           </a:p>
@@ -506,7 +952,7 @@
           <a:p>
             <a:fld id="{400E5944-F18F-4AFE-ADBC-74FE20CD496B}" type="slidenum">
               <a:rPr lang="es-ES" smtClean="0"/>
-              <a:t>‹Nº›</a:t>
+              <a:t>‹#›</a:t>
             </a:fld>
             <a:endParaRPr lang="es-ES"/>
           </a:p>
@@ -714,7 +1160,7 @@
           <a:p>
             <a:fld id="{400E5944-F18F-4AFE-ADBC-74FE20CD496B}" type="slidenum">
               <a:rPr lang="es-ES" smtClean="0"/>
-              <a:t>‹Nº›</a:t>
+              <a:t>‹#›</a:t>
             </a:fld>
             <a:endParaRPr lang="es-ES"/>
           </a:p>
@@ -912,7 +1358,7 @@
           <a:p>
             <a:fld id="{400E5944-F18F-4AFE-ADBC-74FE20CD496B}" type="slidenum">
               <a:rPr lang="es-ES" smtClean="0"/>
-              <a:t>‹Nº›</a:t>
+              <a:t>‹#›</a:t>
             </a:fld>
             <a:endParaRPr lang="es-ES"/>
           </a:p>
@@ -1187,7 +1633,7 @@
           <a:p>
             <a:fld id="{400E5944-F18F-4AFE-ADBC-74FE20CD496B}" type="slidenum">
               <a:rPr lang="es-ES" smtClean="0"/>
-              <a:t>‹Nº›</a:t>
+              <a:t>‹#›</a:t>
             </a:fld>
             <a:endParaRPr lang="es-ES"/>
           </a:p>
@@ -1452,7 +1898,7 @@
           <a:p>
             <a:fld id="{400E5944-F18F-4AFE-ADBC-74FE20CD496B}" type="slidenum">
               <a:rPr lang="es-ES" smtClean="0"/>
-              <a:t>‹Nº›</a:t>
+              <a:t>‹#›</a:t>
             </a:fld>
             <a:endParaRPr lang="es-ES"/>
           </a:p>
@@ -1864,7 +2310,7 @@
           <a:p>
             <a:fld id="{400E5944-F18F-4AFE-ADBC-74FE20CD496B}" type="slidenum">
               <a:rPr lang="es-ES" smtClean="0"/>
-              <a:t>‹Nº›</a:t>
+              <a:t>‹#›</a:t>
             </a:fld>
             <a:endParaRPr lang="es-ES"/>
           </a:p>
@@ -2005,7 +2451,7 @@
           <a:p>
             <a:fld id="{400E5944-F18F-4AFE-ADBC-74FE20CD496B}" type="slidenum">
               <a:rPr lang="es-ES" smtClean="0"/>
-              <a:t>‹Nº›</a:t>
+              <a:t>‹#›</a:t>
             </a:fld>
             <a:endParaRPr lang="es-ES"/>
           </a:p>
@@ -2118,7 +2564,7 @@
           <a:p>
             <a:fld id="{400E5944-F18F-4AFE-ADBC-74FE20CD496B}" type="slidenum">
               <a:rPr lang="es-ES" smtClean="0"/>
-              <a:t>‹Nº›</a:t>
+              <a:t>‹#›</a:t>
             </a:fld>
             <a:endParaRPr lang="es-ES"/>
           </a:p>
@@ -2429,7 +2875,7 @@
           <a:p>
             <a:fld id="{400E5944-F18F-4AFE-ADBC-74FE20CD496B}" type="slidenum">
               <a:rPr lang="es-ES" smtClean="0"/>
-              <a:t>‹Nº›</a:t>
+              <a:t>‹#›</a:t>
             </a:fld>
             <a:endParaRPr lang="es-ES"/>
           </a:p>
@@ -2717,7 +3163,7 @@
           <a:p>
             <a:fld id="{400E5944-F18F-4AFE-ADBC-74FE20CD496B}" type="slidenum">
               <a:rPr lang="es-ES" smtClean="0"/>
-              <a:t>‹Nº›</a:t>
+              <a:t>‹#›</a:t>
             </a:fld>
             <a:endParaRPr lang="es-ES"/>
           </a:p>
@@ -2994,7 +3440,7 @@
           <a:p>
             <a:fld id="{400E5944-F18F-4AFE-ADBC-74FE20CD496B}" type="slidenum">
               <a:rPr lang="es-ES" smtClean="0"/>
-              <a:t>‹Nº›</a:t>
+              <a:t>‹#›</a:t>
             </a:fld>
             <a:endParaRPr lang="es-ES"/>
           </a:p>
@@ -3323,57 +3769,7 @@
       </p:grpSpPr>
       <p:sp>
         <p:nvSpPr>
-          <p:cNvPr id="2" name="Título 1">
-            <a:extLst>
-              <a:ext uri="{FF2B5EF4-FFF2-40B4-BE49-F238E27FC236}">
-                <a16:creationId xmlns:a16="http://schemas.microsoft.com/office/drawing/2014/main" id="{FF61AC1C-F7AF-4203-A7E4-59DCA39E5B1E}"/>
-              </a:ext>
-            </a:extLst>
-          </p:cNvPr>
-          <p:cNvSpPr>
-            <a:spLocks noGrp="1"/>
-          </p:cNvSpPr>
-          <p:nvPr>
-            <p:ph type="ctrTitle"/>
-          </p:nvPr>
-        </p:nvSpPr>
-        <p:spPr/>
-        <p:txBody>
-          <a:bodyPr/>
-          <a:lstStyle/>
-          <a:p>
-            <a:endParaRPr lang="es-ES"/>
-          </a:p>
-        </p:txBody>
-      </p:sp>
-      <p:sp>
-        <p:nvSpPr>
-          <p:cNvPr id="3" name="Subtítulo 2">
-            <a:extLst>
-              <a:ext uri="{FF2B5EF4-FFF2-40B4-BE49-F238E27FC236}">
-                <a16:creationId xmlns:a16="http://schemas.microsoft.com/office/drawing/2014/main" id="{95067AC7-6272-4F0A-9868-EC781DA2943C}"/>
-              </a:ext>
-            </a:extLst>
-          </p:cNvPr>
-          <p:cNvSpPr>
-            <a:spLocks noGrp="1"/>
-          </p:cNvSpPr>
-          <p:nvPr>
-            <p:ph type="subTitle" idx="1"/>
-          </p:nvPr>
-        </p:nvSpPr>
-        <p:spPr/>
-        <p:txBody>
-          <a:bodyPr/>
-          <a:lstStyle/>
-          <a:p>
-            <a:endParaRPr lang="es-ES"/>
-          </a:p>
-        </p:txBody>
-      </p:sp>
-      <p:sp>
-        <p:nvSpPr>
-          <p:cNvPr id="4" name="Rectángulo 3">
+          <p:cNvPr id="9" name="Rectángulo 3">
             <a:extLst>
               <a:ext uri="{FF2B5EF4-FFF2-40B4-BE49-F238E27FC236}">
                 <a16:creationId xmlns:a16="http://schemas.microsoft.com/office/drawing/2014/main" id="{C2FF6423-A102-4CDD-8F90-7BE219F72F09}"/>
@@ -3385,12 +3781,15 @@
         </p:nvSpPr>
         <p:spPr>
           <a:xfrm>
-            <a:off x="914400" y="603682"/>
-            <a:ext cx="4048217" cy="1944209"/>
+            <a:off x="0" y="6257637"/>
+            <a:ext cx="7715400" cy="600363"/>
           </a:xfrm>
           <a:prstGeom prst="rect">
             <a:avLst/>
           </a:prstGeom>
+          <a:solidFill>
+            <a:schemeClr val="accent3"/>
+          </a:solidFill>
         </p:spPr>
         <p:style>
           <a:lnRef idx="2">
@@ -3413,7 +3812,210 @@
           <a:lstStyle/>
           <a:p>
             <a:pPr algn="ctr"/>
-            <a:endParaRPr lang="es-ES"/>
+            <a:endParaRPr lang="es-ES" dirty="0"/>
+          </a:p>
+        </p:txBody>
+      </p:sp>
+      <p:sp>
+        <p:nvSpPr>
+          <p:cNvPr id="8" name="Rectángulo 3">
+            <a:extLst>
+              <a:ext uri="{FF2B5EF4-FFF2-40B4-BE49-F238E27FC236}">
+                <a16:creationId xmlns:a16="http://schemas.microsoft.com/office/drawing/2014/main" id="{C2FF6423-A102-4CDD-8F90-7BE219F72F09}"/>
+              </a:ext>
+            </a:extLst>
+          </p:cNvPr>
+          <p:cNvSpPr/>
+          <p:nvPr/>
+        </p:nvSpPr>
+        <p:spPr>
+          <a:xfrm>
+            <a:off x="1393239" y="2878754"/>
+            <a:ext cx="952797" cy="3409013"/>
+          </a:xfrm>
+          <a:prstGeom prst="rect">
+            <a:avLst/>
+          </a:prstGeom>
+          <a:solidFill>
+            <a:schemeClr val="accent6">
+              <a:lumMod val="75000"/>
+            </a:schemeClr>
+          </a:solidFill>
+        </p:spPr>
+        <p:style>
+          <a:lnRef idx="2">
+            <a:schemeClr val="accent1">
+              <a:shade val="50000"/>
+            </a:schemeClr>
+          </a:lnRef>
+          <a:fillRef idx="1">
+            <a:schemeClr val="accent1"/>
+          </a:fillRef>
+          <a:effectRef idx="0">
+            <a:schemeClr val="accent1"/>
+          </a:effectRef>
+          <a:fontRef idx="minor">
+            <a:schemeClr val="lt1"/>
+          </a:fontRef>
+        </p:style>
+        <p:txBody>
+          <a:bodyPr rtlCol="0" anchor="ctr"/>
+          <a:lstStyle/>
+          <a:p>
+            <a:pPr algn="ctr"/>
+            <a:endParaRPr lang="es-ES" dirty="0"/>
+          </a:p>
+        </p:txBody>
+      </p:sp>
+      <p:sp>
+        <p:nvSpPr>
+          <p:cNvPr id="6" name="Rectángulo 3">
+            <a:extLst>
+              <a:ext uri="{FF2B5EF4-FFF2-40B4-BE49-F238E27FC236}">
+                <a16:creationId xmlns:a16="http://schemas.microsoft.com/office/drawing/2014/main" id="{C2FF6423-A102-4CDD-8F90-7BE219F72F09}"/>
+              </a:ext>
+            </a:extLst>
+          </p:cNvPr>
+          <p:cNvSpPr/>
+          <p:nvPr/>
+        </p:nvSpPr>
+        <p:spPr>
+          <a:xfrm>
+            <a:off x="8331200" y="2198255"/>
+            <a:ext cx="3158835" cy="4089512"/>
+          </a:xfrm>
+          <a:prstGeom prst="rect">
+            <a:avLst/>
+          </a:prstGeom>
+          <a:solidFill>
+            <a:schemeClr val="accent2">
+              <a:lumMod val="75000"/>
+            </a:schemeClr>
+          </a:solidFill>
+        </p:spPr>
+        <p:style>
+          <a:lnRef idx="2">
+            <a:schemeClr val="accent1">
+              <a:shade val="50000"/>
+            </a:schemeClr>
+          </a:lnRef>
+          <a:fillRef idx="1">
+            <a:schemeClr val="accent1"/>
+          </a:fillRef>
+          <a:effectRef idx="0">
+            <a:schemeClr val="accent1"/>
+          </a:effectRef>
+          <a:fontRef idx="minor">
+            <a:schemeClr val="lt1"/>
+          </a:fontRef>
+        </p:style>
+        <p:txBody>
+          <a:bodyPr rtlCol="0" anchor="ctr"/>
+          <a:lstStyle/>
+          <a:p>
+            <a:pPr algn="ctr"/>
+            <a:endParaRPr lang="es-ES" dirty="0"/>
+          </a:p>
+        </p:txBody>
+      </p:sp>
+      <p:sp>
+        <p:nvSpPr>
+          <p:cNvPr id="5" name="Rectángulo 3">
+            <a:extLst>
+              <a:ext uri="{FF2B5EF4-FFF2-40B4-BE49-F238E27FC236}">
+                <a16:creationId xmlns:a16="http://schemas.microsoft.com/office/drawing/2014/main" id="{C2FF6423-A102-4CDD-8F90-7BE219F72F09}"/>
+              </a:ext>
+            </a:extLst>
+          </p:cNvPr>
+          <p:cNvSpPr/>
+          <p:nvPr/>
+        </p:nvSpPr>
+        <p:spPr>
+          <a:xfrm>
+            <a:off x="575821" y="359423"/>
+            <a:ext cx="6804034" cy="3409013"/>
+          </a:xfrm>
+          <a:prstGeom prst="rect">
+            <a:avLst/>
+          </a:prstGeom>
+          <a:solidFill>
+            <a:schemeClr val="accent5">
+              <a:lumMod val="60000"/>
+              <a:lumOff val="40000"/>
+            </a:schemeClr>
+          </a:solidFill>
+        </p:spPr>
+        <p:style>
+          <a:lnRef idx="2">
+            <a:schemeClr val="accent1">
+              <a:shade val="50000"/>
+            </a:schemeClr>
+          </a:lnRef>
+          <a:fillRef idx="1">
+            <a:schemeClr val="accent1"/>
+          </a:fillRef>
+          <a:effectRef idx="0">
+            <a:schemeClr val="accent1"/>
+          </a:effectRef>
+          <a:fontRef idx="minor">
+            <a:schemeClr val="lt1"/>
+          </a:fontRef>
+        </p:style>
+        <p:txBody>
+          <a:bodyPr rtlCol="0" anchor="ctr"/>
+          <a:lstStyle/>
+          <a:p>
+            <a:pPr algn="ctr"/>
+            <a:endParaRPr lang="es-ES" dirty="0"/>
+          </a:p>
+        </p:txBody>
+      </p:sp>
+      <p:sp>
+        <p:nvSpPr>
+          <p:cNvPr id="7" name="Rectángulo 3">
+            <a:extLst>
+              <a:ext uri="{FF2B5EF4-FFF2-40B4-BE49-F238E27FC236}">
+                <a16:creationId xmlns:a16="http://schemas.microsoft.com/office/drawing/2014/main" id="{C2FF6423-A102-4CDD-8F90-7BE219F72F09}"/>
+              </a:ext>
+            </a:extLst>
+          </p:cNvPr>
+          <p:cNvSpPr/>
+          <p:nvPr/>
+        </p:nvSpPr>
+        <p:spPr>
+          <a:xfrm>
+            <a:off x="5960618" y="1052945"/>
+            <a:ext cx="4088546" cy="1868634"/>
+          </a:xfrm>
+          <a:prstGeom prst="rect">
+            <a:avLst/>
+          </a:prstGeom>
+          <a:solidFill>
+            <a:srgbClr val="7030A0"/>
+          </a:solidFill>
+        </p:spPr>
+        <p:style>
+          <a:lnRef idx="2">
+            <a:schemeClr val="accent1">
+              <a:shade val="50000"/>
+            </a:schemeClr>
+          </a:lnRef>
+          <a:fillRef idx="1">
+            <a:schemeClr val="accent1"/>
+          </a:fillRef>
+          <a:effectRef idx="0">
+            <a:schemeClr val="accent1"/>
+          </a:effectRef>
+          <a:fontRef idx="minor">
+            <a:schemeClr val="lt1"/>
+          </a:fontRef>
+        </p:style>
+        <p:txBody>
+          <a:bodyPr rtlCol="0" anchor="ctr"/>
+          <a:lstStyle/>
+          <a:p>
+            <a:pPr algn="ctr"/>
+            <a:endParaRPr lang="es-ES" dirty="0"/>
           </a:p>
         </p:txBody>
       </p:sp>
@@ -3723,4 +4325,265 @@
     </a:ext>
   </a:extLst>
 </a:theme>
+</file>
+
+<file path=ppt/theme/theme2.xml><?xml version="1.0" encoding="utf-8"?>
+<a:theme xmlns:a="http://schemas.openxmlformats.org/drawingml/2006/main" name="Office Theme">
+  <a:themeElements>
+    <a:clrScheme name="Office">
+      <a:dk1>
+        <a:sysClr val="windowText" lastClr="000000"/>
+      </a:dk1>
+      <a:lt1>
+        <a:sysClr val="window" lastClr="FFFFFF"/>
+      </a:lt1>
+      <a:dk2>
+        <a:srgbClr val="44546A"/>
+      </a:dk2>
+      <a:lt2>
+        <a:srgbClr val="E7E6E6"/>
+      </a:lt2>
+      <a:accent1>
+        <a:srgbClr val="5B9BD5"/>
+      </a:accent1>
+      <a:accent2>
+        <a:srgbClr val="ED7D31"/>
+      </a:accent2>
+      <a:accent3>
+        <a:srgbClr val="A5A5A5"/>
+      </a:accent3>
+      <a:accent4>
+        <a:srgbClr val="FFC000"/>
+      </a:accent4>
+      <a:accent5>
+        <a:srgbClr val="4472C4"/>
+      </a:accent5>
+      <a:accent6>
+        <a:srgbClr val="70AD47"/>
+      </a:accent6>
+      <a:hlink>
+        <a:srgbClr val="0563C1"/>
+      </a:hlink>
+      <a:folHlink>
+        <a:srgbClr val="954F72"/>
+      </a:folHlink>
+    </a:clrScheme>
+    <a:fontScheme name="Office">
+      <a:majorFont>
+        <a:latin typeface="Calibri Light" panose="020F0302020204030204"/>
+        <a:ea typeface=""/>
+        <a:cs typeface=""/>
+        <a:font script="Jpan" typeface="游ゴシック Light"/>
+        <a:font script="Hang" typeface="맑은 고딕"/>
+        <a:font script="Hans" typeface="等线 Light"/>
+        <a:font script="Hant" typeface="新細明體"/>
+        <a:font script="Arab" typeface="Times New Roman"/>
+        <a:font script="Hebr" typeface="Times New Roman"/>
+        <a:font script="Thai" typeface="Angsana New"/>
+        <a:font script="Ethi" typeface="Nyala"/>
+        <a:font script="Beng" typeface="Vrinda"/>
+        <a:font script="Gujr" typeface="Shruti"/>
+        <a:font script="Khmr" typeface="MoolBoran"/>
+        <a:font script="Knda" typeface="Tunga"/>
+        <a:font script="Guru" typeface="Raavi"/>
+        <a:font script="Cans" typeface="Euphemia"/>
+        <a:font script="Cher" typeface="Plantagenet Cherokee"/>
+        <a:font script="Yiii" typeface="Microsoft Yi Baiti"/>
+        <a:font script="Tibt" typeface="Microsoft Himalaya"/>
+        <a:font script="Thaa" typeface="MV Boli"/>
+        <a:font script="Deva" typeface="Mangal"/>
+        <a:font script="Telu" typeface="Gautami"/>
+        <a:font script="Taml" typeface="Latha"/>
+        <a:font script="Syrc" typeface="Estrangelo Edessa"/>
+        <a:font script="Orya" typeface="Kalinga"/>
+        <a:font script="Mlym" typeface="Kartika"/>
+        <a:font script="Laoo" typeface="DokChampa"/>
+        <a:font script="Sinh" typeface="Iskoola Pota"/>
+        <a:font script="Mong" typeface="Mongolian Baiti"/>
+        <a:font script="Viet" typeface="Times New Roman"/>
+        <a:font script="Uigh" typeface="Microsoft Uighur"/>
+        <a:font script="Geor" typeface="Sylfaen"/>
+      </a:majorFont>
+      <a:minorFont>
+        <a:latin typeface="Calibri" panose="020F0502020204030204"/>
+        <a:ea typeface=""/>
+        <a:cs typeface=""/>
+        <a:font script="Jpan" typeface="游ゴシック"/>
+        <a:font script="Hang" typeface="맑은 고딕"/>
+        <a:font script="Hans" typeface="等线"/>
+        <a:font script="Hant" typeface="新細明體"/>
+        <a:font script="Arab" typeface="Arial"/>
+        <a:font script="Hebr" typeface="Arial"/>
+        <a:font script="Thai" typeface="Cordia New"/>
+        <a:font script="Ethi" typeface="Nyala"/>
+        <a:font script="Beng" typeface="Vrinda"/>
+        <a:font script="Gujr" typeface="Shruti"/>
+        <a:font script="Khmr" typeface="DaunPenh"/>
+        <a:font script="Knda" typeface="Tunga"/>
+        <a:font script="Guru" typeface="Raavi"/>
+        <a:font script="Cans" typeface="Euphemia"/>
+        <a:font script="Cher" typeface="Plantagenet Cherokee"/>
+        <a:font script="Yiii" typeface="Microsoft Yi Baiti"/>
+        <a:font script="Tibt" typeface="Microsoft Himalaya"/>
+        <a:font script="Thaa" typeface="MV Boli"/>
+        <a:font script="Deva" typeface="Mangal"/>
+        <a:font script="Telu" typeface="Gautami"/>
+        <a:font script="Taml" typeface="Latha"/>
+        <a:font script="Syrc" typeface="Estrangelo Edessa"/>
+        <a:font script="Orya" typeface="Kalinga"/>
+        <a:font script="Mlym" typeface="Kartika"/>
+        <a:font script="Laoo" typeface="DokChampa"/>
+        <a:font script="Sinh" typeface="Iskoola Pota"/>
+        <a:font script="Mong" typeface="Mongolian Baiti"/>
+        <a:font script="Viet" typeface="Arial"/>
+        <a:font script="Uigh" typeface="Microsoft Uighur"/>
+        <a:font script="Geor" typeface="Sylfaen"/>
+      </a:minorFont>
+    </a:fontScheme>
+    <a:fmtScheme name="Office">
+      <a:fillStyleLst>
+        <a:solidFill>
+          <a:schemeClr val="phClr"/>
+        </a:solidFill>
+        <a:gradFill rotWithShape="1">
+          <a:gsLst>
+            <a:gs pos="0">
+              <a:schemeClr val="phClr">
+                <a:lumMod val="110000"/>
+                <a:satMod val="105000"/>
+                <a:tint val="67000"/>
+              </a:schemeClr>
+            </a:gs>
+            <a:gs pos="50000">
+              <a:schemeClr val="phClr">
+                <a:lumMod val="105000"/>
+                <a:satMod val="103000"/>
+                <a:tint val="73000"/>
+              </a:schemeClr>
+            </a:gs>
+            <a:gs pos="100000">
+              <a:schemeClr val="phClr">
+                <a:lumMod val="105000"/>
+                <a:satMod val="109000"/>
+                <a:tint val="81000"/>
+              </a:schemeClr>
+            </a:gs>
+          </a:gsLst>
+          <a:lin ang="5400000" scaled="0"/>
+        </a:gradFill>
+        <a:gradFill rotWithShape="1">
+          <a:gsLst>
+            <a:gs pos="0">
+              <a:schemeClr val="phClr">
+                <a:satMod val="103000"/>
+                <a:lumMod val="102000"/>
+                <a:tint val="94000"/>
+              </a:schemeClr>
+            </a:gs>
+            <a:gs pos="50000">
+              <a:schemeClr val="phClr">
+                <a:satMod val="110000"/>
+                <a:lumMod val="100000"/>
+                <a:shade val="100000"/>
+              </a:schemeClr>
+            </a:gs>
+            <a:gs pos="100000">
+              <a:schemeClr val="phClr">
+                <a:lumMod val="99000"/>
+                <a:satMod val="120000"/>
+                <a:shade val="78000"/>
+              </a:schemeClr>
+            </a:gs>
+          </a:gsLst>
+          <a:lin ang="5400000" scaled="0"/>
+        </a:gradFill>
+      </a:fillStyleLst>
+      <a:lnStyleLst>
+        <a:ln w="6350" cap="flat" cmpd="sng" algn="ctr">
+          <a:solidFill>
+            <a:schemeClr val="phClr"/>
+          </a:solidFill>
+          <a:prstDash val="solid"/>
+          <a:miter lim="800000"/>
+        </a:ln>
+        <a:ln w="12700" cap="flat" cmpd="sng" algn="ctr">
+          <a:solidFill>
+            <a:schemeClr val="phClr"/>
+          </a:solidFill>
+          <a:prstDash val="solid"/>
+          <a:miter lim="800000"/>
+        </a:ln>
+        <a:ln w="19050" cap="flat" cmpd="sng" algn="ctr">
+          <a:solidFill>
+            <a:schemeClr val="phClr"/>
+          </a:solidFill>
+          <a:prstDash val="solid"/>
+          <a:miter lim="800000"/>
+        </a:ln>
+      </a:lnStyleLst>
+      <a:effectStyleLst>
+        <a:effectStyle>
+          <a:effectLst/>
+        </a:effectStyle>
+        <a:effectStyle>
+          <a:effectLst/>
+        </a:effectStyle>
+        <a:effectStyle>
+          <a:effectLst>
+            <a:outerShdw blurRad="57150" dist="19050" dir="5400000" algn="ctr" rotWithShape="0">
+              <a:srgbClr val="000000">
+                <a:alpha val="63000"/>
+              </a:srgbClr>
+            </a:outerShdw>
+          </a:effectLst>
+        </a:effectStyle>
+      </a:effectStyleLst>
+      <a:bgFillStyleLst>
+        <a:solidFill>
+          <a:schemeClr val="phClr"/>
+        </a:solidFill>
+        <a:solidFill>
+          <a:schemeClr val="phClr">
+            <a:tint val="95000"/>
+            <a:satMod val="170000"/>
+          </a:schemeClr>
+        </a:solidFill>
+        <a:gradFill rotWithShape="1">
+          <a:gsLst>
+            <a:gs pos="0">
+              <a:schemeClr val="phClr">
+                <a:tint val="93000"/>
+                <a:satMod val="150000"/>
+                <a:shade val="98000"/>
+                <a:lumMod val="102000"/>
+              </a:schemeClr>
+            </a:gs>
+            <a:gs pos="50000">
+              <a:schemeClr val="phClr">
+                <a:tint val="98000"/>
+                <a:satMod val="130000"/>
+                <a:shade val="90000"/>
+                <a:lumMod val="103000"/>
+              </a:schemeClr>
+            </a:gs>
+            <a:gs pos="100000">
+              <a:schemeClr val="phClr">
+                <a:shade val="63000"/>
+                <a:satMod val="120000"/>
+              </a:schemeClr>
+            </a:gs>
+          </a:gsLst>
+          <a:lin ang="5400000" scaled="0"/>
+        </a:gradFill>
+      </a:bgFillStyleLst>
+    </a:fmtScheme>
+  </a:themeElements>
+  <a:objectDefaults/>
+  <a:extraClrSchemeLst/>
+  <a:extLst>
+    <a:ext uri="{05A4C25C-085E-4340-85A3-A5531E510DB2}">
+      <thm15:themeFamily xmlns:thm15="http://schemas.microsoft.com/office/thememl/2012/main" name="Office Theme" id="{62F939B6-93AF-4DB8-9C6B-D6C7DFDC589F}" vid="{4A3C46E8-61CC-4603-A589-7422A47A8E4A}"/>
+    </a:ext>
+  </a:extLst>
+</a:theme>
 </file>
</xml_diff>

<commit_message>
Added Transparency, borders and pictures (with compression)
</commit_message>
<xml_diff>
--- a/VerilogExample/PPVerilogEngine/main.pptx
+++ b/VerilogExample/PPVerilogEngine/main.pptx
@@ -2,21 +2,24 @@
 <file path=ppt/presentation.xml><?xml version="1.0" encoding="utf-8"?>
 <p:presentation xmlns:a="http://schemas.openxmlformats.org/drawingml/2006/main" xmlns:r="http://schemas.openxmlformats.org/officeDocument/2006/relationships" xmlns:p="http://schemas.openxmlformats.org/presentationml/2006/main" saveSubsetFonts="1">
   <p:sldMasterIdLst>
-    <p:sldMasterId id="2147483648" r:id="rId1"/>
+    <p:sldMasterId id="2147483660" r:id="rId1"/>
   </p:sldMasterIdLst>
   <p:notesMasterIdLst>
-    <p:notesMasterId r:id="rId3"/>
+    <p:notesMasterId r:id="rId6"/>
   </p:notesMasterIdLst>
   <p:sldIdLst>
-    <p:sldId id="256" r:id="rId2"/>
+    <p:sldId id="257" r:id="rId2"/>
+    <p:sldId id="256" r:id="rId3"/>
+    <p:sldId id="258" r:id="rId4"/>
+    <p:sldId id="259" r:id="rId5"/>
   </p:sldIdLst>
-  <p:sldSz cx="12192000" cy="6858000"/>
+  <p:sldSz cx="9144000" cy="6858000" type="screen4x3"/>
   <p:notesSz cx="6858000" cy="9144000"/>
   <p:defaultTextStyle>
     <a:defPPr>
-      <a:defRPr lang="es-ES"/>
+      <a:defRPr lang="en-US"/>
     </a:defPPr>
-    <a:lvl1pPr marL="0" algn="l" defTabSz="914400" rtl="0" eaLnBrk="1" latinLnBrk="0" hangingPunct="1">
+    <a:lvl1pPr marL="0" algn="l" defTabSz="457200" rtl="0" eaLnBrk="1" latinLnBrk="0" hangingPunct="1">
       <a:defRPr sz="1800" kern="1200">
         <a:solidFill>
           <a:schemeClr val="tx1"/>
@@ -26,7 +29,7 @@
         <a:cs typeface="+mn-cs"/>
       </a:defRPr>
     </a:lvl1pPr>
-    <a:lvl2pPr marL="457200" algn="l" defTabSz="914400" rtl="0" eaLnBrk="1" latinLnBrk="0" hangingPunct="1">
+    <a:lvl2pPr marL="457200" algn="l" defTabSz="457200" rtl="0" eaLnBrk="1" latinLnBrk="0" hangingPunct="1">
       <a:defRPr sz="1800" kern="1200">
         <a:solidFill>
           <a:schemeClr val="tx1"/>
@@ -36,7 +39,7 @@
         <a:cs typeface="+mn-cs"/>
       </a:defRPr>
     </a:lvl2pPr>
-    <a:lvl3pPr marL="914400" algn="l" defTabSz="914400" rtl="0" eaLnBrk="1" latinLnBrk="0" hangingPunct="1">
+    <a:lvl3pPr marL="914400" algn="l" defTabSz="457200" rtl="0" eaLnBrk="1" latinLnBrk="0" hangingPunct="1">
       <a:defRPr sz="1800" kern="1200">
         <a:solidFill>
           <a:schemeClr val="tx1"/>
@@ -46,7 +49,7 @@
         <a:cs typeface="+mn-cs"/>
       </a:defRPr>
     </a:lvl3pPr>
-    <a:lvl4pPr marL="1371600" algn="l" defTabSz="914400" rtl="0" eaLnBrk="1" latinLnBrk="0" hangingPunct="1">
+    <a:lvl4pPr marL="1371600" algn="l" defTabSz="457200" rtl="0" eaLnBrk="1" latinLnBrk="0" hangingPunct="1">
       <a:defRPr sz="1800" kern="1200">
         <a:solidFill>
           <a:schemeClr val="tx1"/>
@@ -56,7 +59,7 @@
         <a:cs typeface="+mn-cs"/>
       </a:defRPr>
     </a:lvl4pPr>
-    <a:lvl5pPr marL="1828800" algn="l" defTabSz="914400" rtl="0" eaLnBrk="1" latinLnBrk="0" hangingPunct="1">
+    <a:lvl5pPr marL="1828800" algn="l" defTabSz="457200" rtl="0" eaLnBrk="1" latinLnBrk="0" hangingPunct="1">
       <a:defRPr sz="1800" kern="1200">
         <a:solidFill>
           <a:schemeClr val="tx1"/>
@@ -66,7 +69,7 @@
         <a:cs typeface="+mn-cs"/>
       </a:defRPr>
     </a:lvl5pPr>
-    <a:lvl6pPr marL="2286000" algn="l" defTabSz="914400" rtl="0" eaLnBrk="1" latinLnBrk="0" hangingPunct="1">
+    <a:lvl6pPr marL="2286000" algn="l" defTabSz="457200" rtl="0" eaLnBrk="1" latinLnBrk="0" hangingPunct="1">
       <a:defRPr sz="1800" kern="1200">
         <a:solidFill>
           <a:schemeClr val="tx1"/>
@@ -76,7 +79,7 @@
         <a:cs typeface="+mn-cs"/>
       </a:defRPr>
     </a:lvl6pPr>
-    <a:lvl7pPr marL="2743200" algn="l" defTabSz="914400" rtl="0" eaLnBrk="1" latinLnBrk="0" hangingPunct="1">
+    <a:lvl7pPr marL="2743200" algn="l" defTabSz="457200" rtl="0" eaLnBrk="1" latinLnBrk="0" hangingPunct="1">
       <a:defRPr sz="1800" kern="1200">
         <a:solidFill>
           <a:schemeClr val="tx1"/>
@@ -86,7 +89,7 @@
         <a:cs typeface="+mn-cs"/>
       </a:defRPr>
     </a:lvl7pPr>
-    <a:lvl8pPr marL="3200400" algn="l" defTabSz="914400" rtl="0" eaLnBrk="1" latinLnBrk="0" hangingPunct="1">
+    <a:lvl8pPr marL="3200400" algn="l" defTabSz="457200" rtl="0" eaLnBrk="1" latinLnBrk="0" hangingPunct="1">
       <a:defRPr sz="1800" kern="1200">
         <a:solidFill>
           <a:schemeClr val="tx1"/>
@@ -96,7 +99,7 @@
         <a:cs typeface="+mn-cs"/>
       </a:defRPr>
     </a:lvl8pPr>
-    <a:lvl9pPr marL="3657600" algn="l" defTabSz="914400" rtl="0" eaLnBrk="1" latinLnBrk="0" hangingPunct="1">
+    <a:lvl9pPr marL="3657600" algn="l" defTabSz="457200" rtl="0" eaLnBrk="1" latinLnBrk="0" hangingPunct="1">
       <a:defRPr sz="1800" kern="1200">
         <a:solidFill>
           <a:schemeClr val="tx1"/>
@@ -197,7 +200,7 @@
           <a:p>
             <a:fld id="{01A1BE80-B383-48BF-8DCC-287BC5926A7A}" type="datetimeFigureOut">
               <a:rPr lang="en-US" smtClean="0"/>
-              <a:t>10/10/2018</a:t>
+              <a:t>10/11/2018</a:t>
             </a:fld>
             <a:endParaRPr lang="en-US"/>
           </a:p>
@@ -215,8 +218,8 @@
         </p:nvSpPr>
         <p:spPr>
           <a:xfrm>
-            <a:off x="685800" y="1143000"/>
-            <a:ext cx="5486400" cy="3086100"/>
+            <a:off x="1371600" y="1143000"/>
+            <a:ext cx="4114800" cy="3086100"/>
           </a:xfrm>
           <a:prstGeom prst="rect">
             <a:avLst/>
@@ -261,38 +264,37 @@
           <a:p>
             <a:pPr lvl="0"/>
             <a:r>
-              <a:rPr lang="en-US" smtClean="0"/>
+              <a:rPr lang="en-US"/>
               <a:t>Edit Master text styles</a:t>
             </a:r>
           </a:p>
           <a:p>
             <a:pPr lvl="1"/>
             <a:r>
-              <a:rPr lang="en-US" smtClean="0"/>
+              <a:rPr lang="en-US"/>
               <a:t>Second level</a:t>
             </a:r>
           </a:p>
           <a:p>
             <a:pPr lvl="2"/>
             <a:r>
-              <a:rPr lang="en-US" smtClean="0"/>
+              <a:rPr lang="en-US"/>
               <a:t>Third level</a:t>
             </a:r>
           </a:p>
           <a:p>
             <a:pPr lvl="3"/>
             <a:r>
-              <a:rPr lang="en-US" smtClean="0"/>
+              <a:rPr lang="en-US"/>
               <a:t>Fourth level</a:t>
             </a:r>
           </a:p>
           <a:p>
             <a:pPr lvl="4"/>
             <a:r>
-              <a:rPr lang="en-US" smtClean="0"/>
+              <a:rPr lang="en-US"/>
               <a:t>Fifth level</a:t>
             </a:r>
-            <a:endParaRPr lang="en-US"/>
           </a:p>
         </p:txBody>
       </p:sp>
@@ -356,7 +358,7 @@
           <a:p>
             <a:fld id="{FD4630FF-7EAB-466A-9F54-35D39D4AE102}" type="slidenum">
               <a:rPr lang="en-US" smtClean="0"/>
-              <a:t>‹#›</a:t>
+              <a:t>‹Nº›</a:t>
             </a:fld>
             <a:endParaRPr lang="en-US"/>
           </a:p>
@@ -484,7 +486,7 @@
       </p:grpSpPr>
       <p:sp>
         <p:nvSpPr>
-          <p:cNvPr id="2" name="Slide Image Placeholder 1"/>
+          <p:cNvPr id="2" name="Marcador de imagen de diapositiva 1"/>
           <p:cNvSpPr>
             <a:spLocks noGrp="1" noRot="1" noChangeAspect="1"/>
           </p:cNvSpPr>
@@ -492,39 +494,49 @@
             <p:ph type="sldImg"/>
           </p:nvPr>
         </p:nvSpPr>
+        <p:spPr>
+          <a:xfrm>
+            <a:off x="1371600" y="1143000"/>
+            <a:ext cx="4114800" cy="3086100"/>
+          </a:xfrm>
+        </p:spPr>
+      </p:sp>
+      <p:sp>
+        <p:nvSpPr>
+          <p:cNvPr id="3" name="Marcador de notas 2"/>
+          <p:cNvSpPr>
+            <a:spLocks noGrp="1"/>
+          </p:cNvSpPr>
+          <p:nvPr>
+            <p:ph type="body" idx="1"/>
+          </p:nvPr>
+        </p:nvSpPr>
         <p:spPr/>
-      </p:sp>
-      <p:sp>
-        <p:nvSpPr>
-          <p:cNvPr id="3" name="Notes Placeholder 2"/>
-          <p:cNvSpPr>
-            <a:spLocks noGrp="1"/>
-          </p:cNvSpPr>
-          <p:nvPr>
-            <p:ph type="body" idx="1"/>
-          </p:nvPr>
-        </p:nvSpPr>
-        <p:spPr/>
-        <p:txBody>
-          <a:bodyPr/>
-          <a:lstStyle/>
-          <a:p>
-            <a:r>
-              <a:rPr lang="en-US" dirty="0" smtClean="0"/>
-              <a:t>[BACKCOLOR=#FFFFFF]</a:t>
-            </a:r>
-            <a:endParaRPr lang="en-US" dirty="0"/>
-          </a:p>
-        </p:txBody>
-      </p:sp>
-      <p:sp>
-        <p:nvSpPr>
-          <p:cNvPr id="4" name="Slide Number Placeholder 3"/>
-          <p:cNvSpPr>
-            <a:spLocks noGrp="1"/>
-          </p:cNvSpPr>
-          <p:nvPr>
-            <p:ph type="sldNum" sz="quarter" idx="10"/>
+        <p:txBody>
+          <a:bodyPr/>
+          <a:lstStyle/>
+          <a:p>
+            <a:r>
+              <a:rPr lang="es-ES" dirty="0"/>
+              <a:t>[BCKCOLOR=115,155,234];</a:t>
+            </a:r>
+          </a:p>
+          <a:p>
+            <a:r>
+              <a:rPr lang="es-ES" dirty="0"/>
+              <a:t>[TESTPROPERTY]</a:t>
+            </a:r>
+          </a:p>
+        </p:txBody>
+      </p:sp>
+      <p:sp>
+        <p:nvSpPr>
+          <p:cNvPr id="4" name="Marcador de número de diapositiva 3"/>
+          <p:cNvSpPr>
+            <a:spLocks noGrp="1"/>
+          </p:cNvSpPr>
+          <p:nvPr>
+            <p:ph type="sldNum" sz="quarter" idx="5"/>
           </p:nvPr>
         </p:nvSpPr>
         <p:spPr/>
@@ -543,7 +555,191 @@
     </p:spTree>
     <p:extLst>
       <p:ext uri="{BB962C8B-B14F-4D97-AF65-F5344CB8AC3E}">
+        <p14:creationId xmlns:p14="http://schemas.microsoft.com/office/powerpoint/2010/main" val="2590234679"/>
+      </p:ext>
+    </p:extLst>
+  </p:cSld>
+  <p:clrMapOvr>
+    <a:masterClrMapping/>
+  </p:clrMapOvr>
+</p:notes>
+</file>
+
+<file path=ppt/notesSlides/notesSlide2.xml><?xml version="1.0" encoding="utf-8"?>
+<p:notes xmlns:a="http://schemas.openxmlformats.org/drawingml/2006/main" xmlns:r="http://schemas.openxmlformats.org/officeDocument/2006/relationships" xmlns:p="http://schemas.openxmlformats.org/presentationml/2006/main">
+  <p:cSld>
+    <p:spTree>
+      <p:nvGrpSpPr>
+        <p:cNvPr id="1" name=""/>
+        <p:cNvGrpSpPr/>
+        <p:nvPr/>
+      </p:nvGrpSpPr>
+      <p:grpSpPr>
+        <a:xfrm>
+          <a:off x="0" y="0"/>
+          <a:ext cx="0" cy="0"/>
+          <a:chOff x="0" y="0"/>
+          <a:chExt cx="0" cy="0"/>
+        </a:xfrm>
+      </p:grpSpPr>
+      <p:sp>
+        <p:nvSpPr>
+          <p:cNvPr id="2" name="Slide Image Placeholder 1"/>
+          <p:cNvSpPr>
+            <a:spLocks noGrp="1" noRot="1" noChangeAspect="1"/>
+          </p:cNvSpPr>
+          <p:nvPr>
+            <p:ph type="sldImg"/>
+          </p:nvPr>
+        </p:nvSpPr>
+        <p:spPr>
+          <a:xfrm>
+            <a:off x="1371600" y="1143000"/>
+            <a:ext cx="4114800" cy="3086100"/>
+          </a:xfrm>
+        </p:spPr>
+      </p:sp>
+      <p:sp>
+        <p:nvSpPr>
+          <p:cNvPr id="3" name="Notes Placeholder 2"/>
+          <p:cNvSpPr>
+            <a:spLocks noGrp="1"/>
+          </p:cNvSpPr>
+          <p:nvPr>
+            <p:ph type="body" idx="1"/>
+          </p:nvPr>
+        </p:nvSpPr>
+        <p:spPr/>
+        <p:txBody>
+          <a:bodyPr/>
+          <a:lstStyle/>
+          <a:p>
+            <a:r>
+              <a:rPr lang="en-US" dirty="0"/>
+              <a:t>[BACKCOLOR=#FFFFFF]</a:t>
+            </a:r>
+          </a:p>
+        </p:txBody>
+      </p:sp>
+      <p:sp>
+        <p:nvSpPr>
+          <p:cNvPr id="4" name="Slide Number Placeholder 3"/>
+          <p:cNvSpPr>
+            <a:spLocks noGrp="1"/>
+          </p:cNvSpPr>
+          <p:nvPr>
+            <p:ph type="sldNum" sz="quarter" idx="10"/>
+          </p:nvPr>
+        </p:nvSpPr>
+        <p:spPr/>
+        <p:txBody>
+          <a:bodyPr/>
+          <a:lstStyle/>
+          <a:p>
+            <a:fld id="{FD4630FF-7EAB-466A-9F54-35D39D4AE102}" type="slidenum">
+              <a:rPr lang="en-US" smtClean="0"/>
+              <a:t>2</a:t>
+            </a:fld>
+            <a:endParaRPr lang="en-US"/>
+          </a:p>
+        </p:txBody>
+      </p:sp>
+    </p:spTree>
+    <p:extLst>
+      <p:ext uri="{BB962C8B-B14F-4D97-AF65-F5344CB8AC3E}">
         <p14:creationId xmlns:p14="http://schemas.microsoft.com/office/powerpoint/2010/main" val="118701953"/>
+      </p:ext>
+    </p:extLst>
+  </p:cSld>
+  <p:clrMapOvr>
+    <a:masterClrMapping/>
+  </p:clrMapOvr>
+</p:notes>
+</file>
+
+<file path=ppt/notesSlides/notesSlide3.xml><?xml version="1.0" encoding="utf-8"?>
+<p:notes xmlns:a="http://schemas.openxmlformats.org/drawingml/2006/main" xmlns:r="http://schemas.openxmlformats.org/officeDocument/2006/relationships" xmlns:p="http://schemas.openxmlformats.org/presentationml/2006/main">
+  <p:cSld>
+    <p:spTree>
+      <p:nvGrpSpPr>
+        <p:cNvPr id="1" name=""/>
+        <p:cNvGrpSpPr/>
+        <p:nvPr/>
+      </p:nvGrpSpPr>
+      <p:grpSpPr>
+        <a:xfrm>
+          <a:off x="0" y="0"/>
+          <a:ext cx="0" cy="0"/>
+          <a:chOff x="0" y="0"/>
+          <a:chExt cx="0" cy="0"/>
+        </a:xfrm>
+      </p:grpSpPr>
+      <p:sp>
+        <p:nvSpPr>
+          <p:cNvPr id="2" name="Marcador de imagen de diapositiva 1"/>
+          <p:cNvSpPr>
+            <a:spLocks noGrp="1" noRot="1" noChangeAspect="1"/>
+          </p:cNvSpPr>
+          <p:nvPr>
+            <p:ph type="sldImg"/>
+          </p:nvPr>
+        </p:nvSpPr>
+        <p:spPr>
+          <a:xfrm>
+            <a:off x="1371600" y="1143000"/>
+            <a:ext cx="4114800" cy="3086100"/>
+          </a:xfrm>
+        </p:spPr>
+      </p:sp>
+      <p:sp>
+        <p:nvSpPr>
+          <p:cNvPr id="3" name="Marcador de notas 2"/>
+          <p:cNvSpPr>
+            <a:spLocks noGrp="1"/>
+          </p:cNvSpPr>
+          <p:nvPr>
+            <p:ph type="body" idx="1"/>
+          </p:nvPr>
+        </p:nvSpPr>
+        <p:spPr/>
+        <p:txBody>
+          <a:bodyPr/>
+          <a:lstStyle/>
+          <a:p>
+            <a:r>
+              <a:rPr lang="es-ES" dirty="0"/>
+              <a:t>[BACKCOLOR=255,255,255]</a:t>
+            </a:r>
+          </a:p>
+        </p:txBody>
+      </p:sp>
+      <p:sp>
+        <p:nvSpPr>
+          <p:cNvPr id="4" name="Marcador de número de diapositiva 3"/>
+          <p:cNvSpPr>
+            <a:spLocks noGrp="1"/>
+          </p:cNvSpPr>
+          <p:nvPr>
+            <p:ph type="sldNum" sz="quarter" idx="5"/>
+          </p:nvPr>
+        </p:nvSpPr>
+        <p:spPr/>
+        <p:txBody>
+          <a:bodyPr/>
+          <a:lstStyle/>
+          <a:p>
+            <a:fld id="{FD4630FF-7EAB-466A-9F54-35D39D4AE102}" type="slidenum">
+              <a:rPr lang="en-US" smtClean="0"/>
+              <a:t>3</a:t>
+            </a:fld>
+            <a:endParaRPr lang="en-US"/>
+          </a:p>
+        </p:txBody>
+      </p:sp>
+    </p:spTree>
+    <p:extLst>
+      <p:ext uri="{BB962C8B-B14F-4D97-AF65-F5344CB8AC3E}">
+        <p14:creationId xmlns:p14="http://schemas.microsoft.com/office/powerpoint/2010/main" val="362882710"/>
       </p:ext>
     </p:extLst>
   </p:cSld>
@@ -572,13 +768,7 @@
       </p:grpSpPr>
       <p:sp>
         <p:nvSpPr>
-          <p:cNvPr id="2" name="Título 1">
-            <a:extLst>
-              <a:ext uri="{FF2B5EF4-FFF2-40B4-BE49-F238E27FC236}">
-                <a16:creationId xmlns:a16="http://schemas.microsoft.com/office/drawing/2014/main" id="{A7A0C414-AA67-4643-95B0-EE500177A444}"/>
-              </a:ext>
-            </a:extLst>
-          </p:cNvPr>
+          <p:cNvPr id="2" name="Title 1"/>
           <p:cNvSpPr>
             <a:spLocks noGrp="1"/>
           </p:cNvSpPr>
@@ -588,8 +778,8 @@
         </p:nvSpPr>
         <p:spPr>
           <a:xfrm>
-            <a:off x="1524000" y="1122363"/>
-            <a:ext cx="9144000" cy="2387600"/>
+            <a:off x="685800" y="1122363"/>
+            <a:ext cx="7772400" cy="2387600"/>
           </a:xfrm>
         </p:spPr>
         <p:txBody>
@@ -604,18 +794,13 @@
               <a:rPr lang="es-ES"/>
               <a:t>Haga clic para modificar el estilo de título del patrón</a:t>
             </a:r>
-          </a:p>
-        </p:txBody>
-      </p:sp>
-      <p:sp>
-        <p:nvSpPr>
-          <p:cNvPr id="3" name="Subtítulo 2">
-            <a:extLst>
-              <a:ext uri="{FF2B5EF4-FFF2-40B4-BE49-F238E27FC236}">
-                <a16:creationId xmlns:a16="http://schemas.microsoft.com/office/drawing/2014/main" id="{EE5A8046-CC05-41A1-B19C-CE5A1773A93F}"/>
-              </a:ext>
-            </a:extLst>
-          </p:cNvPr>
+            <a:endParaRPr lang="en-US" dirty="0"/>
+          </a:p>
+        </p:txBody>
+      </p:sp>
+      <p:sp>
+        <p:nvSpPr>
+          <p:cNvPr id="3" name="Subtitle 2"/>
           <p:cNvSpPr>
             <a:spLocks noGrp="1"/>
           </p:cNvSpPr>
@@ -625,8 +810,8 @@
         </p:nvSpPr>
         <p:spPr>
           <a:xfrm>
-            <a:off x="1524000" y="3602038"/>
-            <a:ext cx="9144000" cy="1655762"/>
+            <a:off x="1143000" y="3602038"/>
+            <a:ext cx="6858000" cy="1655762"/>
           </a:xfrm>
         </p:spPr>
         <p:txBody>
@@ -674,18 +859,13 @@
               <a:rPr lang="es-ES"/>
               <a:t>Haga clic para modificar el estilo de subtítulo del patrón</a:t>
             </a:r>
-          </a:p>
-        </p:txBody>
-      </p:sp>
-      <p:sp>
-        <p:nvSpPr>
-          <p:cNvPr id="4" name="Marcador de fecha 3">
-            <a:extLst>
-              <a:ext uri="{FF2B5EF4-FFF2-40B4-BE49-F238E27FC236}">
-                <a16:creationId xmlns:a16="http://schemas.microsoft.com/office/drawing/2014/main" id="{9EB8E629-8348-4176-A6CA-532665422B28}"/>
-              </a:ext>
-            </a:extLst>
-          </p:cNvPr>
+            <a:endParaRPr lang="en-US" dirty="0"/>
+          </a:p>
+        </p:txBody>
+      </p:sp>
+      <p:sp>
+        <p:nvSpPr>
+          <p:cNvPr id="4" name="Date Placeholder 3"/>
           <p:cNvSpPr>
             <a:spLocks noGrp="1"/>
           </p:cNvSpPr>
@@ -700,7 +880,7 @@
           <a:p>
             <a:fld id="{857345AB-E265-4E05-A009-C7E62629F4CB}" type="datetimeFigureOut">
               <a:rPr lang="es-ES" smtClean="0"/>
-              <a:t>10/10/2018</a:t>
+              <a:t>11/10/2018</a:t>
             </a:fld>
             <a:endParaRPr lang="es-ES"/>
           </a:p>
@@ -708,13 +888,7 @@
       </p:sp>
       <p:sp>
         <p:nvSpPr>
-          <p:cNvPr id="5" name="Marcador de pie de página 4">
-            <a:extLst>
-              <a:ext uri="{FF2B5EF4-FFF2-40B4-BE49-F238E27FC236}">
-                <a16:creationId xmlns:a16="http://schemas.microsoft.com/office/drawing/2014/main" id="{E5E102F4-647A-4E89-94D9-5D53BC2F01AE}"/>
-              </a:ext>
-            </a:extLst>
-          </p:cNvPr>
+          <p:cNvPr id="5" name="Footer Placeholder 4"/>
           <p:cNvSpPr>
             <a:spLocks noGrp="1"/>
           </p:cNvSpPr>
@@ -733,13 +907,7 @@
       </p:sp>
       <p:sp>
         <p:nvSpPr>
-          <p:cNvPr id="6" name="Marcador de número de diapositiva 5">
-            <a:extLst>
-              <a:ext uri="{FF2B5EF4-FFF2-40B4-BE49-F238E27FC236}">
-                <a16:creationId xmlns:a16="http://schemas.microsoft.com/office/drawing/2014/main" id="{F3B99491-8300-48C0-AFF7-64323A318C18}"/>
-              </a:ext>
-            </a:extLst>
-          </p:cNvPr>
+          <p:cNvPr id="6" name="Slide Number Placeholder 5"/>
           <p:cNvSpPr>
             <a:spLocks noGrp="1"/>
           </p:cNvSpPr>
@@ -754,7 +922,7 @@
           <a:p>
             <a:fld id="{400E5944-F18F-4AFE-ADBC-74FE20CD496B}" type="slidenum">
               <a:rPr lang="es-ES" smtClean="0"/>
-              <a:t>‹#›</a:t>
+              <a:t>‹Nº›</a:t>
             </a:fld>
             <a:endParaRPr lang="es-ES"/>
           </a:p>
@@ -763,7 +931,7 @@
     </p:spTree>
     <p:extLst>
       <p:ext uri="{BB962C8B-B14F-4D97-AF65-F5344CB8AC3E}">
-        <p14:creationId xmlns:p14="http://schemas.microsoft.com/office/powerpoint/2010/main" val="3543657212"/>
+        <p14:creationId xmlns:p14="http://schemas.microsoft.com/office/powerpoint/2010/main" val="4042202440"/>
       </p:ext>
     </p:extLst>
   </p:cSld>
@@ -792,13 +960,7 @@
       </p:grpSpPr>
       <p:sp>
         <p:nvSpPr>
-          <p:cNvPr id="2" name="Título 1">
-            <a:extLst>
-              <a:ext uri="{FF2B5EF4-FFF2-40B4-BE49-F238E27FC236}">
-                <a16:creationId xmlns:a16="http://schemas.microsoft.com/office/drawing/2014/main" id="{29639867-CF46-42C1-9599-0A97102C8260}"/>
-              </a:ext>
-            </a:extLst>
-          </p:cNvPr>
+          <p:cNvPr id="2" name="Title 1"/>
           <p:cNvSpPr>
             <a:spLocks noGrp="1"/>
           </p:cNvSpPr>
@@ -815,18 +977,13 @@
               <a:rPr lang="es-ES"/>
               <a:t>Haga clic para modificar el estilo de título del patrón</a:t>
             </a:r>
-          </a:p>
-        </p:txBody>
-      </p:sp>
-      <p:sp>
-        <p:nvSpPr>
-          <p:cNvPr id="3" name="Marcador de texto vertical 2">
-            <a:extLst>
-              <a:ext uri="{FF2B5EF4-FFF2-40B4-BE49-F238E27FC236}">
-                <a16:creationId xmlns:a16="http://schemas.microsoft.com/office/drawing/2014/main" id="{B6FFDEFE-F1D3-494E-AA58-5523299761BE}"/>
-              </a:ext>
-            </a:extLst>
-          </p:cNvPr>
+            <a:endParaRPr lang="en-US" dirty="0"/>
+          </a:p>
+        </p:txBody>
+      </p:sp>
+      <p:sp>
+        <p:nvSpPr>
+          <p:cNvPr id="3" name="Vertical Text Placeholder 2"/>
           <p:cNvSpPr>
             <a:spLocks noGrp="1"/>
           </p:cNvSpPr>
@@ -872,18 +1029,13 @@
               <a:rPr lang="es-ES"/>
               <a:t>Quinto nivel</a:t>
             </a:r>
-          </a:p>
-        </p:txBody>
-      </p:sp>
-      <p:sp>
-        <p:nvSpPr>
-          <p:cNvPr id="4" name="Marcador de fecha 3">
-            <a:extLst>
-              <a:ext uri="{FF2B5EF4-FFF2-40B4-BE49-F238E27FC236}">
-                <a16:creationId xmlns:a16="http://schemas.microsoft.com/office/drawing/2014/main" id="{839F5968-91E3-42E9-AD84-A29902242810}"/>
-              </a:ext>
-            </a:extLst>
-          </p:cNvPr>
+            <a:endParaRPr lang="en-US" dirty="0"/>
+          </a:p>
+        </p:txBody>
+      </p:sp>
+      <p:sp>
+        <p:nvSpPr>
+          <p:cNvPr id="4" name="Date Placeholder 3"/>
           <p:cNvSpPr>
             <a:spLocks noGrp="1"/>
           </p:cNvSpPr>
@@ -898,7 +1050,7 @@
           <a:p>
             <a:fld id="{857345AB-E265-4E05-A009-C7E62629F4CB}" type="datetimeFigureOut">
               <a:rPr lang="es-ES" smtClean="0"/>
-              <a:t>10/10/2018</a:t>
+              <a:t>11/10/2018</a:t>
             </a:fld>
             <a:endParaRPr lang="es-ES"/>
           </a:p>
@@ -906,13 +1058,7 @@
       </p:sp>
       <p:sp>
         <p:nvSpPr>
-          <p:cNvPr id="5" name="Marcador de pie de página 4">
-            <a:extLst>
-              <a:ext uri="{FF2B5EF4-FFF2-40B4-BE49-F238E27FC236}">
-                <a16:creationId xmlns:a16="http://schemas.microsoft.com/office/drawing/2014/main" id="{EB40FB59-9966-4E70-B85C-28051AD1E3D4}"/>
-              </a:ext>
-            </a:extLst>
-          </p:cNvPr>
+          <p:cNvPr id="5" name="Footer Placeholder 4"/>
           <p:cNvSpPr>
             <a:spLocks noGrp="1"/>
           </p:cNvSpPr>
@@ -931,13 +1077,7 @@
       </p:sp>
       <p:sp>
         <p:nvSpPr>
-          <p:cNvPr id="6" name="Marcador de número de diapositiva 5">
-            <a:extLst>
-              <a:ext uri="{FF2B5EF4-FFF2-40B4-BE49-F238E27FC236}">
-                <a16:creationId xmlns:a16="http://schemas.microsoft.com/office/drawing/2014/main" id="{AAD51D84-C547-4D08-A456-523DEB4BD401}"/>
-              </a:ext>
-            </a:extLst>
-          </p:cNvPr>
+          <p:cNvPr id="6" name="Slide Number Placeholder 5"/>
           <p:cNvSpPr>
             <a:spLocks noGrp="1"/>
           </p:cNvSpPr>
@@ -952,7 +1092,7 @@
           <a:p>
             <a:fld id="{400E5944-F18F-4AFE-ADBC-74FE20CD496B}" type="slidenum">
               <a:rPr lang="es-ES" smtClean="0"/>
-              <a:t>‹#›</a:t>
+              <a:t>‹Nº›</a:t>
             </a:fld>
             <a:endParaRPr lang="es-ES"/>
           </a:p>
@@ -961,7 +1101,7 @@
     </p:spTree>
     <p:extLst>
       <p:ext uri="{BB962C8B-B14F-4D97-AF65-F5344CB8AC3E}">
-        <p14:creationId xmlns:p14="http://schemas.microsoft.com/office/powerpoint/2010/main" val="1192824213"/>
+        <p14:creationId xmlns:p14="http://schemas.microsoft.com/office/powerpoint/2010/main" val="280139246"/>
       </p:ext>
     </p:extLst>
   </p:cSld>
@@ -990,13 +1130,7 @@
       </p:grpSpPr>
       <p:sp>
         <p:nvSpPr>
-          <p:cNvPr id="2" name="Título vertical 1">
-            <a:extLst>
-              <a:ext uri="{FF2B5EF4-FFF2-40B4-BE49-F238E27FC236}">
-                <a16:creationId xmlns:a16="http://schemas.microsoft.com/office/drawing/2014/main" id="{00B2339C-B2B2-480E-9EEB-57C00D5077A8}"/>
-              </a:ext>
-            </a:extLst>
-          </p:cNvPr>
+          <p:cNvPr id="2" name="Vertical Title 1"/>
           <p:cNvSpPr>
             <a:spLocks noGrp="1"/>
           </p:cNvSpPr>
@@ -1006,8 +1140,8 @@
         </p:nvSpPr>
         <p:spPr>
           <a:xfrm>
-            <a:off x="8724900" y="365125"/>
-            <a:ext cx="2628900" cy="5811838"/>
+            <a:off x="6543675" y="365125"/>
+            <a:ext cx="1971675" cy="5811838"/>
           </a:xfrm>
         </p:spPr>
         <p:txBody>
@@ -1018,18 +1152,13 @@
               <a:rPr lang="es-ES"/>
               <a:t>Haga clic para modificar el estilo de título del patrón</a:t>
             </a:r>
-          </a:p>
-        </p:txBody>
-      </p:sp>
-      <p:sp>
-        <p:nvSpPr>
-          <p:cNvPr id="3" name="Marcador de texto vertical 2">
-            <a:extLst>
-              <a:ext uri="{FF2B5EF4-FFF2-40B4-BE49-F238E27FC236}">
-                <a16:creationId xmlns:a16="http://schemas.microsoft.com/office/drawing/2014/main" id="{DA268F40-9294-42FC-9F51-6F8A058E3651}"/>
-              </a:ext>
-            </a:extLst>
-          </p:cNvPr>
+            <a:endParaRPr lang="en-US" dirty="0"/>
+          </a:p>
+        </p:txBody>
+      </p:sp>
+      <p:sp>
+        <p:nvSpPr>
+          <p:cNvPr id="3" name="Vertical Text Placeholder 2"/>
           <p:cNvSpPr>
             <a:spLocks noGrp="1"/>
           </p:cNvSpPr>
@@ -1039,8 +1168,8 @@
         </p:nvSpPr>
         <p:spPr>
           <a:xfrm>
-            <a:off x="838200" y="365125"/>
-            <a:ext cx="7734300" cy="5811838"/>
+            <a:off x="628650" y="365125"/>
+            <a:ext cx="5800725" cy="5811838"/>
           </a:xfrm>
         </p:spPr>
         <p:txBody>
@@ -1080,18 +1209,13 @@
               <a:rPr lang="es-ES"/>
               <a:t>Quinto nivel</a:t>
             </a:r>
-          </a:p>
-        </p:txBody>
-      </p:sp>
-      <p:sp>
-        <p:nvSpPr>
-          <p:cNvPr id="4" name="Marcador de fecha 3">
-            <a:extLst>
-              <a:ext uri="{FF2B5EF4-FFF2-40B4-BE49-F238E27FC236}">
-                <a16:creationId xmlns:a16="http://schemas.microsoft.com/office/drawing/2014/main" id="{4C3029A2-18AA-4CCF-A523-F174E901AA8A}"/>
-              </a:ext>
-            </a:extLst>
-          </p:cNvPr>
+            <a:endParaRPr lang="en-US" dirty="0"/>
+          </a:p>
+        </p:txBody>
+      </p:sp>
+      <p:sp>
+        <p:nvSpPr>
+          <p:cNvPr id="4" name="Date Placeholder 3"/>
           <p:cNvSpPr>
             <a:spLocks noGrp="1"/>
           </p:cNvSpPr>
@@ -1106,7 +1230,7 @@
           <a:p>
             <a:fld id="{857345AB-E265-4E05-A009-C7E62629F4CB}" type="datetimeFigureOut">
               <a:rPr lang="es-ES" smtClean="0"/>
-              <a:t>10/10/2018</a:t>
+              <a:t>11/10/2018</a:t>
             </a:fld>
             <a:endParaRPr lang="es-ES"/>
           </a:p>
@@ -1114,13 +1238,7 @@
       </p:sp>
       <p:sp>
         <p:nvSpPr>
-          <p:cNvPr id="5" name="Marcador de pie de página 4">
-            <a:extLst>
-              <a:ext uri="{FF2B5EF4-FFF2-40B4-BE49-F238E27FC236}">
-                <a16:creationId xmlns:a16="http://schemas.microsoft.com/office/drawing/2014/main" id="{28BECED8-488A-43DE-90AC-BCCB3B2BD19F}"/>
-              </a:ext>
-            </a:extLst>
-          </p:cNvPr>
+          <p:cNvPr id="5" name="Footer Placeholder 4"/>
           <p:cNvSpPr>
             <a:spLocks noGrp="1"/>
           </p:cNvSpPr>
@@ -1139,13 +1257,7 @@
       </p:sp>
       <p:sp>
         <p:nvSpPr>
-          <p:cNvPr id="6" name="Marcador de número de diapositiva 5">
-            <a:extLst>
-              <a:ext uri="{FF2B5EF4-FFF2-40B4-BE49-F238E27FC236}">
-                <a16:creationId xmlns:a16="http://schemas.microsoft.com/office/drawing/2014/main" id="{620D1FF0-FE5A-41A1-8BE6-56A222399532}"/>
-              </a:ext>
-            </a:extLst>
-          </p:cNvPr>
+          <p:cNvPr id="6" name="Slide Number Placeholder 5"/>
           <p:cNvSpPr>
             <a:spLocks noGrp="1"/>
           </p:cNvSpPr>
@@ -1160,7 +1272,7 @@
           <a:p>
             <a:fld id="{400E5944-F18F-4AFE-ADBC-74FE20CD496B}" type="slidenum">
               <a:rPr lang="es-ES" smtClean="0"/>
-              <a:t>‹#›</a:t>
+              <a:t>‹Nº›</a:t>
             </a:fld>
             <a:endParaRPr lang="es-ES"/>
           </a:p>
@@ -1169,7 +1281,7 @@
     </p:spTree>
     <p:extLst>
       <p:ext uri="{BB962C8B-B14F-4D97-AF65-F5344CB8AC3E}">
-        <p14:creationId xmlns:p14="http://schemas.microsoft.com/office/powerpoint/2010/main" val="4150311333"/>
+        <p14:creationId xmlns:p14="http://schemas.microsoft.com/office/powerpoint/2010/main" val="968869683"/>
       </p:ext>
     </p:extLst>
   </p:cSld>
@@ -1198,13 +1310,7 @@
       </p:grpSpPr>
       <p:sp>
         <p:nvSpPr>
-          <p:cNvPr id="2" name="Título 1">
-            <a:extLst>
-              <a:ext uri="{FF2B5EF4-FFF2-40B4-BE49-F238E27FC236}">
-                <a16:creationId xmlns:a16="http://schemas.microsoft.com/office/drawing/2014/main" id="{4D686013-AF00-4E2A-A7E5-37AC8BE13266}"/>
-              </a:ext>
-            </a:extLst>
-          </p:cNvPr>
+          <p:cNvPr id="2" name="Title 1"/>
           <p:cNvSpPr>
             <a:spLocks noGrp="1"/>
           </p:cNvSpPr>
@@ -1221,18 +1327,13 @@
               <a:rPr lang="es-ES"/>
               <a:t>Haga clic para modificar el estilo de título del patrón</a:t>
             </a:r>
-          </a:p>
-        </p:txBody>
-      </p:sp>
-      <p:sp>
-        <p:nvSpPr>
-          <p:cNvPr id="3" name="Marcador de contenido 2">
-            <a:extLst>
-              <a:ext uri="{FF2B5EF4-FFF2-40B4-BE49-F238E27FC236}">
-                <a16:creationId xmlns:a16="http://schemas.microsoft.com/office/drawing/2014/main" id="{D5A8A2FC-F04D-4ECA-A9D5-E94C7B1F1D9B}"/>
-              </a:ext>
-            </a:extLst>
-          </p:cNvPr>
+            <a:endParaRPr lang="en-US" dirty="0"/>
+          </a:p>
+        </p:txBody>
+      </p:sp>
+      <p:sp>
+        <p:nvSpPr>
+          <p:cNvPr id="3" name="Content Placeholder 2"/>
           <p:cNvSpPr>
             <a:spLocks noGrp="1"/>
           </p:cNvSpPr>
@@ -1278,18 +1379,13 @@
               <a:rPr lang="es-ES"/>
               <a:t>Quinto nivel</a:t>
             </a:r>
-          </a:p>
-        </p:txBody>
-      </p:sp>
-      <p:sp>
-        <p:nvSpPr>
-          <p:cNvPr id="4" name="Marcador de fecha 3">
-            <a:extLst>
-              <a:ext uri="{FF2B5EF4-FFF2-40B4-BE49-F238E27FC236}">
-                <a16:creationId xmlns:a16="http://schemas.microsoft.com/office/drawing/2014/main" id="{D1A08C10-DF65-46E3-B5BC-4AD2F9C54FB1}"/>
-              </a:ext>
-            </a:extLst>
-          </p:cNvPr>
+            <a:endParaRPr lang="en-US" dirty="0"/>
+          </a:p>
+        </p:txBody>
+      </p:sp>
+      <p:sp>
+        <p:nvSpPr>
+          <p:cNvPr id="4" name="Date Placeholder 3"/>
           <p:cNvSpPr>
             <a:spLocks noGrp="1"/>
           </p:cNvSpPr>
@@ -1304,7 +1400,7 @@
           <a:p>
             <a:fld id="{857345AB-E265-4E05-A009-C7E62629F4CB}" type="datetimeFigureOut">
               <a:rPr lang="es-ES" smtClean="0"/>
-              <a:t>10/10/2018</a:t>
+              <a:t>11/10/2018</a:t>
             </a:fld>
             <a:endParaRPr lang="es-ES"/>
           </a:p>
@@ -1312,13 +1408,7 @@
       </p:sp>
       <p:sp>
         <p:nvSpPr>
-          <p:cNvPr id="5" name="Marcador de pie de página 4">
-            <a:extLst>
-              <a:ext uri="{FF2B5EF4-FFF2-40B4-BE49-F238E27FC236}">
-                <a16:creationId xmlns:a16="http://schemas.microsoft.com/office/drawing/2014/main" id="{7F251EE9-3E91-4E2A-86C4-723DDE996106}"/>
-              </a:ext>
-            </a:extLst>
-          </p:cNvPr>
+          <p:cNvPr id="5" name="Footer Placeholder 4"/>
           <p:cNvSpPr>
             <a:spLocks noGrp="1"/>
           </p:cNvSpPr>
@@ -1337,13 +1427,7 @@
       </p:sp>
       <p:sp>
         <p:nvSpPr>
-          <p:cNvPr id="6" name="Marcador de número de diapositiva 5">
-            <a:extLst>
-              <a:ext uri="{FF2B5EF4-FFF2-40B4-BE49-F238E27FC236}">
-                <a16:creationId xmlns:a16="http://schemas.microsoft.com/office/drawing/2014/main" id="{6203AAB7-E953-43AE-9F64-F3D789CFA465}"/>
-              </a:ext>
-            </a:extLst>
-          </p:cNvPr>
+          <p:cNvPr id="6" name="Slide Number Placeholder 5"/>
           <p:cNvSpPr>
             <a:spLocks noGrp="1"/>
           </p:cNvSpPr>
@@ -1358,7 +1442,7 @@
           <a:p>
             <a:fld id="{400E5944-F18F-4AFE-ADBC-74FE20CD496B}" type="slidenum">
               <a:rPr lang="es-ES" smtClean="0"/>
-              <a:t>‹#›</a:t>
+              <a:t>‹Nº›</a:t>
             </a:fld>
             <a:endParaRPr lang="es-ES"/>
           </a:p>
@@ -1367,7 +1451,7 @@
     </p:spTree>
     <p:extLst>
       <p:ext uri="{BB962C8B-B14F-4D97-AF65-F5344CB8AC3E}">
-        <p14:creationId xmlns:p14="http://schemas.microsoft.com/office/powerpoint/2010/main" val="1640963631"/>
+        <p14:creationId xmlns:p14="http://schemas.microsoft.com/office/powerpoint/2010/main" val="2834877468"/>
       </p:ext>
     </p:extLst>
   </p:cSld>
@@ -1396,13 +1480,7 @@
       </p:grpSpPr>
       <p:sp>
         <p:nvSpPr>
-          <p:cNvPr id="2" name="Título 1">
-            <a:extLst>
-              <a:ext uri="{FF2B5EF4-FFF2-40B4-BE49-F238E27FC236}">
-                <a16:creationId xmlns:a16="http://schemas.microsoft.com/office/drawing/2014/main" id="{398AB772-2079-4E62-A98E-A81A54F0C09A}"/>
-              </a:ext>
-            </a:extLst>
-          </p:cNvPr>
+          <p:cNvPr id="2" name="Title 1"/>
           <p:cNvSpPr>
             <a:spLocks noGrp="1"/>
           </p:cNvSpPr>
@@ -1412,8 +1490,8 @@
         </p:nvSpPr>
         <p:spPr>
           <a:xfrm>
-            <a:off x="831850" y="1709738"/>
-            <a:ext cx="10515600" cy="2852737"/>
+            <a:off x="623888" y="1709739"/>
+            <a:ext cx="7886700" cy="2852737"/>
           </a:xfrm>
         </p:spPr>
         <p:txBody>
@@ -1428,18 +1506,13 @@
               <a:rPr lang="es-ES"/>
               <a:t>Haga clic para modificar el estilo de título del patrón</a:t>
             </a:r>
-          </a:p>
-        </p:txBody>
-      </p:sp>
-      <p:sp>
-        <p:nvSpPr>
-          <p:cNvPr id="3" name="Marcador de texto 2">
-            <a:extLst>
-              <a:ext uri="{FF2B5EF4-FFF2-40B4-BE49-F238E27FC236}">
-                <a16:creationId xmlns:a16="http://schemas.microsoft.com/office/drawing/2014/main" id="{B26C48D5-5E1C-4378-827C-F1C2FD70E073}"/>
-              </a:ext>
-            </a:extLst>
-          </p:cNvPr>
+            <a:endParaRPr lang="en-US" dirty="0"/>
+          </a:p>
+        </p:txBody>
+      </p:sp>
+      <p:sp>
+        <p:nvSpPr>
+          <p:cNvPr id="3" name="Text Placeholder 2"/>
           <p:cNvSpPr>
             <a:spLocks noGrp="1"/>
           </p:cNvSpPr>
@@ -1449,8 +1522,8 @@
         </p:nvSpPr>
         <p:spPr>
           <a:xfrm>
-            <a:off x="831850" y="4589463"/>
-            <a:ext cx="10515600" cy="1500187"/>
+            <a:off x="623888" y="4589464"/>
+            <a:ext cx="7886700" cy="1500187"/>
           </a:xfrm>
         </p:spPr>
         <p:txBody>
@@ -1460,9 +1533,7 @@
               <a:buNone/>
               <a:defRPr sz="2400">
                 <a:solidFill>
-                  <a:schemeClr val="tx1">
-                    <a:tint val="75000"/>
-                  </a:schemeClr>
+                  <a:schemeClr val="tx1"/>
                 </a:solidFill>
               </a:defRPr>
             </a:lvl1pPr>
@@ -1558,13 +1629,7 @@
       </p:sp>
       <p:sp>
         <p:nvSpPr>
-          <p:cNvPr id="4" name="Marcador de fecha 3">
-            <a:extLst>
-              <a:ext uri="{FF2B5EF4-FFF2-40B4-BE49-F238E27FC236}">
-                <a16:creationId xmlns:a16="http://schemas.microsoft.com/office/drawing/2014/main" id="{ED9BD8E1-0782-410B-8503-33694E33315B}"/>
-              </a:ext>
-            </a:extLst>
-          </p:cNvPr>
+          <p:cNvPr id="4" name="Date Placeholder 3"/>
           <p:cNvSpPr>
             <a:spLocks noGrp="1"/>
           </p:cNvSpPr>
@@ -1579,7 +1644,7 @@
           <a:p>
             <a:fld id="{857345AB-E265-4E05-A009-C7E62629F4CB}" type="datetimeFigureOut">
               <a:rPr lang="es-ES" smtClean="0"/>
-              <a:t>10/10/2018</a:t>
+              <a:t>11/10/2018</a:t>
             </a:fld>
             <a:endParaRPr lang="es-ES"/>
           </a:p>
@@ -1587,13 +1652,7 @@
       </p:sp>
       <p:sp>
         <p:nvSpPr>
-          <p:cNvPr id="5" name="Marcador de pie de página 4">
-            <a:extLst>
-              <a:ext uri="{FF2B5EF4-FFF2-40B4-BE49-F238E27FC236}">
-                <a16:creationId xmlns:a16="http://schemas.microsoft.com/office/drawing/2014/main" id="{72E53B4B-422B-4DE2-80BA-7EF1EE9B73B6}"/>
-              </a:ext>
-            </a:extLst>
-          </p:cNvPr>
+          <p:cNvPr id="5" name="Footer Placeholder 4"/>
           <p:cNvSpPr>
             <a:spLocks noGrp="1"/>
           </p:cNvSpPr>
@@ -1612,13 +1671,7 @@
       </p:sp>
       <p:sp>
         <p:nvSpPr>
-          <p:cNvPr id="6" name="Marcador de número de diapositiva 5">
-            <a:extLst>
-              <a:ext uri="{FF2B5EF4-FFF2-40B4-BE49-F238E27FC236}">
-                <a16:creationId xmlns:a16="http://schemas.microsoft.com/office/drawing/2014/main" id="{DAF99B59-D453-44D0-B02F-44993B0D598E}"/>
-              </a:ext>
-            </a:extLst>
-          </p:cNvPr>
+          <p:cNvPr id="6" name="Slide Number Placeholder 5"/>
           <p:cNvSpPr>
             <a:spLocks noGrp="1"/>
           </p:cNvSpPr>
@@ -1633,7 +1686,7 @@
           <a:p>
             <a:fld id="{400E5944-F18F-4AFE-ADBC-74FE20CD496B}" type="slidenum">
               <a:rPr lang="es-ES" smtClean="0"/>
-              <a:t>‹#›</a:t>
+              <a:t>‹Nº›</a:t>
             </a:fld>
             <a:endParaRPr lang="es-ES"/>
           </a:p>
@@ -1642,7 +1695,7 @@
     </p:spTree>
     <p:extLst>
       <p:ext uri="{BB962C8B-B14F-4D97-AF65-F5344CB8AC3E}">
-        <p14:creationId xmlns:p14="http://schemas.microsoft.com/office/powerpoint/2010/main" val="1243249366"/>
+        <p14:creationId xmlns:p14="http://schemas.microsoft.com/office/powerpoint/2010/main" val="2430282326"/>
       </p:ext>
     </p:extLst>
   </p:cSld>
@@ -1671,13 +1724,7 @@
       </p:grpSpPr>
       <p:sp>
         <p:nvSpPr>
-          <p:cNvPr id="2" name="Título 1">
-            <a:extLst>
-              <a:ext uri="{FF2B5EF4-FFF2-40B4-BE49-F238E27FC236}">
-                <a16:creationId xmlns:a16="http://schemas.microsoft.com/office/drawing/2014/main" id="{7828DF59-3827-4BB0-AB62-5AA3354A16F4}"/>
-              </a:ext>
-            </a:extLst>
-          </p:cNvPr>
+          <p:cNvPr id="2" name="Title 1"/>
           <p:cNvSpPr>
             <a:spLocks noGrp="1"/>
           </p:cNvSpPr>
@@ -1694,18 +1741,13 @@
               <a:rPr lang="es-ES"/>
               <a:t>Haga clic para modificar el estilo de título del patrón</a:t>
             </a:r>
-          </a:p>
-        </p:txBody>
-      </p:sp>
-      <p:sp>
-        <p:nvSpPr>
-          <p:cNvPr id="3" name="Marcador de contenido 2">
-            <a:extLst>
-              <a:ext uri="{FF2B5EF4-FFF2-40B4-BE49-F238E27FC236}">
-                <a16:creationId xmlns:a16="http://schemas.microsoft.com/office/drawing/2014/main" id="{C4EE8D23-29A1-456B-9661-3F457F0F1080}"/>
-              </a:ext>
-            </a:extLst>
-          </p:cNvPr>
+            <a:endParaRPr lang="en-US" dirty="0"/>
+          </a:p>
+        </p:txBody>
+      </p:sp>
+      <p:sp>
+        <p:nvSpPr>
+          <p:cNvPr id="3" name="Content Placeholder 2"/>
           <p:cNvSpPr>
             <a:spLocks noGrp="1"/>
           </p:cNvSpPr>
@@ -1715,8 +1757,8 @@
         </p:nvSpPr>
         <p:spPr>
           <a:xfrm>
-            <a:off x="838200" y="1825625"/>
-            <a:ext cx="5181600" cy="4351338"/>
+            <a:off x="628650" y="1825625"/>
+            <a:ext cx="3886200" cy="4351338"/>
           </a:xfrm>
         </p:spPr>
         <p:txBody>
@@ -1756,18 +1798,13 @@
               <a:rPr lang="es-ES"/>
               <a:t>Quinto nivel</a:t>
             </a:r>
-          </a:p>
-        </p:txBody>
-      </p:sp>
-      <p:sp>
-        <p:nvSpPr>
-          <p:cNvPr id="4" name="Marcador de contenido 3">
-            <a:extLst>
-              <a:ext uri="{FF2B5EF4-FFF2-40B4-BE49-F238E27FC236}">
-                <a16:creationId xmlns:a16="http://schemas.microsoft.com/office/drawing/2014/main" id="{72FEF048-0A03-4E76-9C1B-F02908CFBCF3}"/>
-              </a:ext>
-            </a:extLst>
-          </p:cNvPr>
+            <a:endParaRPr lang="en-US" dirty="0"/>
+          </a:p>
+        </p:txBody>
+      </p:sp>
+      <p:sp>
+        <p:nvSpPr>
+          <p:cNvPr id="4" name="Content Placeholder 3"/>
           <p:cNvSpPr>
             <a:spLocks noGrp="1"/>
           </p:cNvSpPr>
@@ -1777,8 +1814,8 @@
         </p:nvSpPr>
         <p:spPr>
           <a:xfrm>
-            <a:off x="6172200" y="1825625"/>
-            <a:ext cx="5181600" cy="4351338"/>
+            <a:off x="4629150" y="1825625"/>
+            <a:ext cx="3886200" cy="4351338"/>
           </a:xfrm>
         </p:spPr>
         <p:txBody>
@@ -1818,18 +1855,13 @@
               <a:rPr lang="es-ES"/>
               <a:t>Quinto nivel</a:t>
             </a:r>
-          </a:p>
-        </p:txBody>
-      </p:sp>
-      <p:sp>
-        <p:nvSpPr>
-          <p:cNvPr id="5" name="Marcador de fecha 4">
-            <a:extLst>
-              <a:ext uri="{FF2B5EF4-FFF2-40B4-BE49-F238E27FC236}">
-                <a16:creationId xmlns:a16="http://schemas.microsoft.com/office/drawing/2014/main" id="{0A1BA19A-6192-4939-8E6B-A8E86B16EEE8}"/>
-              </a:ext>
-            </a:extLst>
-          </p:cNvPr>
+            <a:endParaRPr lang="en-US" dirty="0"/>
+          </a:p>
+        </p:txBody>
+      </p:sp>
+      <p:sp>
+        <p:nvSpPr>
+          <p:cNvPr id="5" name="Date Placeholder 4"/>
           <p:cNvSpPr>
             <a:spLocks noGrp="1"/>
           </p:cNvSpPr>
@@ -1844,7 +1876,7 @@
           <a:p>
             <a:fld id="{857345AB-E265-4E05-A009-C7E62629F4CB}" type="datetimeFigureOut">
               <a:rPr lang="es-ES" smtClean="0"/>
-              <a:t>10/10/2018</a:t>
+              <a:t>11/10/2018</a:t>
             </a:fld>
             <a:endParaRPr lang="es-ES"/>
           </a:p>
@@ -1852,13 +1884,7 @@
       </p:sp>
       <p:sp>
         <p:nvSpPr>
-          <p:cNvPr id="6" name="Marcador de pie de página 5">
-            <a:extLst>
-              <a:ext uri="{FF2B5EF4-FFF2-40B4-BE49-F238E27FC236}">
-                <a16:creationId xmlns:a16="http://schemas.microsoft.com/office/drawing/2014/main" id="{AF59477F-E1C3-48C0-9F91-AA585042AF26}"/>
-              </a:ext>
-            </a:extLst>
-          </p:cNvPr>
+          <p:cNvPr id="6" name="Footer Placeholder 5"/>
           <p:cNvSpPr>
             <a:spLocks noGrp="1"/>
           </p:cNvSpPr>
@@ -1877,13 +1903,7 @@
       </p:sp>
       <p:sp>
         <p:nvSpPr>
-          <p:cNvPr id="7" name="Marcador de número de diapositiva 6">
-            <a:extLst>
-              <a:ext uri="{FF2B5EF4-FFF2-40B4-BE49-F238E27FC236}">
-                <a16:creationId xmlns:a16="http://schemas.microsoft.com/office/drawing/2014/main" id="{FAF3D8BF-B1F8-4629-89FB-A5FA57A456E2}"/>
-              </a:ext>
-            </a:extLst>
-          </p:cNvPr>
+          <p:cNvPr id="7" name="Slide Number Placeholder 6"/>
           <p:cNvSpPr>
             <a:spLocks noGrp="1"/>
           </p:cNvSpPr>
@@ -1898,7 +1918,7 @@
           <a:p>
             <a:fld id="{400E5944-F18F-4AFE-ADBC-74FE20CD496B}" type="slidenum">
               <a:rPr lang="es-ES" smtClean="0"/>
-              <a:t>‹#›</a:t>
+              <a:t>‹Nº›</a:t>
             </a:fld>
             <a:endParaRPr lang="es-ES"/>
           </a:p>
@@ -1907,7 +1927,7 @@
     </p:spTree>
     <p:extLst>
       <p:ext uri="{BB962C8B-B14F-4D97-AF65-F5344CB8AC3E}">
-        <p14:creationId xmlns:p14="http://schemas.microsoft.com/office/powerpoint/2010/main" val="2289076104"/>
+        <p14:creationId xmlns:p14="http://schemas.microsoft.com/office/powerpoint/2010/main" val="412999657"/>
       </p:ext>
     </p:extLst>
   </p:cSld>
@@ -1936,13 +1956,7 @@
       </p:grpSpPr>
       <p:sp>
         <p:nvSpPr>
-          <p:cNvPr id="2" name="Título 1">
-            <a:extLst>
-              <a:ext uri="{FF2B5EF4-FFF2-40B4-BE49-F238E27FC236}">
-                <a16:creationId xmlns:a16="http://schemas.microsoft.com/office/drawing/2014/main" id="{AE31B6AF-B3D1-4D67-8D72-8862B679C0AD}"/>
-              </a:ext>
-            </a:extLst>
-          </p:cNvPr>
+          <p:cNvPr id="2" name="Title 1"/>
           <p:cNvSpPr>
             <a:spLocks noGrp="1"/>
           </p:cNvSpPr>
@@ -1952,8 +1966,8 @@
         </p:nvSpPr>
         <p:spPr>
           <a:xfrm>
-            <a:off x="839788" y="365125"/>
-            <a:ext cx="10515600" cy="1325563"/>
+            <a:off x="629841" y="365126"/>
+            <a:ext cx="7886700" cy="1325563"/>
           </a:xfrm>
         </p:spPr>
         <p:txBody>
@@ -1964,18 +1978,13 @@
               <a:rPr lang="es-ES"/>
               <a:t>Haga clic para modificar el estilo de título del patrón</a:t>
             </a:r>
-          </a:p>
-        </p:txBody>
-      </p:sp>
-      <p:sp>
-        <p:nvSpPr>
-          <p:cNvPr id="3" name="Marcador de texto 2">
-            <a:extLst>
-              <a:ext uri="{FF2B5EF4-FFF2-40B4-BE49-F238E27FC236}">
-                <a16:creationId xmlns:a16="http://schemas.microsoft.com/office/drawing/2014/main" id="{E3BB0A7F-5BD6-470D-8F1B-F525D4911F51}"/>
-              </a:ext>
-            </a:extLst>
-          </p:cNvPr>
+            <a:endParaRPr lang="en-US" dirty="0"/>
+          </a:p>
+        </p:txBody>
+      </p:sp>
+      <p:sp>
+        <p:nvSpPr>
+          <p:cNvPr id="3" name="Text Placeholder 2"/>
           <p:cNvSpPr>
             <a:spLocks noGrp="1"/>
           </p:cNvSpPr>
@@ -1985,8 +1994,8 @@
         </p:nvSpPr>
         <p:spPr>
           <a:xfrm>
-            <a:off x="839788" y="1681163"/>
-            <a:ext cx="5157787" cy="823912"/>
+            <a:off x="629842" y="1681163"/>
+            <a:ext cx="3868340" cy="823912"/>
           </a:xfrm>
         </p:spPr>
         <p:txBody>
@@ -2040,13 +2049,7 @@
       </p:sp>
       <p:sp>
         <p:nvSpPr>
-          <p:cNvPr id="4" name="Marcador de contenido 3">
-            <a:extLst>
-              <a:ext uri="{FF2B5EF4-FFF2-40B4-BE49-F238E27FC236}">
-                <a16:creationId xmlns:a16="http://schemas.microsoft.com/office/drawing/2014/main" id="{50AEC5AB-1A77-4638-9687-8D4DC5BB1CF1}"/>
-              </a:ext>
-            </a:extLst>
-          </p:cNvPr>
+          <p:cNvPr id="4" name="Content Placeholder 3"/>
           <p:cNvSpPr>
             <a:spLocks noGrp="1"/>
           </p:cNvSpPr>
@@ -2056,8 +2059,8 @@
         </p:nvSpPr>
         <p:spPr>
           <a:xfrm>
-            <a:off x="839788" y="2505075"/>
-            <a:ext cx="5157787" cy="3684588"/>
+            <a:off x="629842" y="2505075"/>
+            <a:ext cx="3868340" cy="3684588"/>
           </a:xfrm>
         </p:spPr>
         <p:txBody>
@@ -2097,18 +2100,13 @@
               <a:rPr lang="es-ES"/>
               <a:t>Quinto nivel</a:t>
             </a:r>
-          </a:p>
-        </p:txBody>
-      </p:sp>
-      <p:sp>
-        <p:nvSpPr>
-          <p:cNvPr id="5" name="Marcador de texto 4">
-            <a:extLst>
-              <a:ext uri="{FF2B5EF4-FFF2-40B4-BE49-F238E27FC236}">
-                <a16:creationId xmlns:a16="http://schemas.microsoft.com/office/drawing/2014/main" id="{7A61F9EA-C666-431E-B489-6B750E548D71}"/>
-              </a:ext>
-            </a:extLst>
-          </p:cNvPr>
+            <a:endParaRPr lang="en-US" dirty="0"/>
+          </a:p>
+        </p:txBody>
+      </p:sp>
+      <p:sp>
+        <p:nvSpPr>
+          <p:cNvPr id="5" name="Text Placeholder 4"/>
           <p:cNvSpPr>
             <a:spLocks noGrp="1"/>
           </p:cNvSpPr>
@@ -2118,8 +2116,8 @@
         </p:nvSpPr>
         <p:spPr>
           <a:xfrm>
-            <a:off x="6172200" y="1681163"/>
-            <a:ext cx="5183188" cy="823912"/>
+            <a:off x="4629150" y="1681163"/>
+            <a:ext cx="3887391" cy="823912"/>
           </a:xfrm>
         </p:spPr>
         <p:txBody>
@@ -2173,13 +2171,7 @@
       </p:sp>
       <p:sp>
         <p:nvSpPr>
-          <p:cNvPr id="6" name="Marcador de contenido 5">
-            <a:extLst>
-              <a:ext uri="{FF2B5EF4-FFF2-40B4-BE49-F238E27FC236}">
-                <a16:creationId xmlns:a16="http://schemas.microsoft.com/office/drawing/2014/main" id="{04E20FDB-AD80-497F-8504-D4FC6C903914}"/>
-              </a:ext>
-            </a:extLst>
-          </p:cNvPr>
+          <p:cNvPr id="6" name="Content Placeholder 5"/>
           <p:cNvSpPr>
             <a:spLocks noGrp="1"/>
           </p:cNvSpPr>
@@ -2189,8 +2181,8 @@
         </p:nvSpPr>
         <p:spPr>
           <a:xfrm>
-            <a:off x="6172200" y="2505075"/>
-            <a:ext cx="5183188" cy="3684588"/>
+            <a:off x="4629150" y="2505075"/>
+            <a:ext cx="3887391" cy="3684588"/>
           </a:xfrm>
         </p:spPr>
         <p:txBody>
@@ -2230,18 +2222,13 @@
               <a:rPr lang="es-ES"/>
               <a:t>Quinto nivel</a:t>
             </a:r>
-          </a:p>
-        </p:txBody>
-      </p:sp>
-      <p:sp>
-        <p:nvSpPr>
-          <p:cNvPr id="7" name="Marcador de fecha 6">
-            <a:extLst>
-              <a:ext uri="{FF2B5EF4-FFF2-40B4-BE49-F238E27FC236}">
-                <a16:creationId xmlns:a16="http://schemas.microsoft.com/office/drawing/2014/main" id="{1AADFFF2-678D-4017-A88A-3D2A41EC4DEF}"/>
-              </a:ext>
-            </a:extLst>
-          </p:cNvPr>
+            <a:endParaRPr lang="en-US" dirty="0"/>
+          </a:p>
+        </p:txBody>
+      </p:sp>
+      <p:sp>
+        <p:nvSpPr>
+          <p:cNvPr id="7" name="Date Placeholder 6"/>
           <p:cNvSpPr>
             <a:spLocks noGrp="1"/>
           </p:cNvSpPr>
@@ -2256,7 +2243,7 @@
           <a:p>
             <a:fld id="{857345AB-E265-4E05-A009-C7E62629F4CB}" type="datetimeFigureOut">
               <a:rPr lang="es-ES" smtClean="0"/>
-              <a:t>10/10/2018</a:t>
+              <a:t>11/10/2018</a:t>
             </a:fld>
             <a:endParaRPr lang="es-ES"/>
           </a:p>
@@ -2264,13 +2251,7 @@
       </p:sp>
       <p:sp>
         <p:nvSpPr>
-          <p:cNvPr id="8" name="Marcador de pie de página 7">
-            <a:extLst>
-              <a:ext uri="{FF2B5EF4-FFF2-40B4-BE49-F238E27FC236}">
-                <a16:creationId xmlns:a16="http://schemas.microsoft.com/office/drawing/2014/main" id="{CC0C77A2-FE93-4C1F-B291-05F7F66C8370}"/>
-              </a:ext>
-            </a:extLst>
-          </p:cNvPr>
+          <p:cNvPr id="8" name="Footer Placeholder 7"/>
           <p:cNvSpPr>
             <a:spLocks noGrp="1"/>
           </p:cNvSpPr>
@@ -2289,13 +2270,7 @@
       </p:sp>
       <p:sp>
         <p:nvSpPr>
-          <p:cNvPr id="9" name="Marcador de número de diapositiva 8">
-            <a:extLst>
-              <a:ext uri="{FF2B5EF4-FFF2-40B4-BE49-F238E27FC236}">
-                <a16:creationId xmlns:a16="http://schemas.microsoft.com/office/drawing/2014/main" id="{DEAA96F5-2695-424F-91FF-3B3E3118B86F}"/>
-              </a:ext>
-            </a:extLst>
-          </p:cNvPr>
+          <p:cNvPr id="9" name="Slide Number Placeholder 8"/>
           <p:cNvSpPr>
             <a:spLocks noGrp="1"/>
           </p:cNvSpPr>
@@ -2310,7 +2285,7 @@
           <a:p>
             <a:fld id="{400E5944-F18F-4AFE-ADBC-74FE20CD496B}" type="slidenum">
               <a:rPr lang="es-ES" smtClean="0"/>
-              <a:t>‹#›</a:t>
+              <a:t>‹Nº›</a:t>
             </a:fld>
             <a:endParaRPr lang="es-ES"/>
           </a:p>
@@ -2319,7 +2294,7 @@
     </p:spTree>
     <p:extLst>
       <p:ext uri="{BB962C8B-B14F-4D97-AF65-F5344CB8AC3E}">
-        <p14:creationId xmlns:p14="http://schemas.microsoft.com/office/powerpoint/2010/main" val="1743835420"/>
+        <p14:creationId xmlns:p14="http://schemas.microsoft.com/office/powerpoint/2010/main" val="675470957"/>
       </p:ext>
     </p:extLst>
   </p:cSld>
@@ -2348,13 +2323,7 @@
       </p:grpSpPr>
       <p:sp>
         <p:nvSpPr>
-          <p:cNvPr id="2" name="Título 1">
-            <a:extLst>
-              <a:ext uri="{FF2B5EF4-FFF2-40B4-BE49-F238E27FC236}">
-                <a16:creationId xmlns:a16="http://schemas.microsoft.com/office/drawing/2014/main" id="{5A95AF3C-DDFC-474A-8047-11D449E33710}"/>
-              </a:ext>
-            </a:extLst>
-          </p:cNvPr>
+          <p:cNvPr id="2" name="Title 1"/>
           <p:cNvSpPr>
             <a:spLocks noGrp="1"/>
           </p:cNvSpPr>
@@ -2371,18 +2340,13 @@
               <a:rPr lang="es-ES"/>
               <a:t>Haga clic para modificar el estilo de título del patrón</a:t>
             </a:r>
-          </a:p>
-        </p:txBody>
-      </p:sp>
-      <p:sp>
-        <p:nvSpPr>
-          <p:cNvPr id="3" name="Marcador de fecha 2">
-            <a:extLst>
-              <a:ext uri="{FF2B5EF4-FFF2-40B4-BE49-F238E27FC236}">
-                <a16:creationId xmlns:a16="http://schemas.microsoft.com/office/drawing/2014/main" id="{2DA738DE-9730-47B5-85A9-D2C8A8460ADA}"/>
-              </a:ext>
-            </a:extLst>
-          </p:cNvPr>
+            <a:endParaRPr lang="en-US" dirty="0"/>
+          </a:p>
+        </p:txBody>
+      </p:sp>
+      <p:sp>
+        <p:nvSpPr>
+          <p:cNvPr id="3" name="Date Placeholder 2"/>
           <p:cNvSpPr>
             <a:spLocks noGrp="1"/>
           </p:cNvSpPr>
@@ -2397,7 +2361,7 @@
           <a:p>
             <a:fld id="{857345AB-E265-4E05-A009-C7E62629F4CB}" type="datetimeFigureOut">
               <a:rPr lang="es-ES" smtClean="0"/>
-              <a:t>10/10/2018</a:t>
+              <a:t>11/10/2018</a:t>
             </a:fld>
             <a:endParaRPr lang="es-ES"/>
           </a:p>
@@ -2405,13 +2369,7 @@
       </p:sp>
       <p:sp>
         <p:nvSpPr>
-          <p:cNvPr id="4" name="Marcador de pie de página 3">
-            <a:extLst>
-              <a:ext uri="{FF2B5EF4-FFF2-40B4-BE49-F238E27FC236}">
-                <a16:creationId xmlns:a16="http://schemas.microsoft.com/office/drawing/2014/main" id="{202ECABB-BFF4-4E74-8C5E-F0BCD26ACA3C}"/>
-              </a:ext>
-            </a:extLst>
-          </p:cNvPr>
+          <p:cNvPr id="4" name="Footer Placeholder 3"/>
           <p:cNvSpPr>
             <a:spLocks noGrp="1"/>
           </p:cNvSpPr>
@@ -2430,13 +2388,7 @@
       </p:sp>
       <p:sp>
         <p:nvSpPr>
-          <p:cNvPr id="5" name="Marcador de número de diapositiva 4">
-            <a:extLst>
-              <a:ext uri="{FF2B5EF4-FFF2-40B4-BE49-F238E27FC236}">
-                <a16:creationId xmlns:a16="http://schemas.microsoft.com/office/drawing/2014/main" id="{2CE2BCEF-F8BD-4A75-9254-3A8B3ED1AE53}"/>
-              </a:ext>
-            </a:extLst>
-          </p:cNvPr>
+          <p:cNvPr id="5" name="Slide Number Placeholder 4"/>
           <p:cNvSpPr>
             <a:spLocks noGrp="1"/>
           </p:cNvSpPr>
@@ -2451,7 +2403,7 @@
           <a:p>
             <a:fld id="{400E5944-F18F-4AFE-ADBC-74FE20CD496B}" type="slidenum">
               <a:rPr lang="es-ES" smtClean="0"/>
-              <a:t>‹#›</a:t>
+              <a:t>‹Nº›</a:t>
             </a:fld>
             <a:endParaRPr lang="es-ES"/>
           </a:p>
@@ -2460,7 +2412,7 @@
     </p:spTree>
     <p:extLst>
       <p:ext uri="{BB962C8B-B14F-4D97-AF65-F5344CB8AC3E}">
-        <p14:creationId xmlns:p14="http://schemas.microsoft.com/office/powerpoint/2010/main" val="920129097"/>
+        <p14:creationId xmlns:p14="http://schemas.microsoft.com/office/powerpoint/2010/main" val="61084573"/>
       </p:ext>
     </p:extLst>
   </p:cSld>
@@ -2489,13 +2441,7 @@
       </p:grpSpPr>
       <p:sp>
         <p:nvSpPr>
-          <p:cNvPr id="2" name="Marcador de fecha 1">
-            <a:extLst>
-              <a:ext uri="{FF2B5EF4-FFF2-40B4-BE49-F238E27FC236}">
-                <a16:creationId xmlns:a16="http://schemas.microsoft.com/office/drawing/2014/main" id="{8A618613-5961-4BEE-A0E7-215FF758EB7E}"/>
-              </a:ext>
-            </a:extLst>
-          </p:cNvPr>
+          <p:cNvPr id="2" name="Date Placeholder 1"/>
           <p:cNvSpPr>
             <a:spLocks noGrp="1"/>
           </p:cNvSpPr>
@@ -2510,7 +2456,7 @@
           <a:p>
             <a:fld id="{857345AB-E265-4E05-A009-C7E62629F4CB}" type="datetimeFigureOut">
               <a:rPr lang="es-ES" smtClean="0"/>
-              <a:t>10/10/2018</a:t>
+              <a:t>11/10/2018</a:t>
             </a:fld>
             <a:endParaRPr lang="es-ES"/>
           </a:p>
@@ -2518,13 +2464,7 @@
       </p:sp>
       <p:sp>
         <p:nvSpPr>
-          <p:cNvPr id="3" name="Marcador de pie de página 2">
-            <a:extLst>
-              <a:ext uri="{FF2B5EF4-FFF2-40B4-BE49-F238E27FC236}">
-                <a16:creationId xmlns:a16="http://schemas.microsoft.com/office/drawing/2014/main" id="{86218160-07B1-4D10-A198-06225A10EE0A}"/>
-              </a:ext>
-            </a:extLst>
-          </p:cNvPr>
+          <p:cNvPr id="3" name="Footer Placeholder 2"/>
           <p:cNvSpPr>
             <a:spLocks noGrp="1"/>
           </p:cNvSpPr>
@@ -2543,13 +2483,7 @@
       </p:sp>
       <p:sp>
         <p:nvSpPr>
-          <p:cNvPr id="4" name="Marcador de número de diapositiva 3">
-            <a:extLst>
-              <a:ext uri="{FF2B5EF4-FFF2-40B4-BE49-F238E27FC236}">
-                <a16:creationId xmlns:a16="http://schemas.microsoft.com/office/drawing/2014/main" id="{0A52D8D9-D3A6-4B40-BDDE-874693B635F1}"/>
-              </a:ext>
-            </a:extLst>
-          </p:cNvPr>
+          <p:cNvPr id="4" name="Slide Number Placeholder 3"/>
           <p:cNvSpPr>
             <a:spLocks noGrp="1"/>
           </p:cNvSpPr>
@@ -2564,7 +2498,7 @@
           <a:p>
             <a:fld id="{400E5944-F18F-4AFE-ADBC-74FE20CD496B}" type="slidenum">
               <a:rPr lang="es-ES" smtClean="0"/>
-              <a:t>‹#›</a:t>
+              <a:t>‹Nº›</a:t>
             </a:fld>
             <a:endParaRPr lang="es-ES"/>
           </a:p>
@@ -2573,7 +2507,7 @@
     </p:spTree>
     <p:extLst>
       <p:ext uri="{BB962C8B-B14F-4D97-AF65-F5344CB8AC3E}">
-        <p14:creationId xmlns:p14="http://schemas.microsoft.com/office/powerpoint/2010/main" val="3457389391"/>
+        <p14:creationId xmlns:p14="http://schemas.microsoft.com/office/powerpoint/2010/main" val="505029846"/>
       </p:ext>
     </p:extLst>
   </p:cSld>
@@ -2602,13 +2536,7 @@
       </p:grpSpPr>
       <p:sp>
         <p:nvSpPr>
-          <p:cNvPr id="2" name="Título 1">
-            <a:extLst>
-              <a:ext uri="{FF2B5EF4-FFF2-40B4-BE49-F238E27FC236}">
-                <a16:creationId xmlns:a16="http://schemas.microsoft.com/office/drawing/2014/main" id="{A324B57A-0A16-444E-9505-5BB8578D32CD}"/>
-              </a:ext>
-            </a:extLst>
-          </p:cNvPr>
+          <p:cNvPr id="2" name="Title 1"/>
           <p:cNvSpPr>
             <a:spLocks noGrp="1"/>
           </p:cNvSpPr>
@@ -2618,8 +2546,8 @@
         </p:nvSpPr>
         <p:spPr>
           <a:xfrm>
-            <a:off x="839788" y="457200"/>
-            <a:ext cx="3932237" cy="1600200"/>
+            <a:off x="629841" y="457200"/>
+            <a:ext cx="2949178" cy="1600200"/>
           </a:xfrm>
         </p:spPr>
         <p:txBody>
@@ -2634,18 +2562,13 @@
               <a:rPr lang="es-ES"/>
               <a:t>Haga clic para modificar el estilo de título del patrón</a:t>
             </a:r>
-          </a:p>
-        </p:txBody>
-      </p:sp>
-      <p:sp>
-        <p:nvSpPr>
-          <p:cNvPr id="3" name="Marcador de contenido 2">
-            <a:extLst>
-              <a:ext uri="{FF2B5EF4-FFF2-40B4-BE49-F238E27FC236}">
-                <a16:creationId xmlns:a16="http://schemas.microsoft.com/office/drawing/2014/main" id="{914EEEBD-28B0-4979-8F58-98E2DFD3F798}"/>
-              </a:ext>
-            </a:extLst>
-          </p:cNvPr>
+            <a:endParaRPr lang="en-US" dirty="0"/>
+          </a:p>
+        </p:txBody>
+      </p:sp>
+      <p:sp>
+        <p:nvSpPr>
+          <p:cNvPr id="3" name="Content Placeholder 2"/>
           <p:cNvSpPr>
             <a:spLocks noGrp="1"/>
           </p:cNvSpPr>
@@ -2655,8 +2578,8 @@
         </p:nvSpPr>
         <p:spPr>
           <a:xfrm>
-            <a:off x="5183188" y="987425"/>
-            <a:ext cx="6172200" cy="4873625"/>
+            <a:off x="3887391" y="987426"/>
+            <a:ext cx="4629150" cy="4873625"/>
           </a:xfrm>
         </p:spPr>
         <p:txBody>
@@ -2724,18 +2647,13 @@
               <a:rPr lang="es-ES"/>
               <a:t>Quinto nivel</a:t>
             </a:r>
-          </a:p>
-        </p:txBody>
-      </p:sp>
-      <p:sp>
-        <p:nvSpPr>
-          <p:cNvPr id="4" name="Marcador de texto 3">
-            <a:extLst>
-              <a:ext uri="{FF2B5EF4-FFF2-40B4-BE49-F238E27FC236}">
-                <a16:creationId xmlns:a16="http://schemas.microsoft.com/office/drawing/2014/main" id="{16E5E6B0-D92D-48E1-83FF-7D93439DC3E8}"/>
-              </a:ext>
-            </a:extLst>
-          </p:cNvPr>
+            <a:endParaRPr lang="en-US" dirty="0"/>
+          </a:p>
+        </p:txBody>
+      </p:sp>
+      <p:sp>
+        <p:nvSpPr>
+          <p:cNvPr id="4" name="Text Placeholder 3"/>
           <p:cNvSpPr>
             <a:spLocks noGrp="1"/>
           </p:cNvSpPr>
@@ -2745,8 +2663,8 @@
         </p:nvSpPr>
         <p:spPr>
           <a:xfrm>
-            <a:off x="839788" y="2057400"/>
-            <a:ext cx="3932237" cy="3811588"/>
+            <a:off x="629841" y="2057400"/>
+            <a:ext cx="2949178" cy="3811588"/>
           </a:xfrm>
         </p:spPr>
         <p:txBody>
@@ -2800,13 +2718,7 @@
       </p:sp>
       <p:sp>
         <p:nvSpPr>
-          <p:cNvPr id="5" name="Marcador de fecha 4">
-            <a:extLst>
-              <a:ext uri="{FF2B5EF4-FFF2-40B4-BE49-F238E27FC236}">
-                <a16:creationId xmlns:a16="http://schemas.microsoft.com/office/drawing/2014/main" id="{67DC4F2F-5CE5-4812-ADC7-ED50DC2C3514}"/>
-              </a:ext>
-            </a:extLst>
-          </p:cNvPr>
+          <p:cNvPr id="5" name="Date Placeholder 4"/>
           <p:cNvSpPr>
             <a:spLocks noGrp="1"/>
           </p:cNvSpPr>
@@ -2821,7 +2733,7 @@
           <a:p>
             <a:fld id="{857345AB-E265-4E05-A009-C7E62629F4CB}" type="datetimeFigureOut">
               <a:rPr lang="es-ES" smtClean="0"/>
-              <a:t>10/10/2018</a:t>
+              <a:t>11/10/2018</a:t>
             </a:fld>
             <a:endParaRPr lang="es-ES"/>
           </a:p>
@@ -2829,13 +2741,7 @@
       </p:sp>
       <p:sp>
         <p:nvSpPr>
-          <p:cNvPr id="6" name="Marcador de pie de página 5">
-            <a:extLst>
-              <a:ext uri="{FF2B5EF4-FFF2-40B4-BE49-F238E27FC236}">
-                <a16:creationId xmlns:a16="http://schemas.microsoft.com/office/drawing/2014/main" id="{C4406310-C52F-4627-BF6E-71B95618A060}"/>
-              </a:ext>
-            </a:extLst>
-          </p:cNvPr>
+          <p:cNvPr id="6" name="Footer Placeholder 5"/>
           <p:cNvSpPr>
             <a:spLocks noGrp="1"/>
           </p:cNvSpPr>
@@ -2854,13 +2760,7 @@
       </p:sp>
       <p:sp>
         <p:nvSpPr>
-          <p:cNvPr id="7" name="Marcador de número de diapositiva 6">
-            <a:extLst>
-              <a:ext uri="{FF2B5EF4-FFF2-40B4-BE49-F238E27FC236}">
-                <a16:creationId xmlns:a16="http://schemas.microsoft.com/office/drawing/2014/main" id="{9BA32B1E-9C2B-4978-912F-A811CFF4CE06}"/>
-              </a:ext>
-            </a:extLst>
-          </p:cNvPr>
+          <p:cNvPr id="7" name="Slide Number Placeholder 6"/>
           <p:cNvSpPr>
             <a:spLocks noGrp="1"/>
           </p:cNvSpPr>
@@ -2875,7 +2775,7 @@
           <a:p>
             <a:fld id="{400E5944-F18F-4AFE-ADBC-74FE20CD496B}" type="slidenum">
               <a:rPr lang="es-ES" smtClean="0"/>
-              <a:t>‹#›</a:t>
+              <a:t>‹Nº›</a:t>
             </a:fld>
             <a:endParaRPr lang="es-ES"/>
           </a:p>
@@ -2884,7 +2784,7 @@
     </p:spTree>
     <p:extLst>
       <p:ext uri="{BB962C8B-B14F-4D97-AF65-F5344CB8AC3E}">
-        <p14:creationId xmlns:p14="http://schemas.microsoft.com/office/powerpoint/2010/main" val="866201981"/>
+        <p14:creationId xmlns:p14="http://schemas.microsoft.com/office/powerpoint/2010/main" val="853602203"/>
       </p:ext>
     </p:extLst>
   </p:cSld>
@@ -2913,13 +2813,7 @@
       </p:grpSpPr>
       <p:sp>
         <p:nvSpPr>
-          <p:cNvPr id="2" name="Título 1">
-            <a:extLst>
-              <a:ext uri="{FF2B5EF4-FFF2-40B4-BE49-F238E27FC236}">
-                <a16:creationId xmlns:a16="http://schemas.microsoft.com/office/drawing/2014/main" id="{00ADF94F-31AA-4C2E-A8D5-118C7A929DA6}"/>
-              </a:ext>
-            </a:extLst>
-          </p:cNvPr>
+          <p:cNvPr id="2" name="Title 1"/>
           <p:cNvSpPr>
             <a:spLocks noGrp="1"/>
           </p:cNvSpPr>
@@ -2929,8 +2823,8 @@
         </p:nvSpPr>
         <p:spPr>
           <a:xfrm>
-            <a:off x="839788" y="457200"/>
-            <a:ext cx="3932237" cy="1600200"/>
+            <a:off x="629841" y="457200"/>
+            <a:ext cx="2949178" cy="1600200"/>
           </a:xfrm>
         </p:spPr>
         <p:txBody>
@@ -2945,20 +2839,15 @@
               <a:rPr lang="es-ES"/>
               <a:t>Haga clic para modificar el estilo de título del patrón</a:t>
             </a:r>
-          </a:p>
-        </p:txBody>
-      </p:sp>
-      <p:sp>
-        <p:nvSpPr>
-          <p:cNvPr id="3" name="Marcador de posición de imagen 2">
-            <a:extLst>
-              <a:ext uri="{FF2B5EF4-FFF2-40B4-BE49-F238E27FC236}">
-                <a16:creationId xmlns:a16="http://schemas.microsoft.com/office/drawing/2014/main" id="{B40E97D4-B618-46F5-BFC6-97B661584720}"/>
-              </a:ext>
-            </a:extLst>
-          </p:cNvPr>
-          <p:cNvSpPr>
-            <a:spLocks noGrp="1"/>
+            <a:endParaRPr lang="en-US" dirty="0"/>
+          </a:p>
+        </p:txBody>
+      </p:sp>
+      <p:sp>
+        <p:nvSpPr>
+          <p:cNvPr id="3" name="Picture Placeholder 2"/>
+          <p:cNvSpPr>
+            <a:spLocks noGrp="1" noChangeAspect="1"/>
           </p:cNvSpPr>
           <p:nvPr>
             <p:ph type="pic" idx="1"/>
@@ -2966,12 +2855,12 @@
         </p:nvSpPr>
         <p:spPr>
           <a:xfrm>
-            <a:off x="5183188" y="987425"/>
-            <a:ext cx="6172200" cy="4873625"/>
+            <a:off x="3887391" y="987426"/>
+            <a:ext cx="4629150" cy="4873625"/>
           </a:xfrm>
         </p:spPr>
         <p:txBody>
-          <a:bodyPr/>
+          <a:bodyPr anchor="t"/>
           <a:lstStyle>
             <a:lvl1pPr marL="0" indent="0">
               <a:buNone/>
@@ -3011,19 +2900,17 @@
             </a:lvl9pPr>
           </a:lstStyle>
           <a:p>
-            <a:endParaRPr lang="es-ES"/>
-          </a:p>
-        </p:txBody>
-      </p:sp>
-      <p:sp>
-        <p:nvSpPr>
-          <p:cNvPr id="4" name="Marcador de texto 3">
-            <a:extLst>
-              <a:ext uri="{FF2B5EF4-FFF2-40B4-BE49-F238E27FC236}">
-                <a16:creationId xmlns:a16="http://schemas.microsoft.com/office/drawing/2014/main" id="{8C50AE1D-598B-4DB4-B42E-35B301FAB1C3}"/>
-              </a:ext>
-            </a:extLst>
-          </p:cNvPr>
+            <a:r>
+              <a:rPr lang="es-ES"/>
+              <a:t>Haga clic en el icono para agregar una imagen</a:t>
+            </a:r>
+            <a:endParaRPr lang="en-US" dirty="0"/>
+          </a:p>
+        </p:txBody>
+      </p:sp>
+      <p:sp>
+        <p:nvSpPr>
+          <p:cNvPr id="4" name="Text Placeholder 3"/>
           <p:cNvSpPr>
             <a:spLocks noGrp="1"/>
           </p:cNvSpPr>
@@ -3033,8 +2920,8 @@
         </p:nvSpPr>
         <p:spPr>
           <a:xfrm>
-            <a:off x="839788" y="2057400"/>
-            <a:ext cx="3932237" cy="3811588"/>
+            <a:off x="629841" y="2057400"/>
+            <a:ext cx="2949178" cy="3811588"/>
           </a:xfrm>
         </p:spPr>
         <p:txBody>
@@ -3088,13 +2975,7 @@
       </p:sp>
       <p:sp>
         <p:nvSpPr>
-          <p:cNvPr id="5" name="Marcador de fecha 4">
-            <a:extLst>
-              <a:ext uri="{FF2B5EF4-FFF2-40B4-BE49-F238E27FC236}">
-                <a16:creationId xmlns:a16="http://schemas.microsoft.com/office/drawing/2014/main" id="{71FA7B3F-5B82-46B5-B482-43B953E75A4D}"/>
-              </a:ext>
-            </a:extLst>
-          </p:cNvPr>
+          <p:cNvPr id="5" name="Date Placeholder 4"/>
           <p:cNvSpPr>
             <a:spLocks noGrp="1"/>
           </p:cNvSpPr>
@@ -3109,7 +2990,7 @@
           <a:p>
             <a:fld id="{857345AB-E265-4E05-A009-C7E62629F4CB}" type="datetimeFigureOut">
               <a:rPr lang="es-ES" smtClean="0"/>
-              <a:t>10/10/2018</a:t>
+              <a:t>11/10/2018</a:t>
             </a:fld>
             <a:endParaRPr lang="es-ES"/>
           </a:p>
@@ -3117,13 +2998,7 @@
       </p:sp>
       <p:sp>
         <p:nvSpPr>
-          <p:cNvPr id="6" name="Marcador de pie de página 5">
-            <a:extLst>
-              <a:ext uri="{FF2B5EF4-FFF2-40B4-BE49-F238E27FC236}">
-                <a16:creationId xmlns:a16="http://schemas.microsoft.com/office/drawing/2014/main" id="{ABE6C0BE-D182-4E35-860C-7DF22B82D08D}"/>
-              </a:ext>
-            </a:extLst>
-          </p:cNvPr>
+          <p:cNvPr id="6" name="Footer Placeholder 5"/>
           <p:cNvSpPr>
             <a:spLocks noGrp="1"/>
           </p:cNvSpPr>
@@ -3142,13 +3017,7 @@
       </p:sp>
       <p:sp>
         <p:nvSpPr>
-          <p:cNvPr id="7" name="Marcador de número de diapositiva 6">
-            <a:extLst>
-              <a:ext uri="{FF2B5EF4-FFF2-40B4-BE49-F238E27FC236}">
-                <a16:creationId xmlns:a16="http://schemas.microsoft.com/office/drawing/2014/main" id="{CD10C6F2-D467-4A44-8167-7220CF60723B}"/>
-              </a:ext>
-            </a:extLst>
-          </p:cNvPr>
+          <p:cNvPr id="7" name="Slide Number Placeholder 6"/>
           <p:cNvSpPr>
             <a:spLocks noGrp="1"/>
           </p:cNvSpPr>
@@ -3163,7 +3032,7 @@
           <a:p>
             <a:fld id="{400E5944-F18F-4AFE-ADBC-74FE20CD496B}" type="slidenum">
               <a:rPr lang="es-ES" smtClean="0"/>
-              <a:t>‹#›</a:t>
+              <a:t>‹Nº›</a:t>
             </a:fld>
             <a:endParaRPr lang="es-ES"/>
           </a:p>
@@ -3172,7 +3041,7 @@
     </p:spTree>
     <p:extLst>
       <p:ext uri="{BB962C8B-B14F-4D97-AF65-F5344CB8AC3E}">
-        <p14:creationId xmlns:p14="http://schemas.microsoft.com/office/powerpoint/2010/main" val="1075112271"/>
+        <p14:creationId xmlns:p14="http://schemas.microsoft.com/office/powerpoint/2010/main" val="1588514221"/>
       </p:ext>
     </p:extLst>
   </p:cSld>
@@ -3206,13 +3075,7 @@
       </p:grpSpPr>
       <p:sp>
         <p:nvSpPr>
-          <p:cNvPr id="2" name="Marcador de título 1">
-            <a:extLst>
-              <a:ext uri="{FF2B5EF4-FFF2-40B4-BE49-F238E27FC236}">
-                <a16:creationId xmlns:a16="http://schemas.microsoft.com/office/drawing/2014/main" id="{EACC1461-3D2F-475C-837A-AD3339FF8449}"/>
-              </a:ext>
-            </a:extLst>
-          </p:cNvPr>
+          <p:cNvPr id="2" name="Title Placeholder 1"/>
           <p:cNvSpPr>
             <a:spLocks noGrp="1"/>
           </p:cNvSpPr>
@@ -3222,8 +3085,8 @@
         </p:nvSpPr>
         <p:spPr>
           <a:xfrm>
-            <a:off x="838200" y="365125"/>
-            <a:ext cx="10515600" cy="1325563"/>
+            <a:off x="628650" y="365126"/>
+            <a:ext cx="7886700" cy="1325563"/>
           </a:xfrm>
           <a:prstGeom prst="rect">
             <a:avLst/>
@@ -3239,18 +3102,13 @@
               <a:rPr lang="es-ES"/>
               <a:t>Haga clic para modificar el estilo de título del patrón</a:t>
             </a:r>
-          </a:p>
-        </p:txBody>
-      </p:sp>
-      <p:sp>
-        <p:nvSpPr>
-          <p:cNvPr id="3" name="Marcador de texto 2">
-            <a:extLst>
-              <a:ext uri="{FF2B5EF4-FFF2-40B4-BE49-F238E27FC236}">
-                <a16:creationId xmlns:a16="http://schemas.microsoft.com/office/drawing/2014/main" id="{52661A82-3D15-4CCD-A194-A1E2EDF45143}"/>
-              </a:ext>
-            </a:extLst>
-          </p:cNvPr>
+            <a:endParaRPr lang="en-US" dirty="0"/>
+          </a:p>
+        </p:txBody>
+      </p:sp>
+      <p:sp>
+        <p:nvSpPr>
+          <p:cNvPr id="3" name="Text Placeholder 2"/>
           <p:cNvSpPr>
             <a:spLocks noGrp="1"/>
           </p:cNvSpPr>
@@ -3260,8 +3118,8 @@
         </p:nvSpPr>
         <p:spPr>
           <a:xfrm>
-            <a:off x="838200" y="1825625"/>
-            <a:ext cx="10515600" cy="4351338"/>
+            <a:off x="628650" y="1825625"/>
+            <a:ext cx="7886700" cy="4351338"/>
           </a:xfrm>
           <a:prstGeom prst="rect">
             <a:avLst/>
@@ -3306,18 +3164,13 @@
               <a:rPr lang="es-ES"/>
               <a:t>Quinto nivel</a:t>
             </a:r>
-          </a:p>
-        </p:txBody>
-      </p:sp>
-      <p:sp>
-        <p:nvSpPr>
-          <p:cNvPr id="4" name="Marcador de fecha 3">
-            <a:extLst>
-              <a:ext uri="{FF2B5EF4-FFF2-40B4-BE49-F238E27FC236}">
-                <a16:creationId xmlns:a16="http://schemas.microsoft.com/office/drawing/2014/main" id="{7C33169C-2B88-4B34-8150-5CAAE4A7B177}"/>
-              </a:ext>
-            </a:extLst>
-          </p:cNvPr>
+            <a:endParaRPr lang="en-US" dirty="0"/>
+          </a:p>
+        </p:txBody>
+      </p:sp>
+      <p:sp>
+        <p:nvSpPr>
+          <p:cNvPr id="4" name="Date Placeholder 3"/>
           <p:cNvSpPr>
             <a:spLocks noGrp="1"/>
           </p:cNvSpPr>
@@ -3327,8 +3180,8 @@
         </p:nvSpPr>
         <p:spPr>
           <a:xfrm>
-            <a:off x="838200" y="6356350"/>
-            <a:ext cx="2743200" cy="365125"/>
+            <a:off x="628650" y="6356351"/>
+            <a:ext cx="2057400" cy="365125"/>
           </a:xfrm>
           <a:prstGeom prst="rect">
             <a:avLst/>
@@ -3350,7 +3203,7 @@
           <a:p>
             <a:fld id="{857345AB-E265-4E05-A009-C7E62629F4CB}" type="datetimeFigureOut">
               <a:rPr lang="es-ES" smtClean="0"/>
-              <a:t>10/10/2018</a:t>
+              <a:t>11/10/2018</a:t>
             </a:fld>
             <a:endParaRPr lang="es-ES"/>
           </a:p>
@@ -3358,13 +3211,7 @@
       </p:sp>
       <p:sp>
         <p:nvSpPr>
-          <p:cNvPr id="5" name="Marcador de pie de página 4">
-            <a:extLst>
-              <a:ext uri="{FF2B5EF4-FFF2-40B4-BE49-F238E27FC236}">
-                <a16:creationId xmlns:a16="http://schemas.microsoft.com/office/drawing/2014/main" id="{4DDC44D4-4143-432C-A0C5-623607E9752A}"/>
-              </a:ext>
-            </a:extLst>
-          </p:cNvPr>
+          <p:cNvPr id="5" name="Footer Placeholder 4"/>
           <p:cNvSpPr>
             <a:spLocks noGrp="1"/>
           </p:cNvSpPr>
@@ -3374,8 +3221,8 @@
         </p:nvSpPr>
         <p:spPr>
           <a:xfrm>
-            <a:off x="4038600" y="6356350"/>
-            <a:ext cx="4114800" cy="365125"/>
+            <a:off x="3028950" y="6356351"/>
+            <a:ext cx="3086100" cy="365125"/>
           </a:xfrm>
           <a:prstGeom prst="rect">
             <a:avLst/>
@@ -3401,13 +3248,7 @@
       </p:sp>
       <p:sp>
         <p:nvSpPr>
-          <p:cNvPr id="6" name="Marcador de número de diapositiva 5">
-            <a:extLst>
-              <a:ext uri="{FF2B5EF4-FFF2-40B4-BE49-F238E27FC236}">
-                <a16:creationId xmlns:a16="http://schemas.microsoft.com/office/drawing/2014/main" id="{ECFE4F35-74D7-48AA-81C2-0172B3773BAD}"/>
-              </a:ext>
-            </a:extLst>
-          </p:cNvPr>
+          <p:cNvPr id="6" name="Slide Number Placeholder 5"/>
           <p:cNvSpPr>
             <a:spLocks noGrp="1"/>
           </p:cNvSpPr>
@@ -3417,8 +3258,8 @@
         </p:nvSpPr>
         <p:spPr>
           <a:xfrm>
-            <a:off x="8610600" y="6356350"/>
-            <a:ext cx="2743200" cy="365125"/>
+            <a:off x="6457950" y="6356351"/>
+            <a:ext cx="2057400" cy="365125"/>
           </a:xfrm>
           <a:prstGeom prst="rect">
             <a:avLst/>
@@ -3440,7 +3281,7 @@
           <a:p>
             <a:fld id="{400E5944-F18F-4AFE-ADBC-74FE20CD496B}" type="slidenum">
               <a:rPr lang="es-ES" smtClean="0"/>
-              <a:t>‹#›</a:t>
+              <a:t>‹Nº›</a:t>
             </a:fld>
             <a:endParaRPr lang="es-ES"/>
           </a:p>
@@ -3449,23 +3290,23 @@
     </p:spTree>
     <p:extLst>
       <p:ext uri="{BB962C8B-B14F-4D97-AF65-F5344CB8AC3E}">
-        <p14:creationId xmlns:p14="http://schemas.microsoft.com/office/powerpoint/2010/main" val="186333795"/>
+        <p14:creationId xmlns:p14="http://schemas.microsoft.com/office/powerpoint/2010/main" val="1598302502"/>
       </p:ext>
     </p:extLst>
   </p:cSld>
   <p:clrMap bg1="lt1" tx1="dk1" bg2="lt2" tx2="dk2" accent1="accent1" accent2="accent2" accent3="accent3" accent4="accent4" accent5="accent5" accent6="accent6" hlink="hlink" folHlink="folHlink"/>
   <p:sldLayoutIdLst>
-    <p:sldLayoutId id="2147483649" r:id="rId1"/>
-    <p:sldLayoutId id="2147483650" r:id="rId2"/>
-    <p:sldLayoutId id="2147483651" r:id="rId3"/>
-    <p:sldLayoutId id="2147483652" r:id="rId4"/>
-    <p:sldLayoutId id="2147483653" r:id="rId5"/>
-    <p:sldLayoutId id="2147483654" r:id="rId6"/>
-    <p:sldLayoutId id="2147483655" r:id="rId7"/>
-    <p:sldLayoutId id="2147483656" r:id="rId8"/>
-    <p:sldLayoutId id="2147483657" r:id="rId9"/>
-    <p:sldLayoutId id="2147483658" r:id="rId10"/>
-    <p:sldLayoutId id="2147483659" r:id="rId11"/>
+    <p:sldLayoutId id="2147483661" r:id="rId1"/>
+    <p:sldLayoutId id="2147483662" r:id="rId2"/>
+    <p:sldLayoutId id="2147483663" r:id="rId3"/>
+    <p:sldLayoutId id="2147483664" r:id="rId4"/>
+    <p:sldLayoutId id="2147483665" r:id="rId5"/>
+    <p:sldLayoutId id="2147483666" r:id="rId6"/>
+    <p:sldLayoutId id="2147483667" r:id="rId7"/>
+    <p:sldLayoutId id="2147483668" r:id="rId8"/>
+    <p:sldLayoutId id="2147483669" r:id="rId9"/>
+    <p:sldLayoutId id="2147483670" r:id="rId10"/>
+    <p:sldLayoutId id="2147483671" r:id="rId11"/>
   </p:sldLayoutIdLst>
   <p:txStyles>
     <p:titleStyle>
@@ -3653,7 +3494,7 @@
     </p:bodyStyle>
     <p:otherStyle>
       <a:defPPr>
-        <a:defRPr lang="es-ES"/>
+        <a:defRPr lang="en-US"/>
       </a:defPPr>
       <a:lvl1pPr marL="0" algn="l" defTabSz="914400" rtl="0" eaLnBrk="1" latinLnBrk="0" hangingPunct="1">
         <a:defRPr sz="1800" kern="1200">
@@ -3767,157 +3608,72 @@
           <a:chExt cx="0" cy="0"/>
         </a:xfrm>
       </p:grpSpPr>
-      <p:sp>
-        <p:nvSpPr>
-          <p:cNvPr id="9" name="Rectángulo 3">
+      <p:pic>
+        <p:nvPicPr>
+          <p:cNvPr id="3" name="Imagen 2" descr="[COMPRESIONLEVEL=1];&#10;[COLORBITS=3]">
             <a:extLst>
               <a:ext uri="{FF2B5EF4-FFF2-40B4-BE49-F238E27FC236}">
-                <a16:creationId xmlns:a16="http://schemas.microsoft.com/office/drawing/2014/main" id="{C2FF6423-A102-4CDD-8F90-7BE219F72F09}"/>
+                <a16:creationId xmlns:a16="http://schemas.microsoft.com/office/drawing/2014/main" id="{54B3344E-1FFC-4B69-9491-53B9E0FF5CB6}"/>
               </a:ext>
             </a:extLst>
           </p:cNvPr>
-          <p:cNvSpPr/>
+          <p:cNvPicPr>
+            <a:picLocks noChangeAspect="1"/>
+          </p:cNvPicPr>
           <p:nvPr/>
-        </p:nvSpPr>
+        </p:nvPicPr>
+        <p:blipFill>
+          <a:blip r:embed="rId3">
+            <a:extLst>
+              <a:ext uri="{28A0092B-C50C-407E-A947-70E740481C1C}">
+                <a14:useLocalDpi xmlns:a14="http://schemas.microsoft.com/office/drawing/2010/main" val="0"/>
+              </a:ext>
+            </a:extLst>
+          </a:blip>
+          <a:stretch>
+            <a:fillRect/>
+          </a:stretch>
+        </p:blipFill>
         <p:spPr>
           <a:xfrm>
-            <a:off x="0" y="6257637"/>
-            <a:ext cx="7715400" cy="600363"/>
+            <a:off x="0" y="379476"/>
+            <a:ext cx="9144000" cy="6099048"/>
           </a:xfrm>
           <a:prstGeom prst="rect">
             <a:avLst/>
           </a:prstGeom>
-          <a:solidFill>
-            <a:schemeClr val="accent3"/>
-          </a:solidFill>
         </p:spPr>
-        <p:style>
-          <a:lnRef idx="2">
-            <a:schemeClr val="accent1">
-              <a:shade val="50000"/>
-            </a:schemeClr>
-          </a:lnRef>
-          <a:fillRef idx="1">
-            <a:schemeClr val="accent1"/>
-          </a:fillRef>
-          <a:effectRef idx="0">
-            <a:schemeClr val="accent1"/>
-          </a:effectRef>
-          <a:fontRef idx="minor">
-            <a:schemeClr val="lt1"/>
-          </a:fontRef>
-        </p:style>
-        <p:txBody>
-          <a:bodyPr rtlCol="0" anchor="ctr"/>
-          <a:lstStyle/>
-          <a:p>
-            <a:pPr algn="ctr"/>
-            <a:endParaRPr lang="es-ES" dirty="0"/>
-          </a:p>
-        </p:txBody>
-      </p:sp>
-      <p:sp>
-        <p:nvSpPr>
-          <p:cNvPr id="8" name="Rectángulo 3">
-            <a:extLst>
-              <a:ext uri="{FF2B5EF4-FFF2-40B4-BE49-F238E27FC236}">
-                <a16:creationId xmlns:a16="http://schemas.microsoft.com/office/drawing/2014/main" id="{C2FF6423-A102-4CDD-8F90-7BE219F72F09}"/>
-              </a:ext>
-            </a:extLst>
-          </p:cNvPr>
-          <p:cNvSpPr/>
-          <p:nvPr/>
-        </p:nvSpPr>
-        <p:spPr>
-          <a:xfrm>
-            <a:off x="1393239" y="2878754"/>
-            <a:ext cx="952797" cy="3409013"/>
-          </a:xfrm>
-          <a:prstGeom prst="rect">
-            <a:avLst/>
-          </a:prstGeom>
-          <a:solidFill>
-            <a:schemeClr val="accent6">
-              <a:lumMod val="75000"/>
-            </a:schemeClr>
-          </a:solidFill>
-        </p:spPr>
-        <p:style>
-          <a:lnRef idx="2">
-            <a:schemeClr val="accent1">
-              <a:shade val="50000"/>
-            </a:schemeClr>
-          </a:lnRef>
-          <a:fillRef idx="1">
-            <a:schemeClr val="accent1"/>
-          </a:fillRef>
-          <a:effectRef idx="0">
-            <a:schemeClr val="accent1"/>
-          </a:effectRef>
-          <a:fontRef idx="minor">
-            <a:schemeClr val="lt1"/>
-          </a:fontRef>
-        </p:style>
-        <p:txBody>
-          <a:bodyPr rtlCol="0" anchor="ctr"/>
-          <a:lstStyle/>
-          <a:p>
-            <a:pPr algn="ctr"/>
-            <a:endParaRPr lang="es-ES" dirty="0"/>
-          </a:p>
-        </p:txBody>
-      </p:sp>
-      <p:sp>
-        <p:nvSpPr>
-          <p:cNvPr id="6" name="Rectángulo 3">
-            <a:extLst>
-              <a:ext uri="{FF2B5EF4-FFF2-40B4-BE49-F238E27FC236}">
-                <a16:creationId xmlns:a16="http://schemas.microsoft.com/office/drawing/2014/main" id="{C2FF6423-A102-4CDD-8F90-7BE219F72F09}"/>
-              </a:ext>
-            </a:extLst>
-          </p:cNvPr>
-          <p:cNvSpPr/>
-          <p:nvPr/>
-        </p:nvSpPr>
-        <p:spPr>
-          <a:xfrm>
-            <a:off x="8331200" y="2198255"/>
-            <a:ext cx="3158835" cy="4089512"/>
-          </a:xfrm>
-          <a:prstGeom prst="rect">
-            <a:avLst/>
-          </a:prstGeom>
-          <a:solidFill>
-            <a:schemeClr val="accent2">
-              <a:lumMod val="75000"/>
-            </a:schemeClr>
-          </a:solidFill>
-        </p:spPr>
-        <p:style>
-          <a:lnRef idx="2">
-            <a:schemeClr val="accent1">
-              <a:shade val="50000"/>
-            </a:schemeClr>
-          </a:lnRef>
-          <a:fillRef idx="1">
-            <a:schemeClr val="accent1"/>
-          </a:fillRef>
-          <a:effectRef idx="0">
-            <a:schemeClr val="accent1"/>
-          </a:effectRef>
-          <a:fontRef idx="minor">
-            <a:schemeClr val="lt1"/>
-          </a:fontRef>
-        </p:style>
-        <p:txBody>
-          <a:bodyPr rtlCol="0" anchor="ctr"/>
-          <a:lstStyle/>
-          <a:p>
-            <a:pPr algn="ctr"/>
-            <a:endParaRPr lang="es-ES" dirty="0"/>
-          </a:p>
-        </p:txBody>
-      </p:sp>
+      </p:pic>
+    </p:spTree>
+    <p:extLst>
+      <p:ext uri="{BB962C8B-B14F-4D97-AF65-F5344CB8AC3E}">
+        <p14:creationId xmlns:p14="http://schemas.microsoft.com/office/powerpoint/2010/main" val="2186432323"/>
+      </p:ext>
+    </p:extLst>
+  </p:cSld>
+  <p:clrMapOvr>
+    <a:masterClrMapping/>
+  </p:clrMapOvr>
+</p:sld>
+</file>
+
+<file path=ppt/slides/slide2.xml><?xml version="1.0" encoding="utf-8"?>
+<p:sld xmlns:a="http://schemas.openxmlformats.org/drawingml/2006/main" xmlns:r="http://schemas.openxmlformats.org/officeDocument/2006/relationships" xmlns:p="http://schemas.openxmlformats.org/presentationml/2006/main">
+  <p:cSld>
+    <p:spTree>
+      <p:nvGrpSpPr>
+        <p:cNvPr id="1" name=""/>
+        <p:cNvGrpSpPr/>
+        <p:nvPr/>
+      </p:nvGrpSpPr>
+      <p:grpSpPr>
+        <a:xfrm>
+          <a:off x="0" y="0"/>
+          <a:ext cx="0" cy="0"/>
+          <a:chOff x="0" y="0"/>
+          <a:chExt cx="0" cy="0"/>
+        </a:xfrm>
+      </p:grpSpPr>
       <p:sp>
         <p:nvSpPr>
           <p:cNvPr id="5" name="Rectángulo 3">
@@ -3932,8 +3688,8 @@
         </p:nvSpPr>
         <p:spPr>
           <a:xfrm>
-            <a:off x="575821" y="359423"/>
-            <a:ext cx="6804034" cy="3409013"/>
+            <a:off x="0" y="0"/>
+            <a:ext cx="9144000" cy="6858000"/>
           </a:xfrm>
           <a:prstGeom prst="rect">
             <a:avLst/>
@@ -3966,7 +3722,158 @@
           <a:lstStyle/>
           <a:p>
             <a:pPr algn="ctr"/>
-            <a:endParaRPr lang="es-ES" dirty="0"/>
+            <a:endParaRPr lang="es-ES" sz="1350" dirty="0"/>
+          </a:p>
+        </p:txBody>
+      </p:sp>
+      <p:sp>
+        <p:nvSpPr>
+          <p:cNvPr id="9" name="Rectángulo 3">
+            <a:extLst>
+              <a:ext uri="{FF2B5EF4-FFF2-40B4-BE49-F238E27FC236}">
+                <a16:creationId xmlns:a16="http://schemas.microsoft.com/office/drawing/2014/main" id="{C2FF6423-A102-4CDD-8F90-7BE219F72F09}"/>
+              </a:ext>
+            </a:extLst>
+          </p:cNvPr>
+          <p:cNvSpPr/>
+          <p:nvPr/>
+        </p:nvSpPr>
+        <p:spPr>
+          <a:xfrm>
+            <a:off x="431866" y="5347939"/>
+            <a:ext cx="5786550" cy="450272"/>
+          </a:xfrm>
+          <a:prstGeom prst="rect">
+            <a:avLst/>
+          </a:prstGeom>
+          <a:solidFill>
+            <a:schemeClr val="accent3"/>
+          </a:solidFill>
+        </p:spPr>
+        <p:style>
+          <a:lnRef idx="2">
+            <a:schemeClr val="accent1">
+              <a:shade val="50000"/>
+            </a:schemeClr>
+          </a:lnRef>
+          <a:fillRef idx="1">
+            <a:schemeClr val="accent1"/>
+          </a:fillRef>
+          <a:effectRef idx="0">
+            <a:schemeClr val="accent1"/>
+          </a:effectRef>
+          <a:fontRef idx="minor">
+            <a:schemeClr val="lt1"/>
+          </a:fontRef>
+        </p:style>
+        <p:txBody>
+          <a:bodyPr rtlCol="0" anchor="ctr"/>
+          <a:lstStyle/>
+          <a:p>
+            <a:pPr algn="ctr"/>
+            <a:endParaRPr lang="es-ES" sz="1350" dirty="0"/>
+          </a:p>
+        </p:txBody>
+      </p:sp>
+      <p:sp>
+        <p:nvSpPr>
+          <p:cNvPr id="8" name="Rectángulo 3">
+            <a:extLst>
+              <a:ext uri="{FF2B5EF4-FFF2-40B4-BE49-F238E27FC236}">
+                <a16:creationId xmlns:a16="http://schemas.microsoft.com/office/drawing/2014/main" id="{C2FF6423-A102-4CDD-8F90-7BE219F72F09}"/>
+              </a:ext>
+            </a:extLst>
+          </p:cNvPr>
+          <p:cNvSpPr/>
+          <p:nvPr/>
+        </p:nvSpPr>
+        <p:spPr>
+          <a:xfrm>
+            <a:off x="1044930" y="3016316"/>
+            <a:ext cx="714598" cy="2556760"/>
+          </a:xfrm>
+          <a:prstGeom prst="rect">
+            <a:avLst/>
+          </a:prstGeom>
+          <a:solidFill>
+            <a:schemeClr val="accent6">
+              <a:lumMod val="75000"/>
+            </a:schemeClr>
+          </a:solidFill>
+        </p:spPr>
+        <p:style>
+          <a:lnRef idx="2">
+            <a:schemeClr val="accent1">
+              <a:shade val="50000"/>
+            </a:schemeClr>
+          </a:lnRef>
+          <a:fillRef idx="1">
+            <a:schemeClr val="accent1"/>
+          </a:fillRef>
+          <a:effectRef idx="0">
+            <a:schemeClr val="accent1"/>
+          </a:effectRef>
+          <a:fontRef idx="minor">
+            <a:schemeClr val="lt1"/>
+          </a:fontRef>
+        </p:style>
+        <p:txBody>
+          <a:bodyPr rtlCol="0" anchor="ctr"/>
+          <a:lstStyle/>
+          <a:p>
+            <a:pPr algn="ctr"/>
+            <a:endParaRPr lang="es-ES" sz="1350" dirty="0"/>
+          </a:p>
+        </p:txBody>
+      </p:sp>
+      <p:sp>
+        <p:nvSpPr>
+          <p:cNvPr id="6" name="Rectángulo 3">
+            <a:extLst>
+              <a:ext uri="{FF2B5EF4-FFF2-40B4-BE49-F238E27FC236}">
+                <a16:creationId xmlns:a16="http://schemas.microsoft.com/office/drawing/2014/main" id="{C2FF6423-A102-4CDD-8F90-7BE219F72F09}"/>
+              </a:ext>
+            </a:extLst>
+          </p:cNvPr>
+          <p:cNvSpPr/>
+          <p:nvPr/>
+        </p:nvSpPr>
+        <p:spPr>
+          <a:xfrm>
+            <a:off x="6248401" y="2505941"/>
+            <a:ext cx="2369126" cy="3067134"/>
+          </a:xfrm>
+          <a:prstGeom prst="rect">
+            <a:avLst/>
+          </a:prstGeom>
+          <a:solidFill>
+            <a:schemeClr val="accent2">
+              <a:lumMod val="75000"/>
+            </a:schemeClr>
+          </a:solidFill>
+        </p:spPr>
+        <p:style>
+          <a:lnRef idx="2">
+            <a:schemeClr val="accent1">
+              <a:shade val="50000"/>
+            </a:schemeClr>
+          </a:lnRef>
+          <a:fillRef idx="1">
+            <a:schemeClr val="accent1"/>
+          </a:fillRef>
+          <a:effectRef idx="0">
+            <a:schemeClr val="accent1"/>
+          </a:effectRef>
+          <a:fontRef idx="minor">
+            <a:schemeClr val="lt1"/>
+          </a:fontRef>
+        </p:style>
+        <p:txBody>
+          <a:bodyPr rtlCol="0" anchor="ctr"/>
+          <a:lstStyle/>
+          <a:p>
+            <a:pPr algn="ctr"/>
+            <a:endParaRPr lang="es-ES" sz="1350" dirty="0"/>
           </a:p>
         </p:txBody>
       </p:sp>
@@ -3984,8 +3891,8 @@
         </p:nvSpPr>
         <p:spPr>
           <a:xfrm>
-            <a:off x="5960618" y="1052945"/>
-            <a:ext cx="4088546" cy="1868634"/>
+            <a:off x="4470463" y="1646959"/>
+            <a:ext cx="3066410" cy="1401476"/>
           </a:xfrm>
           <a:prstGeom prst="rect">
             <a:avLst/>
@@ -4015,7 +3922,7 @@
           <a:lstStyle/>
           <a:p>
             <a:pPr algn="ctr"/>
-            <a:endParaRPr lang="es-ES" dirty="0"/>
+            <a:endParaRPr lang="es-ES" sz="1350" dirty="0"/>
           </a:p>
         </p:txBody>
       </p:sp>
@@ -4032,10 +3939,710 @@
 </p:sld>
 </file>
 
+<file path=ppt/slides/slide3.xml><?xml version="1.0" encoding="utf-8"?>
+<p:sld xmlns:a="http://schemas.openxmlformats.org/drawingml/2006/main" xmlns:r="http://schemas.openxmlformats.org/officeDocument/2006/relationships" xmlns:p="http://schemas.openxmlformats.org/presentationml/2006/main">
+  <p:cSld>
+    <p:spTree>
+      <p:nvGrpSpPr>
+        <p:cNvPr id="1" name=""/>
+        <p:cNvGrpSpPr/>
+        <p:nvPr/>
+      </p:nvGrpSpPr>
+      <p:grpSpPr>
+        <a:xfrm>
+          <a:off x="0" y="0"/>
+          <a:ext cx="0" cy="0"/>
+          <a:chOff x="0" y="0"/>
+          <a:chExt cx="0" cy="0"/>
+        </a:xfrm>
+      </p:grpSpPr>
+      <p:sp>
+        <p:nvSpPr>
+          <p:cNvPr id="4" name="Rectángulo 3">
+            <a:extLst>
+              <a:ext uri="{FF2B5EF4-FFF2-40B4-BE49-F238E27FC236}">
+                <a16:creationId xmlns:a16="http://schemas.microsoft.com/office/drawing/2014/main" id="{29DDDCE7-3BA4-4E45-BDE0-4254EA1FFB0D}"/>
+              </a:ext>
+            </a:extLst>
+          </p:cNvPr>
+          <p:cNvSpPr/>
+          <p:nvPr/>
+        </p:nvSpPr>
+        <p:spPr>
+          <a:xfrm>
+            <a:off x="0" y="0"/>
+            <a:ext cx="759656" cy="6858000"/>
+          </a:xfrm>
+          <a:prstGeom prst="rect">
+            <a:avLst/>
+          </a:prstGeom>
+        </p:spPr>
+        <p:style>
+          <a:lnRef idx="2">
+            <a:schemeClr val="accent1">
+              <a:shade val="50000"/>
+            </a:schemeClr>
+          </a:lnRef>
+          <a:fillRef idx="1">
+            <a:schemeClr val="accent1"/>
+          </a:fillRef>
+          <a:effectRef idx="0">
+            <a:schemeClr val="accent1"/>
+          </a:effectRef>
+          <a:fontRef idx="minor">
+            <a:schemeClr val="lt1"/>
+          </a:fontRef>
+        </p:style>
+        <p:txBody>
+          <a:bodyPr rtlCol="0" anchor="ctr"/>
+          <a:lstStyle/>
+          <a:p>
+            <a:pPr algn="ctr"/>
+            <a:r>
+              <a:rPr lang="es-ES" sz="1350" dirty="0"/>
+              <a:t>[NAME=</a:t>
+            </a:r>
+            <a:r>
+              <a:rPr lang="es-ES" sz="1350" dirty="0" err="1"/>
+              <a:t>Left</a:t>
+            </a:r>
+            <a:r>
+              <a:rPr lang="es-ES" sz="1350" dirty="0"/>
+              <a:t> bar]</a:t>
+            </a:r>
+          </a:p>
+        </p:txBody>
+      </p:sp>
+      <p:sp>
+        <p:nvSpPr>
+          <p:cNvPr id="5" name="Rectángulo 4">
+            <a:extLst>
+              <a:ext uri="{FF2B5EF4-FFF2-40B4-BE49-F238E27FC236}">
+                <a16:creationId xmlns:a16="http://schemas.microsoft.com/office/drawing/2014/main" id="{99D90750-9E6E-4531-8E1C-DC9F55A2BC2E}"/>
+              </a:ext>
+            </a:extLst>
+          </p:cNvPr>
+          <p:cNvSpPr/>
+          <p:nvPr/>
+        </p:nvSpPr>
+        <p:spPr>
+          <a:xfrm>
+            <a:off x="759656" y="5914141"/>
+            <a:ext cx="8384345" cy="943859"/>
+          </a:xfrm>
+          <a:prstGeom prst="rect">
+            <a:avLst/>
+          </a:prstGeom>
+          <a:solidFill>
+            <a:schemeClr val="bg2">
+              <a:lumMod val="75000"/>
+            </a:schemeClr>
+          </a:solidFill>
+        </p:spPr>
+        <p:style>
+          <a:lnRef idx="2">
+            <a:schemeClr val="accent1">
+              <a:shade val="50000"/>
+            </a:schemeClr>
+          </a:lnRef>
+          <a:fillRef idx="1">
+            <a:schemeClr val="accent1"/>
+          </a:fillRef>
+          <a:effectRef idx="0">
+            <a:schemeClr val="accent1"/>
+          </a:effectRef>
+          <a:fontRef idx="minor">
+            <a:schemeClr val="lt1"/>
+          </a:fontRef>
+        </p:style>
+        <p:txBody>
+          <a:bodyPr rtlCol="0" anchor="ctr"/>
+          <a:lstStyle/>
+          <a:p>
+            <a:pPr algn="ctr"/>
+            <a:r>
+              <a:rPr lang="es-ES" sz="1350" dirty="0"/>
+              <a:t>[NAME=</a:t>
+            </a:r>
+            <a:r>
+              <a:rPr lang="es-ES" sz="1350" dirty="0" err="1"/>
+              <a:t>Bottom</a:t>
+            </a:r>
+            <a:r>
+              <a:rPr lang="es-ES" sz="1350" dirty="0"/>
+              <a:t> </a:t>
+            </a:r>
+            <a:r>
+              <a:rPr lang="es-ES" sz="1350" dirty="0" err="1"/>
+              <a:t>properties</a:t>
+            </a:r>
+            <a:r>
+              <a:rPr lang="es-ES" sz="1350" dirty="0"/>
+              <a:t>];</a:t>
+            </a:r>
+          </a:p>
+          <a:p>
+            <a:pPr algn="ctr"/>
+            <a:r>
+              <a:rPr lang="es-ES" sz="1350" dirty="0"/>
+              <a:t>[BORDER]</a:t>
+            </a:r>
+          </a:p>
+        </p:txBody>
+      </p:sp>
+      <p:sp>
+        <p:nvSpPr>
+          <p:cNvPr id="6" name="Rectángulo 3">
+            <a:extLst>
+              <a:ext uri="{FF2B5EF4-FFF2-40B4-BE49-F238E27FC236}">
+                <a16:creationId xmlns:a16="http://schemas.microsoft.com/office/drawing/2014/main" id="{34B18D5C-5AA9-4C66-8B1A-D49D9B35371F}"/>
+              </a:ext>
+            </a:extLst>
+          </p:cNvPr>
+          <p:cNvSpPr/>
+          <p:nvPr/>
+        </p:nvSpPr>
+        <p:spPr>
+          <a:xfrm>
+            <a:off x="6286306" y="593889"/>
+            <a:ext cx="2369126" cy="3809119"/>
+          </a:xfrm>
+          <a:prstGeom prst="rect">
+            <a:avLst/>
+          </a:prstGeom>
+          <a:solidFill>
+            <a:schemeClr val="accent2">
+              <a:lumMod val="75000"/>
+            </a:schemeClr>
+          </a:solidFill>
+        </p:spPr>
+        <p:style>
+          <a:lnRef idx="2">
+            <a:schemeClr val="accent1">
+              <a:shade val="50000"/>
+            </a:schemeClr>
+          </a:lnRef>
+          <a:fillRef idx="1">
+            <a:schemeClr val="accent1"/>
+          </a:fillRef>
+          <a:effectRef idx="0">
+            <a:schemeClr val="accent1"/>
+          </a:effectRef>
+          <a:fontRef idx="minor">
+            <a:schemeClr val="lt1"/>
+          </a:fontRef>
+        </p:style>
+        <p:txBody>
+          <a:bodyPr rtlCol="0" anchor="ctr"/>
+          <a:lstStyle/>
+          <a:p>
+            <a:pPr algn="ctr"/>
+            <a:r>
+              <a:rPr lang="es-ES" sz="1350" dirty="0"/>
+              <a:t>[NAME=</a:t>
+            </a:r>
+            <a:r>
+              <a:rPr lang="es-ES" sz="1350" dirty="0" err="1"/>
+              <a:t>Random</a:t>
+            </a:r>
+            <a:r>
+              <a:rPr lang="es-ES" sz="1350" dirty="0"/>
+              <a:t> Orange box]</a:t>
+            </a:r>
+          </a:p>
+        </p:txBody>
+      </p:sp>
+      <p:sp>
+        <p:nvSpPr>
+          <p:cNvPr id="7" name="Rectángulo 3">
+            <a:extLst>
+              <a:ext uri="{FF2B5EF4-FFF2-40B4-BE49-F238E27FC236}">
+                <a16:creationId xmlns:a16="http://schemas.microsoft.com/office/drawing/2014/main" id="{55D55328-6F18-4099-B732-464AD35360D6}"/>
+              </a:ext>
+            </a:extLst>
+          </p:cNvPr>
+          <p:cNvSpPr/>
+          <p:nvPr/>
+        </p:nvSpPr>
+        <p:spPr>
+          <a:xfrm>
+            <a:off x="989814" y="851366"/>
+            <a:ext cx="3996965" cy="1835273"/>
+          </a:xfrm>
+          <a:prstGeom prst="rect">
+            <a:avLst/>
+          </a:prstGeom>
+          <a:solidFill>
+            <a:srgbClr val="7030A0"/>
+          </a:solidFill>
+          <a:ln w="38100">
+            <a:solidFill>
+              <a:srgbClr val="FFD966">
+                <a:alpha val="49804"/>
+              </a:srgbClr>
+            </a:solidFill>
+          </a:ln>
+        </p:spPr>
+        <p:style>
+          <a:lnRef idx="2">
+            <a:schemeClr val="accent1">
+              <a:shade val="50000"/>
+            </a:schemeClr>
+          </a:lnRef>
+          <a:fillRef idx="1">
+            <a:schemeClr val="accent1"/>
+          </a:fillRef>
+          <a:effectRef idx="0">
+            <a:schemeClr val="accent1"/>
+          </a:effectRef>
+          <a:fontRef idx="minor">
+            <a:schemeClr val="lt1"/>
+          </a:fontRef>
+        </p:style>
+        <p:txBody>
+          <a:bodyPr rtlCol="0" anchor="ctr"/>
+          <a:lstStyle/>
+          <a:p>
+            <a:pPr algn="ctr"/>
+            <a:r>
+              <a:rPr lang="es-ES" sz="1350" dirty="0"/>
+              <a:t>[NAME=Solid </a:t>
+            </a:r>
+            <a:r>
+              <a:rPr lang="es-ES" sz="1350" dirty="0" err="1"/>
+              <a:t>purple</a:t>
+            </a:r>
+            <a:r>
+              <a:rPr lang="es-ES" sz="1350" dirty="0"/>
+              <a:t> </a:t>
+            </a:r>
+            <a:r>
+              <a:rPr lang="es-ES" sz="1350" dirty="0" err="1"/>
+              <a:t>with</a:t>
+            </a:r>
+            <a:r>
+              <a:rPr lang="es-ES" sz="1350" dirty="0"/>
+              <a:t> </a:t>
+            </a:r>
+            <a:r>
+              <a:rPr lang="es-ES" sz="1350" dirty="0" err="1"/>
+              <a:t>transparent</a:t>
+            </a:r>
+            <a:r>
+              <a:rPr lang="es-ES" sz="1350" dirty="0"/>
+              <a:t> </a:t>
+            </a:r>
+            <a:r>
+              <a:rPr lang="es-ES" sz="1350" dirty="0" err="1"/>
+              <a:t>border</a:t>
+            </a:r>
+            <a:r>
+              <a:rPr lang="es-ES" sz="1350" dirty="0"/>
+              <a:t>];</a:t>
+            </a:r>
+          </a:p>
+          <a:p>
+            <a:pPr algn="ctr"/>
+            <a:r>
+              <a:rPr lang="es-ES" sz="1350" dirty="0"/>
+              <a:t>[BORDER];</a:t>
+            </a:r>
+          </a:p>
+          <a:p>
+            <a:pPr algn="ctr"/>
+            <a:r>
+              <a:rPr lang="es-ES" sz="1350" dirty="0"/>
+              <a:t>[TRANSPARENT]</a:t>
+            </a:r>
+          </a:p>
+        </p:txBody>
+      </p:sp>
+      <p:sp>
+        <p:nvSpPr>
+          <p:cNvPr id="8" name="Rectángulo 3">
+            <a:extLst>
+              <a:ext uri="{FF2B5EF4-FFF2-40B4-BE49-F238E27FC236}">
+                <a16:creationId xmlns:a16="http://schemas.microsoft.com/office/drawing/2014/main" id="{FB329AE3-5F8D-4424-8762-8395299AFD7C}"/>
+              </a:ext>
+            </a:extLst>
+          </p:cNvPr>
+          <p:cNvSpPr/>
+          <p:nvPr/>
+        </p:nvSpPr>
+        <p:spPr>
+          <a:xfrm>
+            <a:off x="1870645" y="3255904"/>
+            <a:ext cx="6012520" cy="982697"/>
+          </a:xfrm>
+          <a:prstGeom prst="rect">
+            <a:avLst/>
+          </a:prstGeom>
+          <a:solidFill>
+            <a:schemeClr val="accent6">
+              <a:lumMod val="75000"/>
+            </a:schemeClr>
+          </a:solidFill>
+        </p:spPr>
+        <p:style>
+          <a:lnRef idx="2">
+            <a:schemeClr val="accent1">
+              <a:shade val="50000"/>
+            </a:schemeClr>
+          </a:lnRef>
+          <a:fillRef idx="1">
+            <a:schemeClr val="accent1"/>
+          </a:fillRef>
+          <a:effectRef idx="0">
+            <a:schemeClr val="accent1"/>
+          </a:effectRef>
+          <a:fontRef idx="minor">
+            <a:schemeClr val="lt1"/>
+          </a:fontRef>
+        </p:style>
+        <p:txBody>
+          <a:bodyPr rtlCol="0" anchor="ctr"/>
+          <a:lstStyle/>
+          <a:p>
+            <a:pPr algn="ctr"/>
+            <a:r>
+              <a:rPr lang="es-ES" sz="1350" dirty="0"/>
+              <a:t>[NAME=Basic </a:t>
+            </a:r>
+            <a:r>
+              <a:rPr lang="es-ES" sz="1350" dirty="0" err="1"/>
+              <a:t>transparency</a:t>
+            </a:r>
+            <a:r>
+              <a:rPr lang="es-ES" sz="1350" dirty="0"/>
+              <a:t>];</a:t>
+            </a:r>
+          </a:p>
+          <a:p>
+            <a:pPr algn="ctr"/>
+            <a:r>
+              <a:rPr lang="es-ES" sz="1350" dirty="0"/>
+              <a:t>[TRANSPARENT]</a:t>
+            </a:r>
+          </a:p>
+        </p:txBody>
+      </p:sp>
+      <p:sp>
+        <p:nvSpPr>
+          <p:cNvPr id="9" name="Rectángulo 3">
+            <a:extLst>
+              <a:ext uri="{FF2B5EF4-FFF2-40B4-BE49-F238E27FC236}">
+                <a16:creationId xmlns:a16="http://schemas.microsoft.com/office/drawing/2014/main" id="{AF40A7F6-A0C5-4A74-A293-DE8D835C9A4E}"/>
+              </a:ext>
+            </a:extLst>
+          </p:cNvPr>
+          <p:cNvSpPr/>
+          <p:nvPr/>
+        </p:nvSpPr>
+        <p:spPr>
+          <a:xfrm>
+            <a:off x="5279012" y="1861102"/>
+            <a:ext cx="1445022" cy="982697"/>
+          </a:xfrm>
+          <a:prstGeom prst="rect">
+            <a:avLst/>
+          </a:prstGeom>
+          <a:solidFill>
+            <a:srgbClr val="548235">
+              <a:alpha val="30196"/>
+            </a:srgbClr>
+          </a:solidFill>
+        </p:spPr>
+        <p:style>
+          <a:lnRef idx="2">
+            <a:schemeClr val="accent1">
+              <a:shade val="50000"/>
+            </a:schemeClr>
+          </a:lnRef>
+          <a:fillRef idx="1">
+            <a:schemeClr val="accent1"/>
+          </a:fillRef>
+          <a:effectRef idx="0">
+            <a:schemeClr val="accent1"/>
+          </a:effectRef>
+          <a:fontRef idx="minor">
+            <a:schemeClr val="lt1"/>
+          </a:fontRef>
+        </p:style>
+        <p:txBody>
+          <a:bodyPr rtlCol="0" anchor="ctr"/>
+          <a:lstStyle/>
+          <a:p>
+            <a:pPr algn="ctr"/>
+            <a:r>
+              <a:rPr lang="es-ES" sz="1350" dirty="0"/>
+              <a:t>[NAME=High </a:t>
+            </a:r>
+            <a:r>
+              <a:rPr lang="es-ES" sz="1350" dirty="0" err="1"/>
+              <a:t>transparency</a:t>
+            </a:r>
+            <a:r>
+              <a:rPr lang="es-ES" sz="1350" dirty="0"/>
+              <a:t>];</a:t>
+            </a:r>
+          </a:p>
+          <a:p>
+            <a:pPr algn="ctr"/>
+            <a:r>
+              <a:rPr lang="es-ES" sz="1350" dirty="0"/>
+              <a:t>[ADVANCEDTRANSPARENT]</a:t>
+            </a:r>
+          </a:p>
+        </p:txBody>
+      </p:sp>
+      <p:sp>
+        <p:nvSpPr>
+          <p:cNvPr id="10" name="Rectángulo 3">
+            <a:extLst>
+              <a:ext uri="{FF2B5EF4-FFF2-40B4-BE49-F238E27FC236}">
+                <a16:creationId xmlns:a16="http://schemas.microsoft.com/office/drawing/2014/main" id="{8C0BFE33-903D-4035-8C55-F712AD236EC4}"/>
+              </a:ext>
+            </a:extLst>
+          </p:cNvPr>
+          <p:cNvSpPr/>
+          <p:nvPr/>
+        </p:nvSpPr>
+        <p:spPr>
+          <a:xfrm>
+            <a:off x="5279012" y="360017"/>
+            <a:ext cx="1445022" cy="982697"/>
+          </a:xfrm>
+          <a:prstGeom prst="rect">
+            <a:avLst/>
+          </a:prstGeom>
+          <a:solidFill>
+            <a:srgbClr val="548235">
+              <a:alpha val="74902"/>
+            </a:srgbClr>
+          </a:solidFill>
+        </p:spPr>
+        <p:style>
+          <a:lnRef idx="2">
+            <a:schemeClr val="accent1">
+              <a:shade val="50000"/>
+            </a:schemeClr>
+          </a:lnRef>
+          <a:fillRef idx="1">
+            <a:schemeClr val="accent1"/>
+          </a:fillRef>
+          <a:effectRef idx="0">
+            <a:schemeClr val="accent1"/>
+          </a:effectRef>
+          <a:fontRef idx="minor">
+            <a:schemeClr val="lt1"/>
+          </a:fontRef>
+        </p:style>
+        <p:txBody>
+          <a:bodyPr rtlCol="0" anchor="ctr"/>
+          <a:lstStyle/>
+          <a:p>
+            <a:pPr algn="ctr"/>
+            <a:r>
+              <a:rPr lang="es-ES" sz="1350" dirty="0"/>
+              <a:t>[NAME=Low </a:t>
+            </a:r>
+            <a:r>
+              <a:rPr lang="es-ES" sz="1350" dirty="0" err="1"/>
+              <a:t>transparency</a:t>
+            </a:r>
+            <a:r>
+              <a:rPr lang="es-ES" sz="1350" dirty="0"/>
+              <a:t>];</a:t>
+            </a:r>
+          </a:p>
+          <a:p>
+            <a:pPr algn="ctr"/>
+            <a:r>
+              <a:rPr lang="es-ES" sz="1350" dirty="0"/>
+              <a:t>[ADVANCEDTRANSPARENT]</a:t>
+            </a:r>
+          </a:p>
+        </p:txBody>
+      </p:sp>
+    </p:spTree>
+    <p:extLst>
+      <p:ext uri="{BB962C8B-B14F-4D97-AF65-F5344CB8AC3E}">
+        <p14:creationId xmlns:p14="http://schemas.microsoft.com/office/powerpoint/2010/main" val="3380256703"/>
+      </p:ext>
+    </p:extLst>
+  </p:cSld>
+  <p:clrMapOvr>
+    <a:masterClrMapping/>
+  </p:clrMapOvr>
+</p:sld>
+</file>
+
+<file path=ppt/slides/slide4.xml><?xml version="1.0" encoding="utf-8"?>
+<p:sld xmlns:a="http://schemas.openxmlformats.org/drawingml/2006/main" xmlns:r="http://schemas.openxmlformats.org/officeDocument/2006/relationships" xmlns:p="http://schemas.openxmlformats.org/presentationml/2006/main">
+  <p:cSld>
+    <p:spTree>
+      <p:nvGrpSpPr>
+        <p:cNvPr id="1" name=""/>
+        <p:cNvGrpSpPr/>
+        <p:nvPr/>
+      </p:nvGrpSpPr>
+      <p:grpSpPr>
+        <a:xfrm>
+          <a:off x="0" y="0"/>
+          <a:ext cx="0" cy="0"/>
+          <a:chOff x="0" y="0"/>
+          <a:chExt cx="0" cy="0"/>
+        </a:xfrm>
+      </p:grpSpPr>
+      <p:sp>
+        <p:nvSpPr>
+          <p:cNvPr id="2" name="Título 1">
+            <a:extLst>
+              <a:ext uri="{FF2B5EF4-FFF2-40B4-BE49-F238E27FC236}">
+                <a16:creationId xmlns:a16="http://schemas.microsoft.com/office/drawing/2014/main" id="{79D1DABE-0FB0-4774-93F9-93059D82F71F}"/>
+              </a:ext>
+            </a:extLst>
+          </p:cNvPr>
+          <p:cNvSpPr>
+            <a:spLocks noGrp="1"/>
+          </p:cNvSpPr>
+          <p:nvPr>
+            <p:ph type="title"/>
+          </p:nvPr>
+        </p:nvSpPr>
+        <p:spPr/>
+        <p:txBody>
+          <a:bodyPr/>
+          <a:lstStyle/>
+          <a:p>
+            <a:endParaRPr lang="es-ES"/>
+          </a:p>
+        </p:txBody>
+      </p:sp>
+      <p:sp>
+        <p:nvSpPr>
+          <p:cNvPr id="3" name="Marcador de contenido 2">
+            <a:extLst>
+              <a:ext uri="{FF2B5EF4-FFF2-40B4-BE49-F238E27FC236}">
+                <a16:creationId xmlns:a16="http://schemas.microsoft.com/office/drawing/2014/main" id="{CAC3FCF4-2CA0-4C20-8F03-17DB04091707}"/>
+              </a:ext>
+            </a:extLst>
+          </p:cNvPr>
+          <p:cNvSpPr>
+            <a:spLocks noGrp="1"/>
+          </p:cNvSpPr>
+          <p:nvPr>
+            <p:ph idx="1"/>
+          </p:nvPr>
+        </p:nvSpPr>
+        <p:spPr/>
+        <p:txBody>
+          <a:bodyPr/>
+          <a:lstStyle/>
+          <a:p>
+            <a:endParaRPr lang="es-ES"/>
+          </a:p>
+        </p:txBody>
+      </p:sp>
+      <p:pic>
+        <p:nvPicPr>
+          <p:cNvPr id="4" name="Imagen 3" descr="[COMPRESIONLEVEL=2];&#10;[COLORBITS=4]">
+            <a:extLst>
+              <a:ext uri="{FF2B5EF4-FFF2-40B4-BE49-F238E27FC236}">
+                <a16:creationId xmlns:a16="http://schemas.microsoft.com/office/drawing/2014/main" id="{D709E116-297A-4D41-AAC2-511CB1B9F2E5}"/>
+              </a:ext>
+            </a:extLst>
+          </p:cNvPr>
+          <p:cNvPicPr>
+            <a:picLocks noChangeAspect="1"/>
+          </p:cNvPicPr>
+          <p:nvPr/>
+        </p:nvPicPr>
+        <p:blipFill>
+          <a:blip r:embed="rId2">
+            <a:extLst>
+              <a:ext uri="{28A0092B-C50C-407E-A947-70E740481C1C}">
+                <a14:useLocalDpi xmlns:a14="http://schemas.microsoft.com/office/drawing/2010/main" val="0"/>
+              </a:ext>
+            </a:extLst>
+          </a:blip>
+          <a:stretch>
+            <a:fillRect/>
+          </a:stretch>
+        </p:blipFill>
+        <p:spPr>
+          <a:xfrm>
+            <a:off x="2723486" y="744136"/>
+            <a:ext cx="4403177" cy="5369728"/>
+          </a:xfrm>
+          <a:prstGeom prst="rect">
+            <a:avLst/>
+          </a:prstGeom>
+        </p:spPr>
+      </p:pic>
+      <p:sp>
+        <p:nvSpPr>
+          <p:cNvPr id="5" name="Rectángulo 4">
+            <a:extLst>
+              <a:ext uri="{FF2B5EF4-FFF2-40B4-BE49-F238E27FC236}">
+                <a16:creationId xmlns:a16="http://schemas.microsoft.com/office/drawing/2014/main" id="{6C8B6429-F6DE-432B-8DE7-D3873076D443}"/>
+              </a:ext>
+            </a:extLst>
+          </p:cNvPr>
+          <p:cNvSpPr/>
+          <p:nvPr/>
+        </p:nvSpPr>
+        <p:spPr>
+          <a:xfrm>
+            <a:off x="754144" y="565608"/>
+            <a:ext cx="6787299" cy="5927266"/>
+          </a:xfrm>
+          <a:prstGeom prst="rect">
+            <a:avLst/>
+          </a:prstGeom>
+        </p:spPr>
+        <p:style>
+          <a:lnRef idx="2">
+            <a:schemeClr val="accent1">
+              <a:shade val="50000"/>
+            </a:schemeClr>
+          </a:lnRef>
+          <a:fillRef idx="1">
+            <a:schemeClr val="accent1"/>
+          </a:fillRef>
+          <a:effectRef idx="0">
+            <a:schemeClr val="accent1"/>
+          </a:effectRef>
+          <a:fontRef idx="minor">
+            <a:schemeClr val="lt1"/>
+          </a:fontRef>
+        </p:style>
+        <p:txBody>
+          <a:bodyPr rtlCol="0" anchor="ctr"/>
+          <a:lstStyle/>
+          <a:p>
+            <a:pPr algn="ctr"/>
+            <a:endParaRPr lang="es-ES"/>
+          </a:p>
+        </p:txBody>
+      </p:sp>
+    </p:spTree>
+    <p:extLst>
+      <p:ext uri="{BB962C8B-B14F-4D97-AF65-F5344CB8AC3E}">
+        <p14:creationId xmlns:p14="http://schemas.microsoft.com/office/powerpoint/2010/main" val="1144430510"/>
+      </p:ext>
+    </p:extLst>
+  </p:cSld>
+  <p:clrMapOvr>
+    <a:masterClrMapping/>
+  </p:clrMapOvr>
+</p:sld>
+</file>
+
 <file path=ppt/theme/theme1.xml><?xml version="1.0" encoding="utf-8"?>
 <a:theme xmlns:a="http://schemas.openxmlformats.org/drawingml/2006/main" name="Tema de Office">
   <a:themeElements>
-    <a:clrScheme name="Office">
+    <a:clrScheme name="Tema de Office">
       <a:dk1>
         <a:sysClr val="windowText" lastClr="000000"/>
       </a:dk1>
@@ -4073,7 +4680,7 @@
         <a:srgbClr val="954F72"/>
       </a:folHlink>
     </a:clrScheme>
-    <a:fontScheme name="Office">
+    <a:fontScheme name="Tema de Office">
       <a:majorFont>
         <a:latin typeface="Calibri Light" panose="020F0302020204030204"/>
         <a:ea typeface=""/>
@@ -4108,23 +4715,6 @@
         <a:font script="Viet" typeface="Times New Roman"/>
         <a:font script="Uigh" typeface="Microsoft Uighur"/>
         <a:font script="Geor" typeface="Sylfaen"/>
-        <a:font script="Armn" typeface="Arial"/>
-        <a:font script="Bugi" typeface="Leelawadee UI"/>
-        <a:font script="Bopo" typeface="Microsoft JhengHei"/>
-        <a:font script="Java" typeface="Javanese Text"/>
-        <a:font script="Lisu" typeface="Segoe UI"/>
-        <a:font script="Mymr" typeface="Myanmar Text"/>
-        <a:font script="Nkoo" typeface="Ebrima"/>
-        <a:font script="Olck" typeface="Nirmala UI"/>
-        <a:font script="Osma" typeface="Ebrima"/>
-        <a:font script="Phag" typeface="Phagspa"/>
-        <a:font script="Syrn" typeface="Estrangelo Edessa"/>
-        <a:font script="Syrj" typeface="Estrangelo Edessa"/>
-        <a:font script="Syre" typeface="Estrangelo Edessa"/>
-        <a:font script="Sora" typeface="Nirmala UI"/>
-        <a:font script="Tale" typeface="Microsoft Tai Le"/>
-        <a:font script="Talu" typeface="Microsoft New Tai Lue"/>
-        <a:font script="Tfng" typeface="Ebrima"/>
       </a:majorFont>
       <a:minorFont>
         <a:latin typeface="Calibri" panose="020F0502020204030204"/>
@@ -4160,26 +4750,9 @@
         <a:font script="Viet" typeface="Arial"/>
         <a:font script="Uigh" typeface="Microsoft Uighur"/>
         <a:font script="Geor" typeface="Sylfaen"/>
-        <a:font script="Armn" typeface="Arial"/>
-        <a:font script="Bugi" typeface="Leelawadee UI"/>
-        <a:font script="Bopo" typeface="Microsoft JhengHei"/>
-        <a:font script="Java" typeface="Javanese Text"/>
-        <a:font script="Lisu" typeface="Segoe UI"/>
-        <a:font script="Mymr" typeface="Myanmar Text"/>
-        <a:font script="Nkoo" typeface="Ebrima"/>
-        <a:font script="Olck" typeface="Nirmala UI"/>
-        <a:font script="Osma" typeface="Ebrima"/>
-        <a:font script="Phag" typeface="Phagspa"/>
-        <a:font script="Syrn" typeface="Estrangelo Edessa"/>
-        <a:font script="Syrj" typeface="Estrangelo Edessa"/>
-        <a:font script="Syre" typeface="Estrangelo Edessa"/>
-        <a:font script="Sora" typeface="Nirmala UI"/>
-        <a:font script="Tale" typeface="Microsoft Tai Le"/>
-        <a:font script="Talu" typeface="Microsoft New Tai Lue"/>
-        <a:font script="Tfng" typeface="Ebrima"/>
       </a:minorFont>
     </a:fontScheme>
-    <a:fmtScheme name="Office">
+    <a:fmtScheme name="Tema de Office">
       <a:fillStyleLst>
         <a:solidFill>
           <a:schemeClr val="phClr"/>

</xml_diff>

<commit_message>
First proposal and picture and transparency tests
</commit_message>
<xml_diff>
--- a/VerilogExample/PPVerilogEngine/main.pptx
+++ b/VerilogExample/PPVerilogEngine/main.pptx
@@ -8,9 +8,9 @@
     <p:notesMasterId r:id="rId7"/>
   </p:notesMasterIdLst>
   <p:sldIdLst>
-    <p:sldId id="260" r:id="rId2"/>
-    <p:sldId id="258" r:id="rId3"/>
-    <p:sldId id="257" r:id="rId4"/>
+    <p:sldId id="258" r:id="rId2"/>
+    <p:sldId id="257" r:id="rId3"/>
+    <p:sldId id="260" r:id="rId4"/>
     <p:sldId id="256" r:id="rId5"/>
     <p:sldId id="259" r:id="rId6"/>
   </p:sldIdLst>
@@ -359,7 +359,7 @@
           <a:p>
             <a:fld id="{FD4630FF-7EAB-466A-9F54-35D39D4AE102}" type="slidenum">
               <a:rPr lang="en-US" smtClean="0"/>
-              <a:t>‹Nº›</a:t>
+              <a:t>‹#›</a:t>
             </a:fld>
             <a:endParaRPr lang="en-US"/>
           </a:p>
@@ -550,7 +550,7 @@
     </p:spTree>
     <p:extLst>
       <p:ext uri="{BB962C8B-B14F-4D97-AF65-F5344CB8AC3E}">
-        <p14:creationId xmlns:p14="http://schemas.microsoft.com/office/powerpoint/2010/main" val="4408438"/>
+        <p14:creationId xmlns:p14="http://schemas.microsoft.com/office/powerpoint/2010/main" val="362882710"/>
       </p:ext>
     </p:extLst>
   </p:cSld>
@@ -611,7 +611,13 @@
           <a:p>
             <a:r>
               <a:rPr lang="es-ES" dirty="0"/>
-              <a:t>[BACKCOLOR=255,255,255]</a:t>
+              <a:t>[BCKCOLOR=115,155,234];</a:t>
+            </a:r>
+          </a:p>
+          <a:p>
+            <a:r>
+              <a:rPr lang="es-ES" dirty="0"/>
+              <a:t>[TESTPROPERTY]</a:t>
             </a:r>
           </a:p>
         </p:txBody>
@@ -642,7 +648,7 @@
     </p:spTree>
     <p:extLst>
       <p:ext uri="{BB962C8B-B14F-4D97-AF65-F5344CB8AC3E}">
-        <p14:creationId xmlns:p14="http://schemas.microsoft.com/office/powerpoint/2010/main" val="362882710"/>
+        <p14:creationId xmlns:p14="http://schemas.microsoft.com/office/powerpoint/2010/main" val="2590234679"/>
       </p:ext>
     </p:extLst>
   </p:cSld>
@@ -703,13 +709,7 @@
           <a:p>
             <a:r>
               <a:rPr lang="es-ES" dirty="0"/>
-              <a:t>[BCKCOLOR=115,155,234];</a:t>
-            </a:r>
-          </a:p>
-          <a:p>
-            <a:r>
-              <a:rPr lang="es-ES" dirty="0"/>
-              <a:t>[TESTPROPERTY]</a:t>
+              <a:t>[BACKCOLOR=255,255,255]</a:t>
             </a:r>
           </a:p>
         </p:txBody>
@@ -740,7 +740,7 @@
     </p:spTree>
     <p:extLst>
       <p:ext uri="{BB962C8B-B14F-4D97-AF65-F5344CB8AC3E}">
-        <p14:creationId xmlns:p14="http://schemas.microsoft.com/office/powerpoint/2010/main" val="2590234679"/>
+        <p14:creationId xmlns:p14="http://schemas.microsoft.com/office/powerpoint/2010/main" val="4408438"/>
       </p:ext>
     </p:extLst>
   </p:cSld>
@@ -1015,7 +1015,7 @@
           <a:p>
             <a:fld id="{400E5944-F18F-4AFE-ADBC-74FE20CD496B}" type="slidenum">
               <a:rPr lang="es-ES" smtClean="0"/>
-              <a:t>‹Nº›</a:t>
+              <a:t>‹#›</a:t>
             </a:fld>
             <a:endParaRPr lang="es-ES"/>
           </a:p>
@@ -1185,7 +1185,7 @@
           <a:p>
             <a:fld id="{400E5944-F18F-4AFE-ADBC-74FE20CD496B}" type="slidenum">
               <a:rPr lang="es-ES" smtClean="0"/>
-              <a:t>‹Nº›</a:t>
+              <a:t>‹#›</a:t>
             </a:fld>
             <a:endParaRPr lang="es-ES"/>
           </a:p>
@@ -1365,7 +1365,7 @@
           <a:p>
             <a:fld id="{400E5944-F18F-4AFE-ADBC-74FE20CD496B}" type="slidenum">
               <a:rPr lang="es-ES" smtClean="0"/>
-              <a:t>‹Nº›</a:t>
+              <a:t>‹#›</a:t>
             </a:fld>
             <a:endParaRPr lang="es-ES"/>
           </a:p>
@@ -1535,7 +1535,7 @@
           <a:p>
             <a:fld id="{400E5944-F18F-4AFE-ADBC-74FE20CD496B}" type="slidenum">
               <a:rPr lang="es-ES" smtClean="0"/>
-              <a:t>‹Nº›</a:t>
+              <a:t>‹#›</a:t>
             </a:fld>
             <a:endParaRPr lang="es-ES"/>
           </a:p>
@@ -1779,7 +1779,7 @@
           <a:p>
             <a:fld id="{400E5944-F18F-4AFE-ADBC-74FE20CD496B}" type="slidenum">
               <a:rPr lang="es-ES" smtClean="0"/>
-              <a:t>‹Nº›</a:t>
+              <a:t>‹#›</a:t>
             </a:fld>
             <a:endParaRPr lang="es-ES"/>
           </a:p>
@@ -2011,7 +2011,7 @@
           <a:p>
             <a:fld id="{400E5944-F18F-4AFE-ADBC-74FE20CD496B}" type="slidenum">
               <a:rPr lang="es-ES" smtClean="0"/>
-              <a:t>‹Nº›</a:t>
+              <a:t>‹#›</a:t>
             </a:fld>
             <a:endParaRPr lang="es-ES"/>
           </a:p>
@@ -2378,7 +2378,7 @@
           <a:p>
             <a:fld id="{400E5944-F18F-4AFE-ADBC-74FE20CD496B}" type="slidenum">
               <a:rPr lang="es-ES" smtClean="0"/>
-              <a:t>‹Nº›</a:t>
+              <a:t>‹#›</a:t>
             </a:fld>
             <a:endParaRPr lang="es-ES"/>
           </a:p>
@@ -2496,7 +2496,7 @@
           <a:p>
             <a:fld id="{400E5944-F18F-4AFE-ADBC-74FE20CD496B}" type="slidenum">
               <a:rPr lang="es-ES" smtClean="0"/>
-              <a:t>‹Nº›</a:t>
+              <a:t>‹#›</a:t>
             </a:fld>
             <a:endParaRPr lang="es-ES"/>
           </a:p>
@@ -2591,7 +2591,7 @@
           <a:p>
             <a:fld id="{400E5944-F18F-4AFE-ADBC-74FE20CD496B}" type="slidenum">
               <a:rPr lang="es-ES" smtClean="0"/>
-              <a:t>‹Nº›</a:t>
+              <a:t>‹#›</a:t>
             </a:fld>
             <a:endParaRPr lang="es-ES"/>
           </a:p>
@@ -2868,7 +2868,7 @@
           <a:p>
             <a:fld id="{400E5944-F18F-4AFE-ADBC-74FE20CD496B}" type="slidenum">
               <a:rPr lang="es-ES" smtClean="0"/>
-              <a:t>‹Nº›</a:t>
+              <a:t>‹#›</a:t>
             </a:fld>
             <a:endParaRPr lang="es-ES"/>
           </a:p>
@@ -3125,7 +3125,7 @@
           <a:p>
             <a:fld id="{400E5944-F18F-4AFE-ADBC-74FE20CD496B}" type="slidenum">
               <a:rPr lang="es-ES" smtClean="0"/>
-              <a:t>‹Nº›</a:t>
+              <a:t>‹#›</a:t>
             </a:fld>
             <a:endParaRPr lang="es-ES"/>
           </a:p>
@@ -3374,7 +3374,7 @@
           <a:p>
             <a:fld id="{400E5944-F18F-4AFE-ADBC-74FE20CD496B}" type="slidenum">
               <a:rPr lang="es-ES" smtClean="0"/>
-              <a:t>‹Nº›</a:t>
+              <a:t>‹#›</a:t>
             </a:fld>
             <a:endParaRPr lang="es-ES"/>
           </a:p>
@@ -4092,9 +4092,11 @@
             <a:avLst/>
           </a:prstGeom>
           <a:solidFill>
-            <a:srgbClr val="548235">
+            <a:schemeClr val="tx1">
+              <a:lumMod val="75000"/>
+              <a:lumOff val="25000"/>
               <a:alpha val="30196"/>
-            </a:srgbClr>
+            </a:schemeClr>
           </a:solidFill>
         </p:spPr>
         <p:style>
@@ -4134,8 +4136,12 @@
           <a:p>
             <a:pPr algn="ctr"/>
             <a:r>
+              <a:rPr lang="es-ES" sz="1350" dirty="0" smtClean="0"/>
+              <a:t>[TRANSPARENT</a:t>
+            </a:r>
+            <a:r>
               <a:rPr lang="es-ES" sz="1350" dirty="0"/>
-              <a:t>[ADVANCEDTRANSPARENT]</a:t>
+              <a:t>]</a:t>
             </a:r>
           </a:p>
         </p:txBody>
@@ -4203,16 +4209,56 @@
           <a:p>
             <a:pPr algn="ctr"/>
             <a:r>
+              <a:rPr lang="es-ES" sz="1350" dirty="0" smtClean="0"/>
+              <a:t>[TRANSPARENT</a:t>
+            </a:r>
+            <a:r>
               <a:rPr lang="es-ES" sz="1350" dirty="0"/>
-              <a:t>[ADVANCEDTRANSPARENT]</a:t>
-            </a:r>
-          </a:p>
-        </p:txBody>
-      </p:sp>
+              <a:t>]</a:t>
+            </a:r>
+          </a:p>
+        </p:txBody>
+      </p:sp>
+      <p:pic>
+        <p:nvPicPr>
+          <p:cNvPr id="12" name="Imagen 11" descr="[COMPRESIONLEVEL=2];&#10;[COLORBITS=3];&#10;[NAME=Sunset]">
+            <a:extLst>
+              <a:ext uri="{FF2B5EF4-FFF2-40B4-BE49-F238E27FC236}">
+                <a16:creationId xmlns:a16="http://schemas.microsoft.com/office/drawing/2014/main" id="{267D6C51-8DFD-482C-B37E-532D20EEC3EA}"/>
+              </a:ext>
+            </a:extLst>
+          </p:cNvPr>
+          <p:cNvPicPr>
+            <a:picLocks noChangeAspect="1"/>
+          </p:cNvPicPr>
+          <p:nvPr/>
+        </p:nvPicPr>
+        <p:blipFill>
+          <a:blip r:embed="rId3" cstate="hqprint">
+            <a:extLst>
+              <a:ext uri="{28A0092B-C50C-407E-A947-70E740481C1C}">
+                <a14:useLocalDpi xmlns:a14="http://schemas.microsoft.com/office/drawing/2010/main" val="0"/>
+              </a:ext>
+            </a:extLst>
+          </a:blip>
+          <a:stretch>
+            <a:fillRect/>
+          </a:stretch>
+        </p:blipFill>
+        <p:spPr>
+          <a:xfrm>
+            <a:off x="989814" y="3867275"/>
+            <a:ext cx="2760150" cy="1841020"/>
+          </a:xfrm>
+          <a:prstGeom prst="rect">
+            <a:avLst/>
+          </a:prstGeom>
+        </p:spPr>
+      </p:pic>
     </p:spTree>
     <p:extLst>
       <p:ext uri="{BB962C8B-B14F-4D97-AF65-F5344CB8AC3E}">
-        <p14:creationId xmlns:p14="http://schemas.microsoft.com/office/powerpoint/2010/main" val="3962095223"/>
+        <p14:creationId xmlns:p14="http://schemas.microsoft.com/office/powerpoint/2010/main" val="3380256703"/>
       </p:ext>
     </p:extLst>
   </p:cSld>
@@ -4223,6 +4269,72 @@
 </file>
 
 <file path=ppt/slides/slide2.xml><?xml version="1.0" encoding="utf-8"?>
+<p:sld xmlns:a="http://schemas.openxmlformats.org/drawingml/2006/main" xmlns:r="http://schemas.openxmlformats.org/officeDocument/2006/relationships" xmlns:p="http://schemas.openxmlformats.org/presentationml/2006/main">
+  <p:cSld>
+    <p:spTree>
+      <p:nvGrpSpPr>
+        <p:cNvPr id="1" name=""/>
+        <p:cNvGrpSpPr/>
+        <p:nvPr/>
+      </p:nvGrpSpPr>
+      <p:grpSpPr>
+        <a:xfrm>
+          <a:off x="0" y="0"/>
+          <a:ext cx="0" cy="0"/>
+          <a:chOff x="0" y="0"/>
+          <a:chExt cx="0" cy="0"/>
+        </a:xfrm>
+      </p:grpSpPr>
+      <p:pic>
+        <p:nvPicPr>
+          <p:cNvPr id="3" name="Imagen 2" descr="[COMPRESIONLEVEL=8];&#10;[COLORBITS=3]">
+            <a:extLst>
+              <a:ext uri="{FF2B5EF4-FFF2-40B4-BE49-F238E27FC236}">
+                <a16:creationId xmlns:a16="http://schemas.microsoft.com/office/drawing/2014/main" id="{54B3344E-1FFC-4B69-9491-53B9E0FF5CB6}"/>
+              </a:ext>
+            </a:extLst>
+          </p:cNvPr>
+          <p:cNvPicPr>
+            <a:picLocks noChangeAspect="1"/>
+          </p:cNvPicPr>
+          <p:nvPr/>
+        </p:nvPicPr>
+        <p:blipFill>
+          <a:blip r:embed="rId3" cstate="hqprint">
+            <a:extLst>
+              <a:ext uri="{28A0092B-C50C-407E-A947-70E740481C1C}">
+                <a14:useLocalDpi xmlns:a14="http://schemas.microsoft.com/office/drawing/2010/main" val="0"/>
+              </a:ext>
+            </a:extLst>
+          </a:blip>
+          <a:stretch>
+            <a:fillRect/>
+          </a:stretch>
+        </p:blipFill>
+        <p:spPr>
+          <a:xfrm>
+            <a:off x="6557818" y="4753540"/>
+            <a:ext cx="2586182" cy="1724983"/>
+          </a:xfrm>
+          <a:prstGeom prst="rect">
+            <a:avLst/>
+          </a:prstGeom>
+        </p:spPr>
+      </p:pic>
+    </p:spTree>
+    <p:extLst>
+      <p:ext uri="{BB962C8B-B14F-4D97-AF65-F5344CB8AC3E}">
+        <p14:creationId xmlns:p14="http://schemas.microsoft.com/office/powerpoint/2010/main" val="2186432323"/>
+      </p:ext>
+    </p:extLst>
+  </p:cSld>
+  <p:clrMapOvr>
+    <a:masterClrMapping/>
+  </p:clrMapOvr>
+</p:sld>
+</file>
+
+<file path=ppt/slides/slide3.xml><?xml version="1.0" encoding="utf-8"?>
 <p:sld xmlns:a="http://schemas.openxmlformats.org/drawingml/2006/main" xmlns:r="http://schemas.openxmlformats.org/officeDocument/2006/relationships" xmlns:p="http://schemas.openxmlformats.org/presentationml/2006/main">
   <p:cSld>
     <p:spTree>
@@ -4747,148 +4859,10 @@
           </a:p>
         </p:txBody>
       </p:sp>
-      <p:pic>
-        <p:nvPicPr>
-          <p:cNvPr id="11" name="Imagen 10" descr="[COMPRESIONLEVEL=2];&#10;[COLORBITS=4];&#10;[NAME=Cage4Ever]">
-            <a:extLst>
-              <a:ext uri="{FF2B5EF4-FFF2-40B4-BE49-F238E27FC236}">
-                <a16:creationId xmlns:a16="http://schemas.microsoft.com/office/drawing/2014/main" id="{96307D06-706F-4FEB-A7A3-EBC7611DBCA9}"/>
-              </a:ext>
-            </a:extLst>
-          </p:cNvPr>
-          <p:cNvPicPr>
-            <a:picLocks noChangeAspect="1"/>
-          </p:cNvPicPr>
-          <p:nvPr/>
-        </p:nvPicPr>
-        <p:blipFill>
-          <a:blip r:embed="rId3">
-            <a:extLst>
-              <a:ext uri="{28A0092B-C50C-407E-A947-70E740481C1C}">
-                <a14:useLocalDpi xmlns:a14="http://schemas.microsoft.com/office/drawing/2010/main" val="0"/>
-              </a:ext>
-            </a:extLst>
-          </a:blip>
-          <a:stretch>
-            <a:fillRect/>
-          </a:stretch>
-        </p:blipFill>
-        <p:spPr>
-          <a:xfrm>
-            <a:off x="2723486" y="744136"/>
-            <a:ext cx="4403177" cy="5369728"/>
-          </a:xfrm>
-          <a:prstGeom prst="rect">
-            <a:avLst/>
-          </a:prstGeom>
-        </p:spPr>
-      </p:pic>
-      <p:pic>
-        <p:nvPicPr>
-          <p:cNvPr id="12" name="Imagen 11" descr="[COMPRESIONLEVEL=1];&#10;[COLORBITS=3];&#10;[NAME=Sunset]">
-            <a:extLst>
-              <a:ext uri="{FF2B5EF4-FFF2-40B4-BE49-F238E27FC236}">
-                <a16:creationId xmlns:a16="http://schemas.microsoft.com/office/drawing/2014/main" id="{267D6C51-8DFD-482C-B37E-532D20EEC3EA}"/>
-              </a:ext>
-            </a:extLst>
-          </p:cNvPr>
-          <p:cNvPicPr>
-            <a:picLocks noChangeAspect="1"/>
-          </p:cNvPicPr>
-          <p:nvPr/>
-        </p:nvPicPr>
-        <p:blipFill>
-          <a:blip r:embed="rId4">
-            <a:extLst>
-              <a:ext uri="{28A0092B-C50C-407E-A947-70E740481C1C}">
-                <a14:useLocalDpi xmlns:a14="http://schemas.microsoft.com/office/drawing/2010/main" val="0"/>
-              </a:ext>
-            </a:extLst>
-          </a:blip>
-          <a:stretch>
-            <a:fillRect/>
-          </a:stretch>
-        </p:blipFill>
-        <p:spPr>
-          <a:xfrm>
-            <a:off x="1277941" y="3921677"/>
-            <a:ext cx="3708838" cy="2473795"/>
-          </a:xfrm>
-          <a:prstGeom prst="rect">
-            <a:avLst/>
-          </a:prstGeom>
-        </p:spPr>
-      </p:pic>
     </p:spTree>
     <p:extLst>
       <p:ext uri="{BB962C8B-B14F-4D97-AF65-F5344CB8AC3E}">
-        <p14:creationId xmlns:p14="http://schemas.microsoft.com/office/powerpoint/2010/main" val="3380256703"/>
-      </p:ext>
-    </p:extLst>
-  </p:cSld>
-  <p:clrMapOvr>
-    <a:masterClrMapping/>
-  </p:clrMapOvr>
-</p:sld>
-</file>
-
-<file path=ppt/slides/slide3.xml><?xml version="1.0" encoding="utf-8"?>
-<p:sld xmlns:a="http://schemas.openxmlformats.org/drawingml/2006/main" xmlns:r="http://schemas.openxmlformats.org/officeDocument/2006/relationships" xmlns:p="http://schemas.openxmlformats.org/presentationml/2006/main">
-  <p:cSld>
-    <p:spTree>
-      <p:nvGrpSpPr>
-        <p:cNvPr id="1" name=""/>
-        <p:cNvGrpSpPr/>
-        <p:nvPr/>
-      </p:nvGrpSpPr>
-      <p:grpSpPr>
-        <a:xfrm>
-          <a:off x="0" y="0"/>
-          <a:ext cx="0" cy="0"/>
-          <a:chOff x="0" y="0"/>
-          <a:chExt cx="0" cy="0"/>
-        </a:xfrm>
-      </p:grpSpPr>
-      <p:pic>
-        <p:nvPicPr>
-          <p:cNvPr id="3" name="Imagen 2" descr="[COMPRESIONLEVEL=1];&#10;[COLORBITS=3]">
-            <a:extLst>
-              <a:ext uri="{FF2B5EF4-FFF2-40B4-BE49-F238E27FC236}">
-                <a16:creationId xmlns:a16="http://schemas.microsoft.com/office/drawing/2014/main" id="{54B3344E-1FFC-4B69-9491-53B9E0FF5CB6}"/>
-              </a:ext>
-            </a:extLst>
-          </p:cNvPr>
-          <p:cNvPicPr>
-            <a:picLocks noChangeAspect="1"/>
-          </p:cNvPicPr>
-          <p:nvPr/>
-        </p:nvPicPr>
-        <p:blipFill>
-          <a:blip r:embed="rId3">
-            <a:extLst>
-              <a:ext uri="{28A0092B-C50C-407E-A947-70E740481C1C}">
-                <a14:useLocalDpi xmlns:a14="http://schemas.microsoft.com/office/drawing/2010/main" val="0"/>
-              </a:ext>
-            </a:extLst>
-          </a:blip>
-          <a:stretch>
-            <a:fillRect/>
-          </a:stretch>
-        </p:blipFill>
-        <p:spPr>
-          <a:xfrm>
-            <a:off x="0" y="379476"/>
-            <a:ext cx="9144000" cy="6099048"/>
-          </a:xfrm>
-          <a:prstGeom prst="rect">
-            <a:avLst/>
-          </a:prstGeom>
-        </p:spPr>
-      </p:pic>
-    </p:spTree>
-    <p:extLst>
-      <p:ext uri="{BB962C8B-B14F-4D97-AF65-F5344CB8AC3E}">
-        <p14:creationId xmlns:p14="http://schemas.microsoft.com/office/powerpoint/2010/main" val="2186432323"/>
+        <p14:creationId xmlns:p14="http://schemas.microsoft.com/office/powerpoint/2010/main" val="3962095223"/>
       </p:ext>
     </p:extLst>
   </p:cSld>
@@ -5197,6 +5171,69 @@
           <a:chExt cx="0" cy="0"/>
         </a:xfrm>
       </p:grpSpPr>
+      <p:pic>
+        <p:nvPicPr>
+          <p:cNvPr id="6" name="Marcador de contenido 5" descr="[COMPRESIONLEVEL=2];&#10;[COLORBITS=4];&#10;[NAME=Cage4Ever]">
+            <a:extLst>
+              <a:ext uri="{FF2B5EF4-FFF2-40B4-BE49-F238E27FC236}">
+                <a16:creationId xmlns:a16="http://schemas.microsoft.com/office/drawing/2014/main" id="{F3F6E4BD-CA14-41CF-9C70-5CD8BF0508EB}"/>
+              </a:ext>
+            </a:extLst>
+          </p:cNvPr>
+          <p:cNvPicPr>
+            <a:picLocks noGrp="1" noChangeAspect="1"/>
+          </p:cNvPicPr>
+          <p:nvPr>
+            <p:ph idx="1"/>
+          </p:nvPr>
+        </p:nvPicPr>
+        <p:blipFill>
+          <a:blip r:embed="rId2">
+            <a:extLst>
+              <a:ext uri="{28A0092B-C50C-407E-A947-70E740481C1C}">
+                <a14:useLocalDpi xmlns:a14="http://schemas.microsoft.com/office/drawing/2010/main" val="0"/>
+              </a:ext>
+            </a:extLst>
+          </a:blip>
+          <a:stretch>
+            <a:fillRect/>
+          </a:stretch>
+        </p:blipFill>
+        <p:spPr>
+          <a:xfrm>
+            <a:off x="2636853" y="1185643"/>
+            <a:ext cx="3679105" cy="4486713"/>
+          </a:xfrm>
+          <a:prstGeom prst="rect">
+            <a:avLst/>
+          </a:prstGeom>
+        </p:spPr>
+      </p:pic>
+      <p:sp>
+        <p:nvSpPr>
+          <p:cNvPr id="2" name="Título 1">
+            <a:extLst>
+              <a:ext uri="{FF2B5EF4-FFF2-40B4-BE49-F238E27FC236}">
+                <a16:creationId xmlns:a16="http://schemas.microsoft.com/office/drawing/2014/main" id="{79D1DABE-0FB0-4774-93F9-93059D82F71F}"/>
+              </a:ext>
+            </a:extLst>
+          </p:cNvPr>
+          <p:cNvSpPr>
+            <a:spLocks noGrp="1"/>
+          </p:cNvSpPr>
+          <p:nvPr>
+            <p:ph type="title"/>
+          </p:nvPr>
+        </p:nvSpPr>
+        <p:spPr/>
+        <p:txBody>
+          <a:bodyPr/>
+          <a:lstStyle/>
+          <a:p>
+            <a:endParaRPr lang="es-ES"/>
+          </a:p>
+        </p:txBody>
+      </p:sp>
       <p:sp>
         <p:nvSpPr>
           <p:cNvPr id="5" name="Rectángulo 4">
@@ -5239,69 +5276,6 @@
           <a:lstStyle/>
           <a:p>
             <a:pPr algn="ctr"/>
-            <a:endParaRPr lang="es-ES"/>
-          </a:p>
-        </p:txBody>
-      </p:sp>
-      <p:pic>
-        <p:nvPicPr>
-          <p:cNvPr id="6" name="Marcador de contenido 5" descr="[COMPRESIONLEVEL=2];&#10;[COLORBITS=4];&#10;[NAME=Cage4Ever]">
-            <a:extLst>
-              <a:ext uri="{FF2B5EF4-FFF2-40B4-BE49-F238E27FC236}">
-                <a16:creationId xmlns:a16="http://schemas.microsoft.com/office/drawing/2014/main" id="{F3F6E4BD-CA14-41CF-9C70-5CD8BF0508EB}"/>
-              </a:ext>
-            </a:extLst>
-          </p:cNvPr>
-          <p:cNvPicPr>
-            <a:picLocks noGrp="1" noChangeAspect="1"/>
-          </p:cNvPicPr>
-          <p:nvPr>
-            <p:ph idx="1"/>
-          </p:nvPr>
-        </p:nvPicPr>
-        <p:blipFill>
-          <a:blip r:embed="rId2">
-            <a:extLst>
-              <a:ext uri="{28A0092B-C50C-407E-A947-70E740481C1C}">
-                <a14:useLocalDpi xmlns:a14="http://schemas.microsoft.com/office/drawing/2010/main" val="0"/>
-              </a:ext>
-            </a:extLst>
-          </a:blip>
-          <a:stretch>
-            <a:fillRect/>
-          </a:stretch>
-        </p:blipFill>
-        <p:spPr>
-          <a:xfrm>
-            <a:off x="2636853" y="1185643"/>
-            <a:ext cx="3679105" cy="4486713"/>
-          </a:xfrm>
-          <a:prstGeom prst="rect">
-            <a:avLst/>
-          </a:prstGeom>
-        </p:spPr>
-      </p:pic>
-      <p:sp>
-        <p:nvSpPr>
-          <p:cNvPr id="2" name="Título 1">
-            <a:extLst>
-              <a:ext uri="{FF2B5EF4-FFF2-40B4-BE49-F238E27FC236}">
-                <a16:creationId xmlns:a16="http://schemas.microsoft.com/office/drawing/2014/main" id="{79D1DABE-0FB0-4774-93F9-93059D82F71F}"/>
-              </a:ext>
-            </a:extLst>
-          </p:cNvPr>
-          <p:cNvSpPr>
-            <a:spLocks noGrp="1"/>
-          </p:cNvSpPr>
-          <p:nvPr>
-            <p:ph type="title"/>
-          </p:nvPr>
-        </p:nvSpPr>
-        <p:spPr/>
-        <p:txBody>
-          <a:bodyPr/>
-          <a:lstStyle/>
-          <a:p>
             <a:endParaRPr lang="es-ES"/>
           </a:p>
         </p:txBody>

</xml_diff>

<commit_message>
New version! Added animation examples
</commit_message>
<xml_diff>
--- a/VerilogExample/PPVerilogEngine/main.pptx
+++ b/VerilogExample/PPVerilogEngine/main.pptx
@@ -201,7 +201,7 @@
           <a:p>
             <a:fld id="{01A1BE80-B383-48BF-8DCC-287BC5926A7A}" type="datetimeFigureOut">
               <a:rPr lang="en-US" smtClean="0"/>
-              <a:t>10/31/2018</a:t>
+              <a:t>11/4/2018</a:t>
             </a:fld>
             <a:endParaRPr lang="en-US"/>
           </a:p>
@@ -978,7 +978,7 @@
           <a:p>
             <a:fld id="{857345AB-E265-4E05-A009-C7E62629F4CB}" type="datetimeFigureOut">
               <a:rPr lang="es-ES" smtClean="0"/>
-              <a:t>31/10/2018</a:t>
+              <a:t>04/11/2018</a:t>
             </a:fld>
             <a:endParaRPr lang="es-ES"/>
           </a:p>
@@ -1148,7 +1148,7 @@
           <a:p>
             <a:fld id="{857345AB-E265-4E05-A009-C7E62629F4CB}" type="datetimeFigureOut">
               <a:rPr lang="es-ES" smtClean="0"/>
-              <a:t>31/10/2018</a:t>
+              <a:t>04/11/2018</a:t>
             </a:fld>
             <a:endParaRPr lang="es-ES"/>
           </a:p>
@@ -1328,7 +1328,7 @@
           <a:p>
             <a:fld id="{857345AB-E265-4E05-A009-C7E62629F4CB}" type="datetimeFigureOut">
               <a:rPr lang="es-ES" smtClean="0"/>
-              <a:t>31/10/2018</a:t>
+              <a:t>04/11/2018</a:t>
             </a:fld>
             <a:endParaRPr lang="es-ES"/>
           </a:p>
@@ -1498,7 +1498,7 @@
           <a:p>
             <a:fld id="{857345AB-E265-4E05-A009-C7E62629F4CB}" type="datetimeFigureOut">
               <a:rPr lang="es-ES" smtClean="0"/>
-              <a:t>31/10/2018</a:t>
+              <a:t>04/11/2018</a:t>
             </a:fld>
             <a:endParaRPr lang="es-ES"/>
           </a:p>
@@ -1742,7 +1742,7 @@
           <a:p>
             <a:fld id="{857345AB-E265-4E05-A009-C7E62629F4CB}" type="datetimeFigureOut">
               <a:rPr lang="es-ES" smtClean="0"/>
-              <a:t>31/10/2018</a:t>
+              <a:t>04/11/2018</a:t>
             </a:fld>
             <a:endParaRPr lang="es-ES"/>
           </a:p>
@@ -1974,7 +1974,7 @@
           <a:p>
             <a:fld id="{857345AB-E265-4E05-A009-C7E62629F4CB}" type="datetimeFigureOut">
               <a:rPr lang="es-ES" smtClean="0"/>
-              <a:t>31/10/2018</a:t>
+              <a:t>04/11/2018</a:t>
             </a:fld>
             <a:endParaRPr lang="es-ES"/>
           </a:p>
@@ -2341,7 +2341,7 @@
           <a:p>
             <a:fld id="{857345AB-E265-4E05-A009-C7E62629F4CB}" type="datetimeFigureOut">
               <a:rPr lang="es-ES" smtClean="0"/>
-              <a:t>31/10/2018</a:t>
+              <a:t>04/11/2018</a:t>
             </a:fld>
             <a:endParaRPr lang="es-ES"/>
           </a:p>
@@ -2459,7 +2459,7 @@
           <a:p>
             <a:fld id="{857345AB-E265-4E05-A009-C7E62629F4CB}" type="datetimeFigureOut">
               <a:rPr lang="es-ES" smtClean="0"/>
-              <a:t>31/10/2018</a:t>
+              <a:t>04/11/2018</a:t>
             </a:fld>
             <a:endParaRPr lang="es-ES"/>
           </a:p>
@@ -2554,7 +2554,7 @@
           <a:p>
             <a:fld id="{857345AB-E265-4E05-A009-C7E62629F4CB}" type="datetimeFigureOut">
               <a:rPr lang="es-ES" smtClean="0"/>
-              <a:t>31/10/2018</a:t>
+              <a:t>04/11/2018</a:t>
             </a:fld>
             <a:endParaRPr lang="es-ES"/>
           </a:p>
@@ -2831,7 +2831,7 @@
           <a:p>
             <a:fld id="{857345AB-E265-4E05-A009-C7E62629F4CB}" type="datetimeFigureOut">
               <a:rPr lang="es-ES" smtClean="0"/>
-              <a:t>31/10/2018</a:t>
+              <a:t>04/11/2018</a:t>
             </a:fld>
             <a:endParaRPr lang="es-ES"/>
           </a:p>
@@ -3088,7 +3088,7 @@
           <a:p>
             <a:fld id="{857345AB-E265-4E05-A009-C7E62629F4CB}" type="datetimeFigureOut">
               <a:rPr lang="es-ES" smtClean="0"/>
-              <a:t>31/10/2018</a:t>
+              <a:t>04/11/2018</a:t>
             </a:fld>
             <a:endParaRPr lang="es-ES"/>
           </a:p>
@@ -3301,7 +3301,7 @@
           <a:p>
             <a:fld id="{857345AB-E265-4E05-A009-C7E62629F4CB}" type="datetimeFigureOut">
               <a:rPr lang="es-ES" smtClean="0"/>
-              <a:t>31/10/2018</a:t>
+              <a:t>04/11/2018</a:t>
             </a:fld>
             <a:endParaRPr lang="es-ES"/>
           </a:p>
@@ -3727,8 +3727,8 @@
             <a:avLst/>
           </a:prstGeom>
           <a:solidFill>
-            <a:schemeClr val="bg2">
-              <a:lumMod val="75000"/>
+            <a:schemeClr val="bg1">
+              <a:lumMod val="50000"/>
             </a:schemeClr>
           </a:solidFill>
         </p:spPr>
@@ -3783,6 +3783,42 @@
           </a:p>
         </p:txBody>
       </p:sp>
+      <p:pic>
+        <p:nvPicPr>
+          <p:cNvPr id="14" name="Imagen 2" descr="[COMPRESIONLEVEL=6];&#10;[COLORBITS=4]">
+            <a:extLst>
+              <a:ext uri="{FF2B5EF4-FFF2-40B4-BE49-F238E27FC236}">
+                <a16:creationId xmlns:a16="http://schemas.microsoft.com/office/drawing/2014/main" id="{54B3344E-1FFC-4B69-9491-53B9E0FF5CB6}"/>
+              </a:ext>
+            </a:extLst>
+          </p:cNvPr>
+          <p:cNvPicPr>
+            <a:picLocks noChangeAspect="1"/>
+          </p:cNvPicPr>
+          <p:nvPr/>
+        </p:nvPicPr>
+        <p:blipFill>
+          <a:blip r:embed="rId3" cstate="hqprint">
+            <a:extLst>
+              <a:ext uri="{28A0092B-C50C-407E-A947-70E740481C1C}">
+                <a14:useLocalDpi xmlns:a14="http://schemas.microsoft.com/office/drawing/2010/main" val="0"/>
+              </a:ext>
+            </a:extLst>
+          </a:blip>
+          <a:stretch>
+            <a:fillRect/>
+          </a:stretch>
+        </p:blipFill>
+        <p:spPr>
+          <a:xfrm>
+            <a:off x="0" y="4843496"/>
+            <a:ext cx="2586182" cy="1724983"/>
+          </a:xfrm>
+          <a:prstGeom prst="rect">
+            <a:avLst/>
+          </a:prstGeom>
+        </p:spPr>
+      </p:pic>
       <p:sp>
         <p:nvSpPr>
           <p:cNvPr id="6" name="Rectángulo 3">
@@ -3841,180 +3877,6 @@
             <a:r>
               <a:rPr lang="es-ES" sz="1350" dirty="0"/>
               <a:t> Orange box]</a:t>
-            </a:r>
-          </a:p>
-        </p:txBody>
-      </p:sp>
-      <p:sp>
-        <p:nvSpPr>
-          <p:cNvPr id="7" name="Rectángulo 3">
-            <a:extLst>
-              <a:ext uri="{FF2B5EF4-FFF2-40B4-BE49-F238E27FC236}">
-                <a16:creationId xmlns:a16="http://schemas.microsoft.com/office/drawing/2014/main" id="{55D55328-6F18-4099-B732-464AD35360D6}"/>
-              </a:ext>
-            </a:extLst>
-          </p:cNvPr>
-          <p:cNvSpPr/>
-          <p:nvPr/>
-        </p:nvSpPr>
-        <p:spPr>
-          <a:xfrm>
-            <a:off x="989814" y="851366"/>
-            <a:ext cx="3996965" cy="1835273"/>
-          </a:xfrm>
-          <a:prstGeom prst="rect">
-            <a:avLst/>
-          </a:prstGeom>
-          <a:solidFill>
-            <a:srgbClr val="7030A0"/>
-          </a:solidFill>
-          <a:ln w="38100">
-            <a:solidFill>
-              <a:srgbClr val="FFD966">
-                <a:alpha val="49804"/>
-              </a:srgbClr>
-            </a:solidFill>
-          </a:ln>
-        </p:spPr>
-        <p:style>
-          <a:lnRef idx="2">
-            <a:schemeClr val="accent1">
-              <a:shade val="50000"/>
-            </a:schemeClr>
-          </a:lnRef>
-          <a:fillRef idx="1">
-            <a:schemeClr val="accent1"/>
-          </a:fillRef>
-          <a:effectRef idx="0">
-            <a:schemeClr val="accent1"/>
-          </a:effectRef>
-          <a:fontRef idx="minor">
-            <a:schemeClr val="lt1"/>
-          </a:fontRef>
-        </p:style>
-        <p:txBody>
-          <a:bodyPr rtlCol="0" anchor="ctr"/>
-          <a:lstStyle/>
-          <a:p>
-            <a:pPr algn="ctr"/>
-            <a:r>
-              <a:rPr lang="es-ES" sz="1350" dirty="0"/>
-              <a:t>[NAME=Solid </a:t>
-            </a:r>
-            <a:r>
-              <a:rPr lang="es-ES" sz="1350" dirty="0" err="1"/>
-              <a:t>purple</a:t>
-            </a:r>
-            <a:r>
-              <a:rPr lang="es-ES" sz="1350" dirty="0"/>
-              <a:t> </a:t>
-            </a:r>
-            <a:r>
-              <a:rPr lang="es-ES" sz="1350" dirty="0" err="1"/>
-              <a:t>with</a:t>
-            </a:r>
-            <a:r>
-              <a:rPr lang="es-ES" sz="1350" dirty="0"/>
-              <a:t> </a:t>
-            </a:r>
-            <a:r>
-              <a:rPr lang="es-ES" sz="1350" dirty="0" err="1"/>
-              <a:t>transparent</a:t>
-            </a:r>
-            <a:r>
-              <a:rPr lang="es-ES" sz="1350" dirty="0"/>
-              <a:t> </a:t>
-            </a:r>
-            <a:r>
-              <a:rPr lang="es-ES" sz="1350" dirty="0" err="1"/>
-              <a:t>border</a:t>
-            </a:r>
-            <a:r>
-              <a:rPr lang="es-ES" sz="1350" dirty="0"/>
-              <a:t>];</a:t>
-            </a:r>
-          </a:p>
-          <a:p>
-            <a:pPr algn="ctr"/>
-            <a:r>
-              <a:rPr lang="es-ES" sz="1350" dirty="0"/>
-              <a:t>[BORDER];</a:t>
-            </a:r>
-          </a:p>
-          <a:p>
-            <a:pPr algn="ctr"/>
-            <a:r>
-              <a:rPr lang="es-ES" sz="1350" dirty="0"/>
-              <a:t>[TRANSPARENT]</a:t>
-            </a:r>
-          </a:p>
-        </p:txBody>
-      </p:sp>
-      <p:sp>
-        <p:nvSpPr>
-          <p:cNvPr id="8" name="Rectángulo 3">
-            <a:extLst>
-              <a:ext uri="{FF2B5EF4-FFF2-40B4-BE49-F238E27FC236}">
-                <a16:creationId xmlns:a16="http://schemas.microsoft.com/office/drawing/2014/main" id="{FB329AE3-5F8D-4424-8762-8395299AFD7C}"/>
-              </a:ext>
-            </a:extLst>
-          </p:cNvPr>
-          <p:cNvSpPr/>
-          <p:nvPr/>
-        </p:nvSpPr>
-        <p:spPr>
-          <a:xfrm>
-            <a:off x="346645" y="3312617"/>
-            <a:ext cx="5546155" cy="982697"/>
-          </a:xfrm>
-          <a:prstGeom prst="rect">
-            <a:avLst/>
-          </a:prstGeom>
-          <a:solidFill>
-            <a:schemeClr val="accent6">
-              <a:lumMod val="75000"/>
-            </a:schemeClr>
-          </a:solidFill>
-        </p:spPr>
-        <p:style>
-          <a:lnRef idx="2">
-            <a:schemeClr val="accent1">
-              <a:shade val="50000"/>
-            </a:schemeClr>
-          </a:lnRef>
-          <a:fillRef idx="1">
-            <a:schemeClr val="accent1"/>
-          </a:fillRef>
-          <a:effectRef idx="0">
-            <a:schemeClr val="accent1"/>
-          </a:effectRef>
-          <a:fontRef idx="minor">
-            <a:schemeClr val="lt1"/>
-          </a:fontRef>
-        </p:style>
-        <p:txBody>
-          <a:bodyPr rtlCol="0" anchor="ctr"/>
-          <a:lstStyle/>
-          <a:p>
-            <a:pPr algn="ctr"/>
-            <a:r>
-              <a:rPr lang="es-ES" sz="1350" dirty="0"/>
-              <a:t>[NAME=Basic </a:t>
-            </a:r>
-            <a:r>
-              <a:rPr lang="es-ES" sz="1350" dirty="0" err="1"/>
-              <a:t>transparency</a:t>
-            </a:r>
-            <a:r>
-              <a:rPr lang="es-ES" sz="1350" dirty="0"/>
-              <a:t>];</a:t>
-            </a:r>
-          </a:p>
-          <a:p>
-            <a:pPr algn="ctr"/>
-            <a:r>
-              <a:rPr lang="es-ES" sz="1350" dirty="0"/>
-              <a:t>[TRANSPARENT]</a:t>
             </a:r>
           </a:p>
         </p:txBody>
@@ -4187,6 +4049,12 @@
           <a:prstGeom prst="rect">
             <a:avLst/>
           </a:prstGeom>
+          <a:solidFill>
+            <a:schemeClr val="accent4">
+              <a:lumMod val="60000"/>
+              <a:lumOff val="40000"/>
+            </a:schemeClr>
+          </a:solidFill>
         </p:spPr>
         <p:style>
           <a:lnRef idx="2">
@@ -4224,9 +4092,313 @@
           </a:p>
         </p:txBody>
       </p:sp>
+      <p:sp>
+        <p:nvSpPr>
+          <p:cNvPr id="2" name="Content Placeholder 1"/>
+          <p:cNvSpPr>
+            <a:spLocks noGrp="1"/>
+          </p:cNvSpPr>
+          <p:nvPr>
+            <p:ph idx="1"/>
+          </p:nvPr>
+        </p:nvSpPr>
+        <p:spPr/>
+        <p:txBody>
+          <a:bodyPr/>
+          <a:lstStyle/>
+          <a:p>
+            <a:endParaRPr lang="en-US" dirty="0"/>
+          </a:p>
+        </p:txBody>
+      </p:sp>
+      <p:sp>
+        <p:nvSpPr>
+          <p:cNvPr id="8" name="Rectángulo 3">
+            <a:extLst>
+              <a:ext uri="{FF2B5EF4-FFF2-40B4-BE49-F238E27FC236}">
+                <a16:creationId xmlns:a16="http://schemas.microsoft.com/office/drawing/2014/main" id="{FB329AE3-5F8D-4424-8762-8395299AFD7C}"/>
+              </a:ext>
+            </a:extLst>
+          </p:cNvPr>
+          <p:cNvSpPr/>
+          <p:nvPr/>
+        </p:nvSpPr>
+        <p:spPr>
+          <a:xfrm>
+            <a:off x="178676" y="2722116"/>
+            <a:ext cx="5546155" cy="982697"/>
+          </a:xfrm>
+          <a:prstGeom prst="rect">
+            <a:avLst/>
+          </a:prstGeom>
+          <a:solidFill>
+            <a:srgbClr val="70AD47">
+              <a:alpha val="50196"/>
+            </a:srgbClr>
+          </a:solidFill>
+          <a:ln w="57150">
+            <a:solidFill>
+              <a:schemeClr val="accent2">
+                <a:lumMod val="60000"/>
+                <a:lumOff val="40000"/>
+              </a:schemeClr>
+            </a:solidFill>
+          </a:ln>
+        </p:spPr>
+        <p:style>
+          <a:lnRef idx="2">
+            <a:schemeClr val="accent1">
+              <a:shade val="50000"/>
+            </a:schemeClr>
+          </a:lnRef>
+          <a:fillRef idx="1">
+            <a:schemeClr val="accent1"/>
+          </a:fillRef>
+          <a:effectRef idx="0">
+            <a:schemeClr val="accent1"/>
+          </a:effectRef>
+          <a:fontRef idx="minor">
+            <a:schemeClr val="lt1"/>
+          </a:fontRef>
+        </p:style>
+        <p:txBody>
+          <a:bodyPr rtlCol="0" anchor="ctr"/>
+          <a:lstStyle/>
+          <a:p>
+            <a:pPr algn="ctr"/>
+            <a:r>
+              <a:rPr lang="es-ES" sz="1350" dirty="0"/>
+              <a:t>[NAME=Basic </a:t>
+            </a:r>
+            <a:r>
+              <a:rPr lang="es-ES" sz="1350" dirty="0" err="1"/>
+              <a:t>transparency</a:t>
+            </a:r>
+            <a:r>
+              <a:rPr lang="es-ES" sz="1350" dirty="0"/>
+              <a:t>];</a:t>
+            </a:r>
+          </a:p>
+          <a:p>
+            <a:pPr algn="ctr"/>
+            <a:r>
+              <a:rPr lang="es-ES" sz="1350" dirty="0" smtClean="0"/>
+              <a:t>[MOVEABLE];</a:t>
+            </a:r>
+          </a:p>
+          <a:p>
+            <a:pPr algn="ctr"/>
+            <a:r>
+              <a:rPr lang="es-ES" sz="1350" dirty="0" smtClean="0"/>
+              <a:t>[BORDER];[TRANSPARENT];</a:t>
+            </a:r>
+            <a:endParaRPr lang="es-ES" sz="1350" dirty="0"/>
+          </a:p>
+        </p:txBody>
+      </p:sp>
+      <p:sp>
+        <p:nvSpPr>
+          <p:cNvPr id="7" name="Rectángulo 3">
+            <a:extLst>
+              <a:ext uri="{FF2B5EF4-FFF2-40B4-BE49-F238E27FC236}">
+                <a16:creationId xmlns:a16="http://schemas.microsoft.com/office/drawing/2014/main" id="{55D55328-6F18-4099-B732-464AD35360D6}"/>
+              </a:ext>
+            </a:extLst>
+          </p:cNvPr>
+          <p:cNvSpPr/>
+          <p:nvPr/>
+        </p:nvSpPr>
+        <p:spPr>
+          <a:xfrm>
+            <a:off x="2149259" y="3648191"/>
+            <a:ext cx="2219541" cy="1175646"/>
+          </a:xfrm>
+          <a:prstGeom prst="rect">
+            <a:avLst/>
+          </a:prstGeom>
+          <a:solidFill>
+            <a:srgbClr val="0070C0">
+              <a:alpha val="74902"/>
+            </a:srgbClr>
+          </a:solidFill>
+          <a:ln w="38100">
+            <a:solidFill>
+              <a:srgbClr val="FF0000">
+                <a:alpha val="49804"/>
+              </a:srgbClr>
+            </a:solidFill>
+          </a:ln>
+        </p:spPr>
+        <p:style>
+          <a:lnRef idx="2">
+            <a:schemeClr val="accent1">
+              <a:shade val="50000"/>
+            </a:schemeClr>
+          </a:lnRef>
+          <a:fillRef idx="1">
+            <a:schemeClr val="accent1"/>
+          </a:fillRef>
+          <a:effectRef idx="0">
+            <a:schemeClr val="accent1"/>
+          </a:effectRef>
+          <a:fontRef idx="minor">
+            <a:schemeClr val="lt1"/>
+          </a:fontRef>
+        </p:style>
+        <p:txBody>
+          <a:bodyPr rtlCol="0" anchor="ctr"/>
+          <a:lstStyle/>
+          <a:p>
+            <a:pPr algn="ctr"/>
+            <a:r>
+              <a:rPr lang="es-ES" sz="1350" dirty="0"/>
+              <a:t>[</a:t>
+            </a:r>
+            <a:r>
+              <a:rPr lang="es-ES" sz="1350" dirty="0" smtClean="0"/>
+              <a:t>NAME=</a:t>
+            </a:r>
+            <a:r>
+              <a:rPr lang="es-ES" sz="1350" dirty="0" err="1" smtClean="0"/>
+              <a:t>WasdBlock</a:t>
+            </a:r>
+            <a:r>
+              <a:rPr lang="es-ES" sz="1350" dirty="0" smtClean="0"/>
+              <a:t>];</a:t>
+            </a:r>
+            <a:endParaRPr lang="es-ES" sz="1350" dirty="0"/>
+          </a:p>
+          <a:p>
+            <a:pPr algn="ctr"/>
+            <a:r>
+              <a:rPr lang="es-ES" sz="1350" dirty="0"/>
+              <a:t>[BORDER</a:t>
+            </a:r>
+            <a:r>
+              <a:rPr lang="es-ES" sz="1350" dirty="0" smtClean="0"/>
+              <a:t>];</a:t>
+            </a:r>
+          </a:p>
+          <a:p>
+            <a:pPr algn="ctr"/>
+            <a:r>
+              <a:rPr lang="es-ES" sz="1350" dirty="0" smtClean="0"/>
+              <a:t>[MOVEABLE];</a:t>
+            </a:r>
+          </a:p>
+          <a:p>
+            <a:pPr algn="ctr"/>
+            <a:r>
+              <a:rPr lang="es-ES" sz="1350" dirty="0" smtClean="0"/>
+              <a:t>[TRANSPARENT]</a:t>
+            </a:r>
+            <a:endParaRPr lang="es-ES" sz="1350" dirty="0"/>
+          </a:p>
+        </p:txBody>
+      </p:sp>
+      <p:sp>
+        <p:nvSpPr>
+          <p:cNvPr id="12" name="Rectángulo 3">
+            <a:extLst>
+              <a:ext uri="{FF2B5EF4-FFF2-40B4-BE49-F238E27FC236}">
+                <a16:creationId xmlns:a16="http://schemas.microsoft.com/office/drawing/2014/main" id="{55D55328-6F18-4099-B732-464AD35360D6}"/>
+              </a:ext>
+            </a:extLst>
+          </p:cNvPr>
+          <p:cNvSpPr/>
+          <p:nvPr/>
+        </p:nvSpPr>
+        <p:spPr>
+          <a:xfrm>
+            <a:off x="5687886" y="4151746"/>
+            <a:ext cx="2219541" cy="1175646"/>
+          </a:xfrm>
+          <a:prstGeom prst="rect">
+            <a:avLst/>
+          </a:prstGeom>
+          <a:solidFill>
+            <a:schemeClr val="bg1">
+              <a:alpha val="74902"/>
+            </a:schemeClr>
+          </a:solidFill>
+          <a:ln w="38100">
+            <a:solidFill>
+              <a:srgbClr val="7030A0">
+                <a:alpha val="49804"/>
+              </a:srgbClr>
+            </a:solidFill>
+          </a:ln>
+        </p:spPr>
+        <p:style>
+          <a:lnRef idx="2">
+            <a:schemeClr val="accent1">
+              <a:shade val="50000"/>
+            </a:schemeClr>
+          </a:lnRef>
+          <a:fillRef idx="1">
+            <a:schemeClr val="accent1"/>
+          </a:fillRef>
+          <a:effectRef idx="0">
+            <a:schemeClr val="accent1"/>
+          </a:effectRef>
+          <a:fontRef idx="minor">
+            <a:schemeClr val="lt1"/>
+          </a:fontRef>
+        </p:style>
+        <p:txBody>
+          <a:bodyPr rtlCol="0" anchor="ctr"/>
+          <a:lstStyle/>
+          <a:p>
+            <a:pPr algn="ctr"/>
+            <a:r>
+              <a:rPr lang="es-ES" sz="1350" dirty="0"/>
+              <a:t>[</a:t>
+            </a:r>
+            <a:r>
+              <a:rPr lang="es-ES" sz="1350" dirty="0" smtClean="0"/>
+              <a:t>NAME=</a:t>
+            </a:r>
+            <a:r>
+              <a:rPr lang="es-ES" sz="1350" dirty="0" err="1" smtClean="0"/>
+              <a:t>ArrowsBlock</a:t>
+            </a:r>
+            <a:r>
+              <a:rPr lang="es-ES" sz="1350" dirty="0" smtClean="0"/>
+              <a:t>];</a:t>
+            </a:r>
+            <a:endParaRPr lang="es-ES" sz="1350" dirty="0"/>
+          </a:p>
+          <a:p>
+            <a:pPr algn="ctr"/>
+            <a:r>
+              <a:rPr lang="es-ES" sz="1350" dirty="0"/>
+              <a:t>[BORDER</a:t>
+            </a:r>
+            <a:r>
+              <a:rPr lang="es-ES" sz="1350" dirty="0" smtClean="0"/>
+              <a:t>];</a:t>
+            </a:r>
+          </a:p>
+          <a:p>
+            <a:pPr algn="ctr"/>
+            <a:r>
+              <a:rPr lang="es-ES" sz="1350" dirty="0" smtClean="0"/>
+              <a:t>[MOVEABLE];</a:t>
+            </a:r>
+          </a:p>
+          <a:p>
+            <a:pPr algn="ctr"/>
+            <a:r>
+              <a:rPr lang="es-ES" sz="1350" dirty="0" smtClean="0"/>
+              <a:t>[TRANSPARENT]</a:t>
+            </a:r>
+            <a:endParaRPr lang="es-ES" sz="1350" dirty="0"/>
+          </a:p>
+        </p:txBody>
+      </p:sp>
       <p:pic>
         <p:nvPicPr>
-          <p:cNvPr id="11" name="Imagen 2" descr="[CURSOR];&#10;[CURSOR-SIZE=25,25];&#10;[COLORBITS=8];">
+          <p:cNvPr id="13" name="Imagen 2" descr="[CURSOR];&#10;[CURSOR-SIZE=25,25];&#10;[COLORBITS=8];">
             <a:extLst>
               <a:ext uri="{FF2B5EF4-FFF2-40B4-BE49-F238E27FC236}">
                 <a16:creationId xmlns:a16="http://schemas.microsoft.com/office/drawing/2014/main" id="{54B3344E-1FFC-4B69-9491-53B9E0FF5CB6}"/>
@@ -4234,14 +4406,12 @@
             </a:extLst>
           </p:cNvPr>
           <p:cNvPicPr>
-            <a:picLocks noGrp="1" noChangeAspect="1"/>
+            <a:picLocks noChangeAspect="1"/>
           </p:cNvPicPr>
-          <p:nvPr>
-            <p:ph idx="1"/>
-          </p:nvPr>
+          <p:nvPr/>
         </p:nvPicPr>
         <p:blipFill>
-          <a:blip r:embed="rId3">
+          <a:blip r:embed="rId4">
             <a:extLst>
               <a:ext uri="{28A0092B-C50C-407E-A947-70E740481C1C}">
                 <a14:useLocalDpi xmlns:a14="http://schemas.microsoft.com/office/drawing/2010/main" val="0"/>
@@ -4254,7 +4424,7 @@
         </p:blipFill>
         <p:spPr>
           <a:xfrm>
-            <a:off x="4454856" y="4262646"/>
+            <a:off x="3784209" y="640400"/>
             <a:ext cx="787791" cy="787791"/>
           </a:xfrm>
           <a:prstGeom prst="rect">
@@ -4292,42 +4462,25 @@
           <a:chExt cx="0" cy="0"/>
         </a:xfrm>
       </p:grpSpPr>
-      <p:pic>
-        <p:nvPicPr>
-          <p:cNvPr id="3" name="Imagen 2" descr="[COMPRESIONLEVEL=8];&#10;[COLORBITS=3]">
-            <a:extLst>
-              <a:ext uri="{FF2B5EF4-FFF2-40B4-BE49-F238E27FC236}">
-                <a16:creationId xmlns:a16="http://schemas.microsoft.com/office/drawing/2014/main" id="{54B3344E-1FFC-4B69-9491-53B9E0FF5CB6}"/>
-              </a:ext>
-            </a:extLst>
-          </p:cNvPr>
-          <p:cNvPicPr>
-            <a:picLocks noChangeAspect="1"/>
-          </p:cNvPicPr>
-          <p:nvPr/>
-        </p:nvPicPr>
-        <p:blipFill>
-          <a:blip r:embed="rId3" cstate="hqprint">
-            <a:extLst>
-              <a:ext uri="{28A0092B-C50C-407E-A947-70E740481C1C}">
-                <a14:useLocalDpi xmlns:a14="http://schemas.microsoft.com/office/drawing/2010/main" val="0"/>
-              </a:ext>
-            </a:extLst>
-          </a:blip>
-          <a:stretch>
-            <a:fillRect/>
-          </a:stretch>
-        </p:blipFill>
-        <p:spPr>
-          <a:xfrm>
-            <a:off x="6557818" y="4753540"/>
-            <a:ext cx="2586182" cy="1724983"/>
-          </a:xfrm>
-          <a:prstGeom prst="rect">
-            <a:avLst/>
-          </a:prstGeom>
-        </p:spPr>
-      </p:pic>
+      <p:sp>
+        <p:nvSpPr>
+          <p:cNvPr id="2" name="Content Placeholder 1"/>
+          <p:cNvSpPr>
+            <a:spLocks noGrp="1"/>
+          </p:cNvSpPr>
+          <p:nvPr>
+            <p:ph idx="1"/>
+          </p:nvPr>
+        </p:nvSpPr>
+        <p:spPr/>
+        <p:txBody>
+          <a:bodyPr/>
+          <a:lstStyle/>
+          <a:p>
+            <a:endParaRPr lang="en-US"/>
+          </a:p>
+        </p:txBody>
+      </p:sp>
     </p:spTree>
     <p:extLst>
       <p:ext uri="{BB962C8B-B14F-4D97-AF65-F5344CB8AC3E}">

</xml_diff>

<commit_message>
WASD/ARROWS movement implemented >D
</commit_message>
<xml_diff>
--- a/VerilogExample/PPVerilogEngine/main.pptx
+++ b/VerilogExample/PPVerilogEngine/main.pptx
@@ -201,7 +201,7 @@
           <a:p>
             <a:fld id="{01A1BE80-B383-48BF-8DCC-287BC5926A7A}" type="datetimeFigureOut">
               <a:rPr lang="en-US" smtClean="0"/>
-              <a:t>11/4/2018</a:t>
+              <a:t>11/11/2018</a:t>
             </a:fld>
             <a:endParaRPr lang="en-US"/>
           </a:p>
@@ -978,7 +978,7 @@
           <a:p>
             <a:fld id="{857345AB-E265-4E05-A009-C7E62629F4CB}" type="datetimeFigureOut">
               <a:rPr lang="es-ES" smtClean="0"/>
-              <a:t>04/11/2018</a:t>
+              <a:t>11/11/2018</a:t>
             </a:fld>
             <a:endParaRPr lang="es-ES"/>
           </a:p>
@@ -1148,7 +1148,7 @@
           <a:p>
             <a:fld id="{857345AB-E265-4E05-A009-C7E62629F4CB}" type="datetimeFigureOut">
               <a:rPr lang="es-ES" smtClean="0"/>
-              <a:t>04/11/2018</a:t>
+              <a:t>11/11/2018</a:t>
             </a:fld>
             <a:endParaRPr lang="es-ES"/>
           </a:p>
@@ -1328,7 +1328,7 @@
           <a:p>
             <a:fld id="{857345AB-E265-4E05-A009-C7E62629F4CB}" type="datetimeFigureOut">
               <a:rPr lang="es-ES" smtClean="0"/>
-              <a:t>04/11/2018</a:t>
+              <a:t>11/11/2018</a:t>
             </a:fld>
             <a:endParaRPr lang="es-ES"/>
           </a:p>
@@ -1498,7 +1498,7 @@
           <a:p>
             <a:fld id="{857345AB-E265-4E05-A009-C7E62629F4CB}" type="datetimeFigureOut">
               <a:rPr lang="es-ES" smtClean="0"/>
-              <a:t>04/11/2018</a:t>
+              <a:t>11/11/2018</a:t>
             </a:fld>
             <a:endParaRPr lang="es-ES"/>
           </a:p>
@@ -1742,7 +1742,7 @@
           <a:p>
             <a:fld id="{857345AB-E265-4E05-A009-C7E62629F4CB}" type="datetimeFigureOut">
               <a:rPr lang="es-ES" smtClean="0"/>
-              <a:t>04/11/2018</a:t>
+              <a:t>11/11/2018</a:t>
             </a:fld>
             <a:endParaRPr lang="es-ES"/>
           </a:p>
@@ -1974,7 +1974,7 @@
           <a:p>
             <a:fld id="{857345AB-E265-4E05-A009-C7E62629F4CB}" type="datetimeFigureOut">
               <a:rPr lang="es-ES" smtClean="0"/>
-              <a:t>04/11/2018</a:t>
+              <a:t>11/11/2018</a:t>
             </a:fld>
             <a:endParaRPr lang="es-ES"/>
           </a:p>
@@ -2341,7 +2341,7 @@
           <a:p>
             <a:fld id="{857345AB-E265-4E05-A009-C7E62629F4CB}" type="datetimeFigureOut">
               <a:rPr lang="es-ES" smtClean="0"/>
-              <a:t>04/11/2018</a:t>
+              <a:t>11/11/2018</a:t>
             </a:fld>
             <a:endParaRPr lang="es-ES"/>
           </a:p>
@@ -2459,7 +2459,7 @@
           <a:p>
             <a:fld id="{857345AB-E265-4E05-A009-C7E62629F4CB}" type="datetimeFigureOut">
               <a:rPr lang="es-ES" smtClean="0"/>
-              <a:t>04/11/2018</a:t>
+              <a:t>11/11/2018</a:t>
             </a:fld>
             <a:endParaRPr lang="es-ES"/>
           </a:p>
@@ -2554,7 +2554,7 @@
           <a:p>
             <a:fld id="{857345AB-E265-4E05-A009-C7E62629F4CB}" type="datetimeFigureOut">
               <a:rPr lang="es-ES" smtClean="0"/>
-              <a:t>04/11/2018</a:t>
+              <a:t>11/11/2018</a:t>
             </a:fld>
             <a:endParaRPr lang="es-ES"/>
           </a:p>
@@ -2831,7 +2831,7 @@
           <a:p>
             <a:fld id="{857345AB-E265-4E05-A009-C7E62629F4CB}" type="datetimeFigureOut">
               <a:rPr lang="es-ES" smtClean="0"/>
-              <a:t>04/11/2018</a:t>
+              <a:t>11/11/2018</a:t>
             </a:fld>
             <a:endParaRPr lang="es-ES"/>
           </a:p>
@@ -3088,7 +3088,7 @@
           <a:p>
             <a:fld id="{857345AB-E265-4E05-A009-C7E62629F4CB}" type="datetimeFigureOut">
               <a:rPr lang="es-ES" smtClean="0"/>
-              <a:t>04/11/2018</a:t>
+              <a:t>11/11/2018</a:t>
             </a:fld>
             <a:endParaRPr lang="es-ES"/>
           </a:p>
@@ -3301,7 +3301,7 @@
           <a:p>
             <a:fld id="{857345AB-E265-4E05-A009-C7E62629F4CB}" type="datetimeFigureOut">
               <a:rPr lang="es-ES" smtClean="0"/>
-              <a:t>04/11/2018</a:t>
+              <a:t>11/11/2018</a:t>
             </a:fld>
             <a:endParaRPr lang="es-ES"/>
           </a:p>
@@ -3783,42 +3783,6 @@
           </a:p>
         </p:txBody>
       </p:sp>
-      <p:pic>
-        <p:nvPicPr>
-          <p:cNvPr id="14" name="Imagen 2" descr="[COMPRESIONLEVEL=6];&#10;[COLORBITS=4]">
-            <a:extLst>
-              <a:ext uri="{FF2B5EF4-FFF2-40B4-BE49-F238E27FC236}">
-                <a16:creationId xmlns:a16="http://schemas.microsoft.com/office/drawing/2014/main" id="{54B3344E-1FFC-4B69-9491-53B9E0FF5CB6}"/>
-              </a:ext>
-            </a:extLst>
-          </p:cNvPr>
-          <p:cNvPicPr>
-            <a:picLocks noChangeAspect="1"/>
-          </p:cNvPicPr>
-          <p:nvPr/>
-        </p:nvPicPr>
-        <p:blipFill>
-          <a:blip r:embed="rId3" cstate="hqprint">
-            <a:extLst>
-              <a:ext uri="{28A0092B-C50C-407E-A947-70E740481C1C}">
-                <a14:useLocalDpi xmlns:a14="http://schemas.microsoft.com/office/drawing/2010/main" val="0"/>
-              </a:ext>
-            </a:extLst>
-          </a:blip>
-          <a:stretch>
-            <a:fillRect/>
-          </a:stretch>
-        </p:blipFill>
-        <p:spPr>
-          <a:xfrm>
-            <a:off x="0" y="4843496"/>
-            <a:ext cx="2586182" cy="1724983"/>
-          </a:xfrm>
-          <a:prstGeom prst="rect">
-            <a:avLst/>
-          </a:prstGeom>
-        </p:spPr>
-      </p:pic>
       <p:sp>
         <p:nvSpPr>
           <p:cNvPr id="6" name="Rectángulo 3">
@@ -4290,7 +4254,37 @@
             <a:pPr algn="ctr"/>
             <a:r>
               <a:rPr lang="es-ES" sz="1350" dirty="0" smtClean="0"/>
-              <a:t>[TRANSPARENT]</a:t>
+              <a:t>[TRANSPARENT];</a:t>
+            </a:r>
+          </a:p>
+          <a:p>
+            <a:pPr algn="ctr"/>
+            <a:r>
+              <a:rPr lang="es-ES" sz="1350" dirty="0"/>
+              <a:t>[</a:t>
+            </a:r>
+            <a:r>
+              <a:rPr lang="es-ES" sz="1350" dirty="0" err="1" smtClean="0"/>
+              <a:t>WASDMovement</a:t>
+            </a:r>
+            <a:r>
+              <a:rPr lang="es-ES" sz="1350" dirty="0" smtClean="0"/>
+              <a:t>];</a:t>
+            </a:r>
+          </a:p>
+          <a:p>
+            <a:pPr algn="ctr"/>
+            <a:r>
+              <a:rPr lang="es-ES" sz="1350" dirty="0" smtClean="0"/>
+              <a:t>[</a:t>
+            </a:r>
+            <a:r>
+              <a:rPr lang="es-ES" sz="1350" dirty="0" err="1" smtClean="0"/>
+              <a:t>AnimationSpeed</a:t>
+            </a:r>
+            <a:r>
+              <a:rPr lang="es-ES" sz="1350" dirty="0" smtClean="0"/>
+              <a:t>=3];</a:t>
             </a:r>
             <a:endParaRPr lang="es-ES" sz="1350" dirty="0"/>
           </a:p>
@@ -4390,15 +4384,115 @@
             <a:pPr algn="ctr"/>
             <a:r>
               <a:rPr lang="es-ES" sz="1350" dirty="0" smtClean="0"/>
-              <a:t>[TRANSPARENT]</a:t>
+              <a:t>[TRANSPARENT];</a:t>
+            </a:r>
+          </a:p>
+          <a:p>
+            <a:pPr algn="ctr"/>
+            <a:r>
+              <a:rPr lang="es-ES" sz="1350" dirty="0" smtClean="0"/>
+              <a:t>[</a:t>
+            </a:r>
+            <a:r>
+              <a:rPr lang="es-ES" sz="1350" dirty="0" err="1" smtClean="0"/>
+              <a:t>ARROWSMovement</a:t>
+            </a:r>
+            <a:r>
+              <a:rPr lang="es-ES" sz="1350" dirty="0" smtClean="0"/>
+              <a:t>];</a:t>
             </a:r>
             <a:endParaRPr lang="es-ES" sz="1350" dirty="0"/>
+          </a:p>
+        </p:txBody>
+      </p:sp>
+    </p:spTree>
+    <p:extLst>
+      <p:ext uri="{BB962C8B-B14F-4D97-AF65-F5344CB8AC3E}">
+        <p14:creationId xmlns:p14="http://schemas.microsoft.com/office/powerpoint/2010/main" val="3380256703"/>
+      </p:ext>
+    </p:extLst>
+  </p:cSld>
+  <p:clrMapOvr>
+    <a:masterClrMapping/>
+  </p:clrMapOvr>
+</p:sld>
+</file>
+
+<file path=ppt/slides/slide2.xml><?xml version="1.0" encoding="utf-8"?>
+<p:sld xmlns:a="http://schemas.openxmlformats.org/drawingml/2006/main" xmlns:r="http://schemas.openxmlformats.org/officeDocument/2006/relationships" xmlns:p="http://schemas.openxmlformats.org/presentationml/2006/main">
+  <p:cSld>
+    <p:spTree>
+      <p:nvGrpSpPr>
+        <p:cNvPr id="1" name=""/>
+        <p:cNvGrpSpPr/>
+        <p:nvPr/>
+      </p:nvGrpSpPr>
+      <p:grpSpPr>
+        <a:xfrm>
+          <a:off x="0" y="0"/>
+          <a:ext cx="0" cy="0"/>
+          <a:chOff x="0" y="0"/>
+          <a:chExt cx="0" cy="0"/>
+        </a:xfrm>
+      </p:grpSpPr>
+      <p:sp>
+        <p:nvSpPr>
+          <p:cNvPr id="2" name="Content Placeholder 1"/>
+          <p:cNvSpPr>
+            <a:spLocks noGrp="1"/>
+          </p:cNvSpPr>
+          <p:nvPr>
+            <p:ph idx="1"/>
+          </p:nvPr>
+        </p:nvSpPr>
+        <p:spPr/>
+        <p:txBody>
+          <a:bodyPr/>
+          <a:lstStyle/>
+          <a:p>
+            <a:endParaRPr lang="en-US" dirty="0"/>
           </a:p>
         </p:txBody>
       </p:sp>
       <p:pic>
         <p:nvPicPr>
-          <p:cNvPr id="13" name="Imagen 2" descr="[CURSOR];&#10;[CURSOR-SIZE=25,25];&#10;[COLORBITS=8];">
+          <p:cNvPr id="3" name="Imagen 2" descr="[COMPRESIONLEVEL=6];&#10;[COLORBITS=4]">
+            <a:extLst>
+              <a:ext uri="{FF2B5EF4-FFF2-40B4-BE49-F238E27FC236}">
+                <a16:creationId xmlns:a16="http://schemas.microsoft.com/office/drawing/2014/main" id="{54B3344E-1FFC-4B69-9491-53B9E0FF5CB6}"/>
+              </a:ext>
+            </a:extLst>
+          </p:cNvPr>
+          <p:cNvPicPr>
+            <a:picLocks noChangeAspect="1"/>
+          </p:cNvPicPr>
+          <p:nvPr/>
+        </p:nvPicPr>
+        <p:blipFill>
+          <a:blip r:embed="rId3" cstate="hqprint">
+            <a:extLst>
+              <a:ext uri="{28A0092B-C50C-407E-A947-70E740481C1C}">
+                <a14:useLocalDpi xmlns:a14="http://schemas.microsoft.com/office/drawing/2010/main" val="0"/>
+              </a:ext>
+            </a:extLst>
+          </a:blip>
+          <a:stretch>
+            <a:fillRect/>
+          </a:stretch>
+        </p:blipFill>
+        <p:spPr>
+          <a:xfrm>
+            <a:off x="0" y="4843496"/>
+            <a:ext cx="2586182" cy="1724983"/>
+          </a:xfrm>
+          <a:prstGeom prst="rect">
+            <a:avLst/>
+          </a:prstGeom>
+        </p:spPr>
+      </p:pic>
+      <p:pic>
+        <p:nvPicPr>
+          <p:cNvPr id="5" name="Imagen 2" descr="[CURSOR];&#10;[CURSOR-SIZE=25,25];&#10;[COLORBITS=8];">
             <a:extLst>
               <a:ext uri="{FF2B5EF4-FFF2-40B4-BE49-F238E27FC236}">
                 <a16:creationId xmlns:a16="http://schemas.microsoft.com/office/drawing/2014/main" id="{54B3344E-1FFC-4B69-9491-53B9E0FF5CB6}"/>
@@ -4432,55 +4526,6 @@
           </a:prstGeom>
         </p:spPr>
       </p:pic>
-    </p:spTree>
-    <p:extLst>
-      <p:ext uri="{BB962C8B-B14F-4D97-AF65-F5344CB8AC3E}">
-        <p14:creationId xmlns:p14="http://schemas.microsoft.com/office/powerpoint/2010/main" val="3380256703"/>
-      </p:ext>
-    </p:extLst>
-  </p:cSld>
-  <p:clrMapOvr>
-    <a:masterClrMapping/>
-  </p:clrMapOvr>
-</p:sld>
-</file>
-
-<file path=ppt/slides/slide2.xml><?xml version="1.0" encoding="utf-8"?>
-<p:sld xmlns:a="http://schemas.openxmlformats.org/drawingml/2006/main" xmlns:r="http://schemas.openxmlformats.org/officeDocument/2006/relationships" xmlns:p="http://schemas.openxmlformats.org/presentationml/2006/main">
-  <p:cSld>
-    <p:spTree>
-      <p:nvGrpSpPr>
-        <p:cNvPr id="1" name=""/>
-        <p:cNvGrpSpPr/>
-        <p:nvPr/>
-      </p:nvGrpSpPr>
-      <p:grpSpPr>
-        <a:xfrm>
-          <a:off x="0" y="0"/>
-          <a:ext cx="0" cy="0"/>
-          <a:chOff x="0" y="0"/>
-          <a:chExt cx="0" cy="0"/>
-        </a:xfrm>
-      </p:grpSpPr>
-      <p:sp>
-        <p:nvSpPr>
-          <p:cNvPr id="2" name="Content Placeholder 1"/>
-          <p:cNvSpPr>
-            <a:spLocks noGrp="1"/>
-          </p:cNvSpPr>
-          <p:nvPr>
-            <p:ph idx="1"/>
-          </p:nvPr>
-        </p:nvSpPr>
-        <p:spPr/>
-        <p:txBody>
-          <a:bodyPr/>
-          <a:lstStyle/>
-          <a:p>
-            <a:endParaRPr lang="en-US"/>
-          </a:p>
-        </p:txBody>
-      </p:sp>
     </p:spTree>
     <p:extLst>
       <p:ext uri="{BB962C8B-B14F-4D97-AF65-F5344CB8AC3E}">

</xml_diff>

<commit_message>
Memory pictures + bounding animation (DO NOT UPDATE)
</commit_message>
<xml_diff>
--- a/VerilogExample/PPVerilogEngine/main.pptx
+++ b/VerilogExample/PPVerilogEngine/main.pptx
@@ -8,8 +8,8 @@
     <p:notesMasterId r:id="rId7"/>
   </p:notesMasterIdLst>
   <p:sldIdLst>
-    <p:sldId id="258" r:id="rId2"/>
-    <p:sldId id="257" r:id="rId3"/>
+    <p:sldId id="257" r:id="rId2"/>
+    <p:sldId id="258" r:id="rId3"/>
     <p:sldId id="260" r:id="rId4"/>
     <p:sldId id="256" r:id="rId5"/>
     <p:sldId id="259" r:id="rId6"/>
@@ -201,7 +201,7 @@
           <a:p>
             <a:fld id="{01A1BE80-B383-48BF-8DCC-287BC5926A7A}" type="datetimeFigureOut">
               <a:rPr lang="en-US" smtClean="0"/>
-              <a:t>11/11/2018</a:t>
+              <a:t>11/25/2018</a:t>
             </a:fld>
             <a:endParaRPr lang="en-US"/>
           </a:p>
@@ -518,14 +518,15 @@
           <a:lstStyle/>
           <a:p>
             <a:r>
-              <a:rPr lang="es-ES"/>
-              <a:t>[</a:t>
-            </a:r>
-            <a:r>
-              <a:rPr lang="es-ES" smtClean="0"/>
-              <a:t>BACKCOLOR=25,45,10]</a:t>
-            </a:r>
-            <a:endParaRPr lang="es-ES" dirty="0"/>
+              <a:rPr lang="es-ES" dirty="0"/>
+              <a:t>[BCKCOLOR=115,155,234];</a:t>
+            </a:r>
+          </a:p>
+          <a:p>
+            <a:r>
+              <a:rPr lang="es-ES" dirty="0"/>
+              <a:t>[TESTPROPERTY]</a:t>
+            </a:r>
           </a:p>
         </p:txBody>
       </p:sp>
@@ -555,7 +556,7 @@
     </p:spTree>
     <p:extLst>
       <p:ext uri="{BB962C8B-B14F-4D97-AF65-F5344CB8AC3E}">
-        <p14:creationId xmlns:p14="http://schemas.microsoft.com/office/powerpoint/2010/main" val="362882710"/>
+        <p14:creationId xmlns:p14="http://schemas.microsoft.com/office/powerpoint/2010/main" val="2590234679"/>
       </p:ext>
     </p:extLst>
   </p:cSld>
@@ -615,15 +616,14 @@
           <a:lstStyle/>
           <a:p>
             <a:r>
-              <a:rPr lang="es-ES" dirty="0"/>
-              <a:t>[BCKCOLOR=115,155,234];</a:t>
-            </a:r>
-          </a:p>
-          <a:p>
-            <a:r>
-              <a:rPr lang="es-ES" dirty="0"/>
-              <a:t>[TESTPROPERTY]</a:t>
-            </a:r>
+              <a:rPr lang="es-ES"/>
+              <a:t>[</a:t>
+            </a:r>
+            <a:r>
+              <a:rPr lang="es-ES" smtClean="0"/>
+              <a:t>BACKCOLOR=25,45,10]</a:t>
+            </a:r>
+            <a:endParaRPr lang="es-ES" dirty="0"/>
           </a:p>
         </p:txBody>
       </p:sp>
@@ -653,7 +653,7 @@
     </p:spTree>
     <p:extLst>
       <p:ext uri="{BB962C8B-B14F-4D97-AF65-F5344CB8AC3E}">
-        <p14:creationId xmlns:p14="http://schemas.microsoft.com/office/powerpoint/2010/main" val="2590234679"/>
+        <p14:creationId xmlns:p14="http://schemas.microsoft.com/office/powerpoint/2010/main" val="362882710"/>
       </p:ext>
     </p:extLst>
   </p:cSld>
@@ -978,7 +978,7 @@
           <a:p>
             <a:fld id="{857345AB-E265-4E05-A009-C7E62629F4CB}" type="datetimeFigureOut">
               <a:rPr lang="es-ES" smtClean="0"/>
-              <a:t>11/11/2018</a:t>
+              <a:t>25/11/2018</a:t>
             </a:fld>
             <a:endParaRPr lang="es-ES"/>
           </a:p>
@@ -1148,7 +1148,7 @@
           <a:p>
             <a:fld id="{857345AB-E265-4E05-A009-C7E62629F4CB}" type="datetimeFigureOut">
               <a:rPr lang="es-ES" smtClean="0"/>
-              <a:t>11/11/2018</a:t>
+              <a:t>25/11/2018</a:t>
             </a:fld>
             <a:endParaRPr lang="es-ES"/>
           </a:p>
@@ -1328,7 +1328,7 @@
           <a:p>
             <a:fld id="{857345AB-E265-4E05-A009-C7E62629F4CB}" type="datetimeFigureOut">
               <a:rPr lang="es-ES" smtClean="0"/>
-              <a:t>11/11/2018</a:t>
+              <a:t>25/11/2018</a:t>
             </a:fld>
             <a:endParaRPr lang="es-ES"/>
           </a:p>
@@ -1498,7 +1498,7 @@
           <a:p>
             <a:fld id="{857345AB-E265-4E05-A009-C7E62629F4CB}" type="datetimeFigureOut">
               <a:rPr lang="es-ES" smtClean="0"/>
-              <a:t>11/11/2018</a:t>
+              <a:t>25/11/2018</a:t>
             </a:fld>
             <a:endParaRPr lang="es-ES"/>
           </a:p>
@@ -1742,7 +1742,7 @@
           <a:p>
             <a:fld id="{857345AB-E265-4E05-A009-C7E62629F4CB}" type="datetimeFigureOut">
               <a:rPr lang="es-ES" smtClean="0"/>
-              <a:t>11/11/2018</a:t>
+              <a:t>25/11/2018</a:t>
             </a:fld>
             <a:endParaRPr lang="es-ES"/>
           </a:p>
@@ -1974,7 +1974,7 @@
           <a:p>
             <a:fld id="{857345AB-E265-4E05-A009-C7E62629F4CB}" type="datetimeFigureOut">
               <a:rPr lang="es-ES" smtClean="0"/>
-              <a:t>11/11/2018</a:t>
+              <a:t>25/11/2018</a:t>
             </a:fld>
             <a:endParaRPr lang="es-ES"/>
           </a:p>
@@ -2341,7 +2341,7 @@
           <a:p>
             <a:fld id="{857345AB-E265-4E05-A009-C7E62629F4CB}" type="datetimeFigureOut">
               <a:rPr lang="es-ES" smtClean="0"/>
-              <a:t>11/11/2018</a:t>
+              <a:t>25/11/2018</a:t>
             </a:fld>
             <a:endParaRPr lang="es-ES"/>
           </a:p>
@@ -2459,7 +2459,7 @@
           <a:p>
             <a:fld id="{857345AB-E265-4E05-A009-C7E62629F4CB}" type="datetimeFigureOut">
               <a:rPr lang="es-ES" smtClean="0"/>
-              <a:t>11/11/2018</a:t>
+              <a:t>25/11/2018</a:t>
             </a:fld>
             <a:endParaRPr lang="es-ES"/>
           </a:p>
@@ -2554,7 +2554,7 @@
           <a:p>
             <a:fld id="{857345AB-E265-4E05-A009-C7E62629F4CB}" type="datetimeFigureOut">
               <a:rPr lang="es-ES" smtClean="0"/>
-              <a:t>11/11/2018</a:t>
+              <a:t>25/11/2018</a:t>
             </a:fld>
             <a:endParaRPr lang="es-ES"/>
           </a:p>
@@ -2831,7 +2831,7 @@
           <a:p>
             <a:fld id="{857345AB-E265-4E05-A009-C7E62629F4CB}" type="datetimeFigureOut">
               <a:rPr lang="es-ES" smtClean="0"/>
-              <a:t>11/11/2018</a:t>
+              <a:t>25/11/2018</a:t>
             </a:fld>
             <a:endParaRPr lang="es-ES"/>
           </a:p>
@@ -3088,7 +3088,7 @@
           <a:p>
             <a:fld id="{857345AB-E265-4E05-A009-C7E62629F4CB}" type="datetimeFigureOut">
               <a:rPr lang="es-ES" smtClean="0"/>
-              <a:t>11/11/2018</a:t>
+              <a:t>25/11/2018</a:t>
             </a:fld>
             <a:endParaRPr lang="es-ES"/>
           </a:p>
@@ -3301,7 +3301,7 @@
           <a:p>
             <a:fld id="{857345AB-E265-4E05-A009-C7E62629F4CB}" type="datetimeFigureOut">
               <a:rPr lang="es-ES" smtClean="0"/>
-              <a:t>11/11/2018</a:t>
+              <a:t>25/11/2018</a:t>
             </a:fld>
             <a:endParaRPr lang="es-ES"/>
           </a:p>
@@ -3706,6 +3706,317 @@
           <a:chExt cx="0" cy="0"/>
         </a:xfrm>
       </p:grpSpPr>
+      <p:pic>
+        <p:nvPicPr>
+          <p:cNvPr id="1026" name="Picture 2" descr="[MEMORY];&#10;[COMPRESIONLEVEL=2];&#10;[NAME=timesTable];&#10;">
+            <a:hlinkClick r:id="rId3"/>
+          </p:cNvPr>
+          <p:cNvPicPr>
+            <a:picLocks noChangeAspect="1" noChangeArrowheads="1"/>
+          </p:cNvPicPr>
+          <p:nvPr/>
+        </p:nvPicPr>
+        <p:blipFill>
+          <a:blip r:embed="rId4">
+            <a:extLst>
+              <a:ext uri="{28A0092B-C50C-407E-A947-70E740481C1C}">
+                <a14:useLocalDpi xmlns:a14="http://schemas.microsoft.com/office/drawing/2010/main" val="0"/>
+              </a:ext>
+            </a:extLst>
+          </a:blip>
+          <a:srcRect/>
+          <a:stretch>
+            <a:fillRect/>
+          </a:stretch>
+        </p:blipFill>
+        <p:spPr bwMode="auto">
+          <a:xfrm>
+            <a:off x="0" y="0"/>
+            <a:ext cx="9347200" cy="5142955"/>
+          </a:xfrm>
+          <a:prstGeom prst="rect">
+            <a:avLst/>
+          </a:prstGeom>
+          <a:noFill/>
+          <a:extLst>
+            <a:ext uri="{909E8E84-426E-40DD-AFC4-6F175D3DCCD1}">
+              <a14:hiddenFill xmlns:a14="http://schemas.microsoft.com/office/drawing/2010/main">
+                <a:solidFill>
+                  <a:srgbClr val="FFFFFF"/>
+                </a:solidFill>
+              </a14:hiddenFill>
+            </a:ext>
+          </a:extLst>
+        </p:spPr>
+      </p:pic>
+      <p:pic>
+        <p:nvPicPr>
+          <p:cNvPr id="8" name="Imagen 2" descr="[CURSOR];&#10;[CURSOR-SIZE=25,25];&#10;[COLORBITS=8];">
+            <a:extLst>
+              <a:ext uri="{FF2B5EF4-FFF2-40B4-BE49-F238E27FC236}">
+                <a16:creationId xmlns:a16="http://schemas.microsoft.com/office/drawing/2014/main" id="{54B3344E-1FFC-4B69-9491-53B9E0FF5CB6}"/>
+              </a:ext>
+            </a:extLst>
+          </p:cNvPr>
+          <p:cNvPicPr>
+            <a:picLocks noChangeAspect="1"/>
+          </p:cNvPicPr>
+          <p:nvPr/>
+        </p:nvPicPr>
+        <p:blipFill>
+          <a:blip r:embed="rId5">
+            <a:extLst>
+              <a:ext uri="{28A0092B-C50C-407E-A947-70E740481C1C}">
+                <a14:useLocalDpi xmlns:a14="http://schemas.microsoft.com/office/drawing/2010/main" val="0"/>
+              </a:ext>
+            </a:extLst>
+          </a:blip>
+          <a:stretch>
+            <a:fillRect/>
+          </a:stretch>
+        </p:blipFill>
+        <p:spPr>
+          <a:xfrm>
+            <a:off x="7620702" y="5475440"/>
+            <a:ext cx="787791" cy="787791"/>
+          </a:xfrm>
+          <a:prstGeom prst="rect">
+            <a:avLst/>
+          </a:prstGeom>
+        </p:spPr>
+      </p:pic>
+      <p:pic>
+        <p:nvPicPr>
+          <p:cNvPr id="2" name="Picture 1" descr="[MEMORY];&#10;[COMPRESIONLEVEL=1];&#10;[MOVEABLE];&#10;[WASDMovement];&#10;[NAME=einstein];&#10;"/>
+          <p:cNvPicPr>
+            <a:picLocks noChangeAspect="1"/>
+          </p:cNvPicPr>
+          <p:nvPr/>
+        </p:nvPicPr>
+        <p:blipFill>
+          <a:blip r:embed="rId6" cstate="hqprint">
+            <a:extLst>
+              <a:ext uri="{28A0092B-C50C-407E-A947-70E740481C1C}">
+                <a14:useLocalDpi xmlns:a14="http://schemas.microsoft.com/office/drawing/2010/main" val="0"/>
+              </a:ext>
+            </a:extLst>
+          </a:blip>
+          <a:stretch>
+            <a:fillRect/>
+          </a:stretch>
+        </p:blipFill>
+        <p:spPr>
+          <a:xfrm>
+            <a:off x="1009690" y="4026100"/>
+            <a:ext cx="1990184" cy="2233709"/>
+          </a:xfrm>
+          <a:prstGeom prst="rect">
+            <a:avLst/>
+          </a:prstGeom>
+        </p:spPr>
+      </p:pic>
+      <p:pic>
+        <p:nvPicPr>
+          <p:cNvPr id="3" name="Picture 2" descr="[MEMORY];&#10;[COMPRESIONLEVEL=1];&#10;[MOVEABLE];&#10;[ARROWSMovement];&#10;[NAME=peter];&#10;[AnimationSpeed=5];&#10;"/>
+          <p:cNvPicPr>
+            <a:picLocks noChangeAspect="1"/>
+          </p:cNvPicPr>
+          <p:nvPr/>
+        </p:nvPicPr>
+        <p:blipFill>
+          <a:blip r:embed="rId7" cstate="hqprint">
+            <a:extLst>
+              <a:ext uri="{28A0092B-C50C-407E-A947-70E740481C1C}">
+                <a14:useLocalDpi xmlns:a14="http://schemas.microsoft.com/office/drawing/2010/main" val="0"/>
+              </a:ext>
+            </a:extLst>
+          </a:blip>
+          <a:stretch>
+            <a:fillRect/>
+          </a:stretch>
+        </p:blipFill>
+        <p:spPr>
+          <a:xfrm>
+            <a:off x="3651048" y="4023403"/>
+            <a:ext cx="2236406" cy="2236406"/>
+          </a:xfrm>
+          <a:prstGeom prst="rect">
+            <a:avLst/>
+          </a:prstGeom>
+        </p:spPr>
+      </p:pic>
+      <p:pic>
+        <p:nvPicPr>
+          <p:cNvPr id="5" name="Picture 4" descr="[MEMORY];&#10;[COMPRESIONLEVEL=1];&#10;[MOVEABLE];&#10;[NAME=bouncer];&#10;[BOUNCING];&#10;[TRANSPARENT];&#10;"/>
+          <p:cNvPicPr>
+            <a:picLocks noChangeAspect="1"/>
+          </p:cNvPicPr>
+          <p:nvPr/>
+        </p:nvPicPr>
+        <p:blipFill>
+          <a:blip r:embed="rId8">
+            <a:extLst>
+              <a:ext uri="{28A0092B-C50C-407E-A947-70E740481C1C}">
+                <a14:useLocalDpi xmlns:a14="http://schemas.microsoft.com/office/drawing/2010/main" val="0"/>
+              </a:ext>
+            </a:extLst>
+          </a:blip>
+          <a:stretch>
+            <a:fillRect/>
+          </a:stretch>
+        </p:blipFill>
+        <p:spPr>
+          <a:xfrm>
+            <a:off x="4203032" y="1245463"/>
+            <a:ext cx="4343022" cy="2445455"/>
+          </a:xfrm>
+          <a:prstGeom prst="rect">
+            <a:avLst/>
+          </a:prstGeom>
+        </p:spPr>
+      </p:pic>
+      <p:sp>
+        <p:nvSpPr>
+          <p:cNvPr id="9" name="Rectángulo 3">
+            <a:extLst>
+              <a:ext uri="{FF2B5EF4-FFF2-40B4-BE49-F238E27FC236}">
+                <a16:creationId xmlns:a16="http://schemas.microsoft.com/office/drawing/2014/main" id="{FB329AE3-5F8D-4424-8762-8395299AFD7C}"/>
+              </a:ext>
+            </a:extLst>
+          </p:cNvPr>
+          <p:cNvSpPr/>
+          <p:nvPr/>
+        </p:nvSpPr>
+        <p:spPr>
+          <a:xfrm>
+            <a:off x="178677" y="2722116"/>
+            <a:ext cx="1862560" cy="982697"/>
+          </a:xfrm>
+          <a:prstGeom prst="rect">
+            <a:avLst/>
+          </a:prstGeom>
+          <a:solidFill>
+            <a:srgbClr val="70AD47">
+              <a:alpha val="50196"/>
+            </a:srgbClr>
+          </a:solidFill>
+          <a:ln w="57150">
+            <a:solidFill>
+              <a:schemeClr val="accent2">
+                <a:lumMod val="60000"/>
+                <a:lumOff val="40000"/>
+              </a:schemeClr>
+            </a:solidFill>
+          </a:ln>
+        </p:spPr>
+        <p:style>
+          <a:lnRef idx="2">
+            <a:schemeClr val="accent1">
+              <a:shade val="50000"/>
+            </a:schemeClr>
+          </a:lnRef>
+          <a:fillRef idx="1">
+            <a:schemeClr val="accent1"/>
+          </a:fillRef>
+          <a:effectRef idx="0">
+            <a:schemeClr val="accent1"/>
+          </a:effectRef>
+          <a:fontRef idx="minor">
+            <a:schemeClr val="lt1"/>
+          </a:fontRef>
+        </p:style>
+        <p:txBody>
+          <a:bodyPr rtlCol="0" anchor="ctr"/>
+          <a:lstStyle/>
+          <a:p>
+            <a:pPr algn="ctr"/>
+            <a:r>
+              <a:rPr lang="es-ES" sz="1350" dirty="0"/>
+              <a:t>[NAME=Basic </a:t>
+            </a:r>
+            <a:r>
+              <a:rPr lang="es-ES" sz="1350" dirty="0" err="1"/>
+              <a:t>transparency</a:t>
+            </a:r>
+            <a:r>
+              <a:rPr lang="es-ES" sz="1350" dirty="0"/>
+              <a:t>];</a:t>
+            </a:r>
+          </a:p>
+          <a:p>
+            <a:pPr algn="ctr"/>
+            <a:r>
+              <a:rPr lang="es-ES" sz="1350" dirty="0" smtClean="0"/>
+              <a:t>[MOVEABLE];</a:t>
+            </a:r>
+          </a:p>
+          <a:p>
+            <a:pPr algn="ctr"/>
+            <a:r>
+              <a:rPr lang="es-ES" sz="1350" dirty="0" smtClean="0"/>
+              <a:t>[BORDER];[TRANSPARENT</a:t>
+            </a:r>
+            <a:r>
+              <a:rPr lang="es-ES" sz="1350" dirty="0" smtClean="0"/>
+              <a:t>];[</a:t>
+            </a:r>
+            <a:r>
+              <a:rPr lang="es-ES" sz="1350" dirty="0"/>
+              <a:t>BOUNCING</a:t>
+            </a:r>
+            <a:r>
+              <a:rPr lang="es-ES" sz="1350" dirty="0" smtClean="0"/>
+              <a:t>];</a:t>
+            </a:r>
+          </a:p>
+          <a:p>
+            <a:pPr algn="ctr"/>
+            <a:r>
+              <a:rPr lang="es-ES" sz="1350" dirty="0" smtClean="0"/>
+              <a:t>[</a:t>
+            </a:r>
+            <a:r>
+              <a:rPr lang="es-ES" sz="1350" dirty="0" err="1" smtClean="0"/>
+              <a:t>AnimationSpeed</a:t>
+            </a:r>
+            <a:r>
+              <a:rPr lang="es-ES" sz="1350" dirty="0" smtClean="0"/>
+              <a:t>=10]</a:t>
+            </a:r>
+            <a:endParaRPr lang="es-ES" sz="1350" dirty="0"/>
+          </a:p>
+        </p:txBody>
+      </p:sp>
+    </p:spTree>
+    <p:extLst>
+      <p:ext uri="{BB962C8B-B14F-4D97-AF65-F5344CB8AC3E}">
+        <p14:creationId xmlns:p14="http://schemas.microsoft.com/office/powerpoint/2010/main" val="2186432323"/>
+      </p:ext>
+    </p:extLst>
+  </p:cSld>
+  <p:clrMapOvr>
+    <a:masterClrMapping/>
+  </p:clrMapOvr>
+</p:sld>
+</file>
+
+<file path=ppt/slides/slide2.xml><?xml version="1.0" encoding="utf-8"?>
+<p:sld xmlns:a="http://schemas.openxmlformats.org/drawingml/2006/main" xmlns:r="http://schemas.openxmlformats.org/officeDocument/2006/relationships" xmlns:p="http://schemas.openxmlformats.org/presentationml/2006/main">
+  <p:cSld>
+    <p:spTree>
+      <p:nvGrpSpPr>
+        <p:cNvPr id="1" name=""/>
+        <p:cNvGrpSpPr/>
+        <p:nvPr/>
+      </p:nvGrpSpPr>
+      <p:grpSpPr>
+        <a:xfrm>
+          <a:off x="0" y="0"/>
+          <a:ext cx="0" cy="0"/>
+          <a:chOff x="0" y="0"/>
+          <a:chExt cx="0" cy="0"/>
+        </a:xfrm>
+      </p:grpSpPr>
       <p:sp>
         <p:nvSpPr>
           <p:cNvPr id="5" name="Rectángulo 4">
@@ -4247,35 +4558,6 @@
             <a:pPr algn="ctr"/>
             <a:r>
               <a:rPr lang="es-ES" sz="1350" dirty="0" smtClean="0"/>
-              <a:t>[MOVEABLE];</a:t>
-            </a:r>
-          </a:p>
-          <a:p>
-            <a:pPr algn="ctr"/>
-            <a:r>
-              <a:rPr lang="es-ES" sz="1350" dirty="0" smtClean="0"/>
-              <a:t>[TRANSPARENT];</a:t>
-            </a:r>
-          </a:p>
-          <a:p>
-            <a:pPr algn="ctr"/>
-            <a:r>
-              <a:rPr lang="es-ES" sz="1350" dirty="0"/>
-              <a:t>[</a:t>
-            </a:r>
-            <a:r>
-              <a:rPr lang="es-ES" sz="1350" dirty="0" err="1" smtClean="0"/>
-              <a:t>WASDMovement</a:t>
-            </a:r>
-            <a:r>
-              <a:rPr lang="es-ES" sz="1350" dirty="0" smtClean="0"/>
-              <a:t>];</a:t>
-            </a:r>
-          </a:p>
-          <a:p>
-            <a:pPr algn="ctr"/>
-            <a:r>
-              <a:rPr lang="es-ES" sz="1350" dirty="0" smtClean="0"/>
               <a:t>[</a:t>
             </a:r>
             <a:r>
@@ -4304,7 +4586,7 @@
         </p:nvSpPr>
         <p:spPr>
           <a:xfrm>
-            <a:off x="5687886" y="4151746"/>
+            <a:off x="6129015" y="5682354"/>
             <a:ext cx="2219541" cy="1175646"/>
           </a:xfrm>
           <a:prstGeom prst="rect">
@@ -4409,127 +4691,6 @@
     <p:extLst>
       <p:ext uri="{BB962C8B-B14F-4D97-AF65-F5344CB8AC3E}">
         <p14:creationId xmlns:p14="http://schemas.microsoft.com/office/powerpoint/2010/main" val="3380256703"/>
-      </p:ext>
-    </p:extLst>
-  </p:cSld>
-  <p:clrMapOvr>
-    <a:masterClrMapping/>
-  </p:clrMapOvr>
-</p:sld>
-</file>
-
-<file path=ppt/slides/slide2.xml><?xml version="1.0" encoding="utf-8"?>
-<p:sld xmlns:a="http://schemas.openxmlformats.org/drawingml/2006/main" xmlns:r="http://schemas.openxmlformats.org/officeDocument/2006/relationships" xmlns:p="http://schemas.openxmlformats.org/presentationml/2006/main">
-  <p:cSld>
-    <p:spTree>
-      <p:nvGrpSpPr>
-        <p:cNvPr id="1" name=""/>
-        <p:cNvGrpSpPr/>
-        <p:nvPr/>
-      </p:nvGrpSpPr>
-      <p:grpSpPr>
-        <a:xfrm>
-          <a:off x="0" y="0"/>
-          <a:ext cx="0" cy="0"/>
-          <a:chOff x="0" y="0"/>
-          <a:chExt cx="0" cy="0"/>
-        </a:xfrm>
-      </p:grpSpPr>
-      <p:sp>
-        <p:nvSpPr>
-          <p:cNvPr id="2" name="Content Placeholder 1"/>
-          <p:cNvSpPr>
-            <a:spLocks noGrp="1"/>
-          </p:cNvSpPr>
-          <p:nvPr>
-            <p:ph idx="1"/>
-          </p:nvPr>
-        </p:nvSpPr>
-        <p:spPr/>
-        <p:txBody>
-          <a:bodyPr/>
-          <a:lstStyle/>
-          <a:p>
-            <a:endParaRPr lang="en-US" dirty="0"/>
-          </a:p>
-        </p:txBody>
-      </p:sp>
-      <p:pic>
-        <p:nvPicPr>
-          <p:cNvPr id="3" name="Imagen 2" descr="[COMPRESIONLEVEL=6];&#10;[COLORBITS=4]">
-            <a:extLst>
-              <a:ext uri="{FF2B5EF4-FFF2-40B4-BE49-F238E27FC236}">
-                <a16:creationId xmlns:a16="http://schemas.microsoft.com/office/drawing/2014/main" id="{54B3344E-1FFC-4B69-9491-53B9E0FF5CB6}"/>
-              </a:ext>
-            </a:extLst>
-          </p:cNvPr>
-          <p:cNvPicPr>
-            <a:picLocks noChangeAspect="1"/>
-          </p:cNvPicPr>
-          <p:nvPr/>
-        </p:nvPicPr>
-        <p:blipFill>
-          <a:blip r:embed="rId3" cstate="hqprint">
-            <a:extLst>
-              <a:ext uri="{28A0092B-C50C-407E-A947-70E740481C1C}">
-                <a14:useLocalDpi xmlns:a14="http://schemas.microsoft.com/office/drawing/2010/main" val="0"/>
-              </a:ext>
-            </a:extLst>
-          </a:blip>
-          <a:stretch>
-            <a:fillRect/>
-          </a:stretch>
-        </p:blipFill>
-        <p:spPr>
-          <a:xfrm>
-            <a:off x="0" y="4843496"/>
-            <a:ext cx="2586182" cy="1724983"/>
-          </a:xfrm>
-          <a:prstGeom prst="rect">
-            <a:avLst/>
-          </a:prstGeom>
-        </p:spPr>
-      </p:pic>
-      <p:pic>
-        <p:nvPicPr>
-          <p:cNvPr id="5" name="Imagen 2" descr="[CURSOR];&#10;[CURSOR-SIZE=25,25];&#10;[COLORBITS=8];">
-            <a:extLst>
-              <a:ext uri="{FF2B5EF4-FFF2-40B4-BE49-F238E27FC236}">
-                <a16:creationId xmlns:a16="http://schemas.microsoft.com/office/drawing/2014/main" id="{54B3344E-1FFC-4B69-9491-53B9E0FF5CB6}"/>
-              </a:ext>
-            </a:extLst>
-          </p:cNvPr>
-          <p:cNvPicPr>
-            <a:picLocks noChangeAspect="1"/>
-          </p:cNvPicPr>
-          <p:nvPr/>
-        </p:nvPicPr>
-        <p:blipFill>
-          <a:blip r:embed="rId4">
-            <a:extLst>
-              <a:ext uri="{28A0092B-C50C-407E-A947-70E740481C1C}">
-                <a14:useLocalDpi xmlns:a14="http://schemas.microsoft.com/office/drawing/2010/main" val="0"/>
-              </a:ext>
-            </a:extLst>
-          </a:blip>
-          <a:stretch>
-            <a:fillRect/>
-          </a:stretch>
-        </p:blipFill>
-        <p:spPr>
-          <a:xfrm>
-            <a:off x="3784209" y="640400"/>
-            <a:ext cx="787791" cy="787791"/>
-          </a:xfrm>
-          <a:prstGeom prst="rect">
-            <a:avLst/>
-          </a:prstGeom>
-        </p:spPr>
-      </p:pic>
-    </p:spTree>
-    <p:extLst>
-      <p:ext uri="{BB962C8B-B14F-4D97-AF65-F5344CB8AC3E}">
-        <p14:creationId xmlns:p14="http://schemas.microsoft.com/office/powerpoint/2010/main" val="2186432323"/>
       </p:ext>
     </p:extLst>
   </p:cSld>

</xml_diff>